<commit_message>
Übungen in Theorie-Slides, Fix typos und formatting
</commit_message>
<xml_diff>
--- a/slides/Tag-3_4-Release-und-Tagged-Images.pptx
+++ b/slides/Tag-3_4-Release-und-Tagged-Images.pptx
@@ -6,10 +6,10 @@
     <p:sldMasterId id="2147483649" r:id="rId2"/>
   </p:sldMasterIdLst>
   <p:notesMasterIdLst>
-    <p:notesMasterId r:id="rId39"/>
+    <p:notesMasterId r:id="rId38"/>
   </p:notesMasterIdLst>
   <p:handoutMasterIdLst>
-    <p:handoutMasterId r:id="rId40"/>
+    <p:handoutMasterId r:id="rId39"/>
   </p:handoutMasterIdLst>
   <p:sldIdLst>
     <p:sldId id="288" r:id="rId3"/>
@@ -45,9 +45,8 @@
     <p:sldId id="617" r:id="rId33"/>
     <p:sldId id="632" r:id="rId34"/>
     <p:sldId id="633" r:id="rId35"/>
-    <p:sldId id="624" r:id="rId36"/>
-    <p:sldId id="625" r:id="rId37"/>
-    <p:sldId id="626" r:id="rId38"/>
+    <p:sldId id="625" r:id="rId36"/>
+    <p:sldId id="626" r:id="rId37"/>
   </p:sldIdLst>
   <p:sldSz cx="9144000" cy="6858000" type="screen4x3"/>
   <p:notesSz cx="6784975" cy="9921875"/>
@@ -1702,7 +1701,7 @@
             <a:fld id="{18182567-388C-4D33-8B7B-A651F195F118}" type="slidenum">
               <a:rPr lang="de-DE" altLang="de-DE" smtClean="0"/>
               <a:pPr/>
-              <a:t>35</a:t>
+              <a:t>34</a:t>
             </a:fld>
             <a:endParaRPr lang="de-DE" altLang="de-DE"/>
           </a:p>
@@ -1805,7 +1804,7 @@
             <a:fld id="{18182567-388C-4D33-8B7B-A651F195F118}" type="slidenum">
               <a:rPr lang="de-DE" altLang="de-DE" smtClean="0"/>
               <a:pPr/>
-              <a:t>36</a:t>
+              <a:t>35</a:t>
             </a:fld>
             <a:endParaRPr lang="de-DE" altLang="de-DE"/>
           </a:p>
@@ -3087,7 +3086,7 @@
               <a:pPr algn="ctr">
                 <a:defRPr/>
               </a:pPr>
-              <a:t>06.06.2024</a:t>
+              <a:t>10.06.2024</a:t>
             </a:fld>
             <a:endParaRPr lang="de-DE" sz="1000">
               <a:solidFill>
@@ -5658,13 +5657,8 @@
             </a:pPr>
             <a:r>
               <a:rPr lang="de-DE" dirty="0"/>
-              <a:t>Tags immer aktualisieren, gerade bei einer neuen </a:t>
-            </a:r>
-            <a:r>
-              <a:rPr lang="de-DE" dirty="0" err="1"/>
-              <a:t>Verison</a:t>
-            </a:r>
-            <a:endParaRPr lang="de-DE" dirty="0"/>
+              <a:t>Tags immer aktualisieren, gerade bei einer neuen Version</a:t>
+            </a:r>
           </a:p>
           <a:p>
             <a:pPr lvl="1">
@@ -6487,12 +6481,8 @@
               <a:buChar char="•"/>
             </a:pPr>
             <a:r>
-              <a:rPr lang="de-DE" dirty="0" err="1"/>
-              <a:t>Branchnamen</a:t>
-            </a:r>
-            <a:r>
-              <a:rPr lang="de-DE" dirty="0"/>
-              <a:t> verwenden, um Tags zu managen</a:t>
+              <a:rPr lang="de-DE" dirty="0"/>
+              <a:t>Branch-Namen verwenden, um Tags zu managen</a:t>
             </a:r>
           </a:p>
           <a:p>
@@ -9992,12 +9982,8 @@
               <a:buChar char="•"/>
             </a:pPr>
             <a:r>
-              <a:rPr lang="de-DE" dirty="0" err="1"/>
-              <a:t>Authentifierzungsbefehl</a:t>
-            </a:r>
-            <a:r>
-              <a:rPr lang="de-DE" dirty="0"/>
-              <a:t> in </a:t>
+              <a:rPr lang="de-DE" dirty="0"/>
+              <a:t>Befehl zum Authentifizieren im </a:t>
             </a:r>
             <a:r>
               <a:rPr lang="de-DE" dirty="0" err="1">
@@ -10300,11 +10286,15 @@
               <a:buNone/>
             </a:pPr>
             <a:r>
-              <a:rPr lang="en-US" b="1" dirty="0"/>
-              <a:t>Docker-in-Docker Container Image (</a:t>
-            </a:r>
-            <a:r>
-              <a:rPr lang="en-US" b="1" dirty="0">
+              <a:rPr lang="en-US" sz="2000" b="1" dirty="0" err="1"/>
+              <a:t>Beispiel</a:t>
+            </a:r>
+            <a:r>
+              <a:rPr lang="en-US" sz="2000" b="1" dirty="0"/>
+              <a:t>: Docker-in-Docker Container Image (</a:t>
+            </a:r>
+            <a:r>
+              <a:rPr lang="en-US" sz="2000" b="1" dirty="0">
                 <a:solidFill>
                   <a:srgbClr val="0249FC"/>
                 </a:solidFill>
@@ -10312,7 +10302,7 @@
               <a:t>Container Registry</a:t>
             </a:r>
             <a:r>
-              <a:rPr lang="en-US" b="1" dirty="0"/>
+              <a:rPr lang="en-US" sz="2000" b="1" dirty="0"/>
               <a:t>)</a:t>
             </a:r>
           </a:p>
@@ -10321,26 +10311,26 @@
               <a:buNone/>
             </a:pPr>
             <a:r>
-              <a:rPr lang="en-US" dirty="0" err="1"/>
+              <a:rPr lang="en-US" sz="2000" dirty="0" err="1"/>
               <a:t>Eigene</a:t>
             </a:r>
             <a:r>
-              <a:rPr lang="en-US" dirty="0"/>
+              <a:rPr lang="en-US" sz="2000" dirty="0"/>
               <a:t> Container Images </a:t>
             </a:r>
             <a:r>
-              <a:rPr lang="en-US" dirty="0" err="1"/>
+              <a:rPr lang="en-US" sz="2000" dirty="0" err="1"/>
               <a:t>mit</a:t>
             </a:r>
             <a:r>
-              <a:rPr lang="en-US" dirty="0"/>
+              <a:rPr lang="en-US" sz="2000" dirty="0"/>
               <a:t> Docker-in-Docker </a:t>
             </a:r>
             <a:r>
-              <a:rPr lang="en-US" dirty="0" err="1"/>
+              <a:rPr lang="en-US" sz="2000" dirty="0" err="1"/>
               <a:t>nutzen</a:t>
             </a:r>
-            <a:endParaRPr lang="en-US" dirty="0"/>
+            <a:endParaRPr lang="en-US" sz="2000" dirty="0"/>
           </a:p>
           <a:p>
             <a:pPr marL="457200" indent="-457200">
@@ -10348,14 +10338,14 @@
               <a:buAutoNum type="arabicPeriod"/>
             </a:pPr>
             <a:r>
-              <a:rPr lang="en-US" dirty="0"/>
+              <a:rPr lang="en-US" sz="2000" dirty="0"/>
               <a:t>Docker-in-Docker </a:t>
             </a:r>
             <a:r>
-              <a:rPr lang="en-US" dirty="0" err="1"/>
+              <a:rPr lang="en-US" sz="2000" dirty="0" err="1"/>
               <a:t>einrichten</a:t>
             </a:r>
-            <a:endParaRPr lang="en-US" dirty="0"/>
+            <a:endParaRPr lang="en-US" sz="2000" dirty="0"/>
           </a:p>
           <a:p>
             <a:pPr marL="457200" indent="-457200">
@@ -10363,7 +10353,7 @@
               <a:buAutoNum type="arabicPeriod"/>
             </a:pPr>
             <a:r>
-              <a:rPr lang="en-US" dirty="0">
+              <a:rPr lang="en-US" sz="2000" dirty="0">
                 <a:solidFill>
                   <a:srgbClr val="FF0000"/>
                 </a:solidFill>
@@ -10372,11 +10362,11 @@
               <a:t>image</a:t>
             </a:r>
             <a:r>
-              <a:rPr lang="en-US" dirty="0"/>
+              <a:rPr lang="en-US" sz="2000" dirty="0"/>
               <a:t> und </a:t>
             </a:r>
             <a:r>
-              <a:rPr lang="en-US" dirty="0">
+              <a:rPr lang="en-US" sz="2000" dirty="0">
                 <a:solidFill>
                   <a:srgbClr val="FF0000"/>
                 </a:solidFill>
@@ -10385,22 +10375,22 @@
               <a:t>service</a:t>
             </a:r>
             <a:r>
-              <a:rPr lang="en-US" dirty="0"/>
+              <a:rPr lang="en-US" sz="2000" dirty="0"/>
               <a:t> auf die Registry </a:t>
             </a:r>
             <a:r>
-              <a:rPr lang="en-US" dirty="0" err="1"/>
+              <a:rPr lang="en-US" sz="2000" dirty="0" err="1"/>
               <a:t>zeigen</a:t>
             </a:r>
             <a:r>
-              <a:rPr lang="en-US" dirty="0"/>
+              <a:rPr lang="en-US" sz="2000" dirty="0"/>
               <a:t> </a:t>
             </a:r>
             <a:r>
-              <a:rPr lang="en-US" dirty="0" err="1"/>
+              <a:rPr lang="en-US" sz="2000" dirty="0" err="1"/>
               <a:t>lassen</a:t>
             </a:r>
-            <a:endParaRPr lang="en-US" dirty="0"/>
+            <a:endParaRPr lang="en-US" sz="2000" dirty="0"/>
           </a:p>
           <a:p>
             <a:pPr marL="457200" indent="-457200">
@@ -10408,7 +10398,7 @@
               <a:buAutoNum type="arabicPeriod"/>
             </a:pPr>
             <a:r>
-              <a:rPr lang="en-US" dirty="0">
+              <a:rPr lang="en-US" sz="2000" dirty="0">
                 <a:solidFill>
                   <a:srgbClr val="FF0000"/>
                 </a:solidFill>
@@ -10417,41 +10407,50 @@
               <a:t>alias</a:t>
             </a:r>
             <a:r>
-              <a:rPr lang="en-US" dirty="0"/>
+              <a:rPr lang="en-US" sz="2000" dirty="0"/>
               <a:t> </a:t>
             </a:r>
             <a:r>
-              <a:rPr lang="en-US" dirty="0" err="1"/>
+              <a:rPr lang="en-US" sz="2000" dirty="0" err="1"/>
               <a:t>hinzufügen</a:t>
             </a:r>
             <a:r>
-              <a:rPr lang="en-US" dirty="0"/>
+              <a:rPr lang="en-US" sz="2000" dirty="0"/>
               <a:t> für den </a:t>
             </a:r>
             <a:r>
-              <a:rPr lang="en-US" dirty="0">
+              <a:rPr lang="en-US" sz="2000" dirty="0">
                 <a:latin typeface="Consolas" panose="020B0609020204030204" pitchFamily="49" charset="0"/>
               </a:rPr>
               <a:t>service</a:t>
             </a:r>
+          </a:p>
+          <a:p>
+            <a:pPr marL="457200" indent="-457200">
+              <a:buFont typeface="+mj-lt"/>
+              <a:buAutoNum type="arabicPeriod"/>
+            </a:pPr>
+            <a:endParaRPr lang="en-US" sz="2000" dirty="0">
+              <a:latin typeface="Consolas" panose="020B0609020204030204" pitchFamily="49" charset="0"/>
+            </a:endParaRPr>
           </a:p>
           <a:p>
             <a:pPr marL="0" indent="0">
               <a:buNone/>
             </a:pPr>
             <a:r>
-              <a:rPr lang="en-US" sz="2000" dirty="0">
+              <a:rPr lang="en-US" sz="1800" dirty="0">
                 <a:latin typeface="Consolas" panose="020B0609020204030204" pitchFamily="49" charset="0"/>
               </a:rPr>
               <a:t>.</a:t>
             </a:r>
             <a:r>
-              <a:rPr lang="en-US" sz="2000" dirty="0" err="1">
+              <a:rPr lang="en-US" sz="1800" dirty="0" err="1">
                 <a:latin typeface="Consolas" panose="020B0609020204030204" pitchFamily="49" charset="0"/>
               </a:rPr>
               <a:t>gitlab-ci.yml</a:t>
             </a:r>
-            <a:endParaRPr lang="en-US" sz="2000" dirty="0">
+            <a:endParaRPr lang="en-US" sz="1800" dirty="0">
               <a:latin typeface="Consolas" panose="020B0609020204030204" pitchFamily="49" charset="0"/>
             </a:endParaRPr>
           </a:p>
@@ -10476,7 +10475,7 @@
               <a:defRPr/>
             </a:pPr>
             <a:r>
-              <a:rPr kumimoji="0" lang="en-US" sz="1600" b="0" i="0" u="none" strike="noStrike" kern="0" cap="none" spc="0" normalizeH="0" baseline="0" noProof="0" dirty="0">
+              <a:rPr kumimoji="0" lang="en-US" sz="1400" b="0" i="0" u="none" strike="noStrike" kern="0" cap="none" spc="0" normalizeH="0" baseline="0" noProof="0" dirty="0">
                 <a:ln>
                   <a:noFill/>
                 </a:ln>
@@ -10514,7 +10513,7 @@
               <a:defRPr/>
             </a:pPr>
             <a:r>
-              <a:rPr kumimoji="0" lang="en-US" sz="1600" b="0" i="0" u="none" strike="noStrike" kern="0" cap="none" spc="0" normalizeH="0" baseline="0" noProof="0" dirty="0">
+              <a:rPr kumimoji="0" lang="en-US" sz="1400" b="0" i="0" u="none" strike="noStrike" kern="0" cap="none" spc="0" normalizeH="0" baseline="0" noProof="0" dirty="0">
                 <a:ln>
                   <a:noFill/>
                 </a:ln>
@@ -10531,7 +10530,7 @@
               <a:t>  image</a:t>
             </a:r>
             <a:r>
-              <a:rPr kumimoji="0" lang="en-US" sz="1600" b="0" i="0" u="none" strike="noStrike" kern="0" cap="none" spc="0" normalizeH="0" baseline="0" noProof="0" dirty="0">
+              <a:rPr kumimoji="0" lang="en-US" sz="1400" b="0" i="0" u="none" strike="noStrike" kern="0" cap="none" spc="0" normalizeH="0" baseline="0" noProof="0" dirty="0">
                 <a:ln>
                   <a:noFill/>
                 </a:ln>
@@ -10548,7 +10547,7 @@
               <a:t>: </a:t>
             </a:r>
             <a:r>
-              <a:rPr kumimoji="0" lang="en-US" sz="1600" b="0" i="0" u="none" strike="noStrike" kern="0" cap="none" spc="0" normalizeH="0" baseline="0" noProof="0" dirty="0">
+              <a:rPr kumimoji="0" lang="en-US" sz="1400" b="0" i="0" u="none" strike="noStrike" kern="0" cap="none" spc="0" normalizeH="0" baseline="0" noProof="0" dirty="0">
                 <a:ln>
                   <a:noFill/>
                 </a:ln>
@@ -10565,7 +10564,7 @@
               <a:t>$CI_REGISTRY</a:t>
             </a:r>
             <a:r>
-              <a:rPr kumimoji="0" lang="en-US" sz="1600" b="0" i="0" u="none" strike="noStrike" kern="0" cap="none" spc="0" normalizeH="0" baseline="0" noProof="0" dirty="0">
+              <a:rPr kumimoji="0" lang="en-US" sz="1400" b="0" i="0" u="none" strike="noStrike" kern="0" cap="none" spc="0" normalizeH="0" baseline="0" noProof="0" dirty="0">
                 <a:ln>
                   <a:noFill/>
                 </a:ln>
@@ -10603,7 +10602,7 @@
               <a:defRPr/>
             </a:pPr>
             <a:r>
-              <a:rPr kumimoji="0" lang="en-US" sz="1600" b="0" i="0" u="none" strike="noStrike" kern="0" cap="none" spc="0" normalizeH="0" baseline="0" noProof="0" dirty="0">
+              <a:rPr kumimoji="0" lang="en-US" sz="1400" b="0" i="0" u="none" strike="noStrike" kern="0" cap="none" spc="0" normalizeH="0" baseline="0" noProof="0" dirty="0">
                 <a:ln>
                   <a:noFill/>
                 </a:ln>
@@ -10620,7 +10619,7 @@
               <a:t>  </a:t>
             </a:r>
             <a:r>
-              <a:rPr kumimoji="0" lang="en-US" sz="1600" b="0" i="0" u="none" strike="noStrike" kern="0" cap="none" spc="0" normalizeH="0" baseline="0" noProof="0" dirty="0">
+              <a:rPr kumimoji="0" lang="en-US" sz="1400" b="0" i="0" u="none" strike="noStrike" kern="0" cap="none" spc="0" normalizeH="0" baseline="0" noProof="0" dirty="0">
                 <a:ln>
                   <a:noFill/>
                 </a:ln>
@@ -10637,7 +10636,7 @@
               <a:t>services</a:t>
             </a:r>
             <a:r>
-              <a:rPr kumimoji="0" lang="en-US" sz="1600" b="0" i="0" u="none" strike="noStrike" kern="0" cap="none" spc="0" normalizeH="0" baseline="0" noProof="0" dirty="0">
+              <a:rPr kumimoji="0" lang="en-US" sz="1400" b="0" i="0" u="none" strike="noStrike" kern="0" cap="none" spc="0" normalizeH="0" baseline="0" noProof="0" dirty="0">
                 <a:ln>
                   <a:noFill/>
                 </a:ln>
@@ -10675,7 +10674,7 @@
               <a:defRPr/>
             </a:pPr>
             <a:r>
-              <a:rPr kumimoji="0" lang="en-US" sz="1600" b="0" i="0" u="none" strike="noStrike" kern="0" cap="none" spc="0" normalizeH="0" baseline="0" noProof="0" dirty="0">
+              <a:rPr kumimoji="0" lang="en-US" sz="1400" b="0" i="0" u="none" strike="noStrike" kern="0" cap="none" spc="0" normalizeH="0" baseline="0" noProof="0" dirty="0">
                 <a:ln>
                   <a:noFill/>
                 </a:ln>
@@ -10692,7 +10691,7 @@
               <a:t>    - name: </a:t>
             </a:r>
             <a:r>
-              <a:rPr kumimoji="0" lang="en-US" sz="1600" b="0" i="0" u="none" strike="noStrike" kern="0" cap="none" spc="0" normalizeH="0" baseline="0" noProof="0" dirty="0">
+              <a:rPr kumimoji="0" lang="en-US" sz="1400" b="0" i="0" u="none" strike="noStrike" kern="0" cap="none" spc="0" normalizeH="0" baseline="0" noProof="0" dirty="0">
                 <a:ln>
                   <a:noFill/>
                 </a:ln>
@@ -10709,7 +10708,7 @@
               <a:t>$CI_REGISTRY</a:t>
             </a:r>
             <a:r>
-              <a:rPr kumimoji="0" lang="en-US" sz="1600" b="0" i="0" u="none" strike="noStrike" kern="0" cap="none" spc="0" normalizeH="0" baseline="0" noProof="0" dirty="0">
+              <a:rPr kumimoji="0" lang="en-US" sz="1400" b="0" i="0" u="none" strike="noStrike" kern="0" cap="none" spc="0" normalizeH="0" baseline="0" noProof="0" dirty="0">
                 <a:ln>
                   <a:noFill/>
                 </a:ln>
@@ -10747,7 +10746,7 @@
               <a:defRPr/>
             </a:pPr>
             <a:r>
-              <a:rPr kumimoji="0" lang="en-US" sz="1600" b="0" i="0" u="none" strike="noStrike" kern="0" cap="none" spc="0" normalizeH="0" baseline="0" noProof="0" dirty="0">
+              <a:rPr kumimoji="0" lang="en-US" sz="1400" b="0" i="0" u="none" strike="noStrike" kern="0" cap="none" spc="0" normalizeH="0" baseline="0" noProof="0" dirty="0">
                 <a:ln>
                   <a:noFill/>
                 </a:ln>
@@ -10764,7 +10763,7 @@
               <a:t>      </a:t>
             </a:r>
             <a:r>
-              <a:rPr kumimoji="0" lang="en-US" sz="1600" b="0" i="0" u="none" strike="noStrike" kern="0" cap="none" spc="0" normalizeH="0" baseline="0" noProof="0" dirty="0">
+              <a:rPr kumimoji="0" lang="en-US" sz="1400" b="0" i="0" u="none" strike="noStrike" kern="0" cap="none" spc="0" normalizeH="0" baseline="0" noProof="0" dirty="0">
                 <a:ln>
                   <a:noFill/>
                 </a:ln>
@@ -10781,7 +10780,7 @@
               <a:t>alias</a:t>
             </a:r>
             <a:r>
-              <a:rPr kumimoji="0" lang="en-US" sz="1600" b="0" i="0" u="none" strike="noStrike" kern="0" cap="none" spc="0" normalizeH="0" baseline="0" noProof="0" dirty="0">
+              <a:rPr kumimoji="0" lang="en-US" sz="1400" b="0" i="0" u="none" strike="noStrike" kern="0" cap="none" spc="0" normalizeH="0" baseline="0" noProof="0" dirty="0">
                 <a:ln>
                   <a:noFill/>
                 </a:ln>
@@ -10819,7 +10818,7 @@
               <a:defRPr/>
             </a:pPr>
             <a:r>
-              <a:rPr kumimoji="0" lang="en-US" sz="1600" b="0" i="0" u="none" strike="noStrike" kern="0" cap="none" spc="0" normalizeH="0" baseline="0" noProof="0" dirty="0">
+              <a:rPr kumimoji="0" lang="en-US" sz="1400" b="0" i="0" u="none" strike="noStrike" kern="0" cap="none" spc="0" normalizeH="0" baseline="0" noProof="0" dirty="0">
                 <a:ln>
                   <a:noFill/>
                 </a:ln>
@@ -10857,7 +10856,7 @@
               <a:defRPr/>
             </a:pPr>
             <a:r>
-              <a:rPr kumimoji="0" lang="en-US" sz="1600" b="0" i="0" u="none" strike="noStrike" kern="0" cap="none" spc="0" normalizeH="0" baseline="0" noProof="0" dirty="0">
+              <a:rPr kumimoji="0" lang="en-US" sz="1400" b="0" i="0" u="none" strike="noStrike" kern="0" cap="none" spc="0" normalizeH="0" baseline="0" noProof="0" dirty="0">
                 <a:ln>
                   <a:noFill/>
                 </a:ln>
@@ -10895,7 +10894,7 @@
               <a:defRPr/>
             </a:pPr>
             <a:r>
-              <a:rPr kumimoji="0" lang="en-US" sz="1600" b="0" i="0" u="none" strike="noStrike" kern="0" cap="none" spc="0" normalizeH="0" baseline="0" noProof="0" dirty="0">
+              <a:rPr kumimoji="0" lang="en-US" sz="1400" b="0" i="0" u="none" strike="noStrike" kern="0" cap="none" spc="0" normalizeH="0" baseline="0" noProof="0" dirty="0">
                 <a:ln>
                   <a:noFill/>
                 </a:ln>
@@ -10933,7 +10932,7 @@
               <a:defRPr/>
             </a:pPr>
             <a:r>
-              <a:rPr kumimoji="0" lang="en-US" sz="1600" b="0" i="0" u="none" strike="noStrike" kern="0" cap="none" spc="0" normalizeH="0" baseline="0" noProof="0" dirty="0">
+              <a:rPr kumimoji="0" lang="en-US" sz="1400" b="0" i="0" u="none" strike="noStrike" kern="0" cap="none" spc="0" normalizeH="0" baseline="0" noProof="0" dirty="0">
                 <a:ln>
                   <a:noFill/>
                 </a:ln>
@@ -10949,6 +10948,20 @@
               </a:rPr>
               <a:t>    - docker run my-docker-image /script/to/run/tests</a:t>
             </a:r>
+            <a:endParaRPr kumimoji="0" lang="en-US" sz="1600" b="0" i="0" u="none" strike="noStrike" kern="0" cap="none" spc="0" normalizeH="0" baseline="0" noProof="0" dirty="0">
+              <a:ln>
+                <a:noFill/>
+              </a:ln>
+              <a:solidFill>
+                <a:srgbClr val="000000"/>
+              </a:solidFill>
+              <a:effectLst/>
+              <a:uLnTx/>
+              <a:uFillTx/>
+              <a:latin typeface="Consolas" panose="020B0609020204030204" pitchFamily="49" charset="0"/>
+              <a:ea typeface="+mn-ea"/>
+              <a:cs typeface="+mn-cs"/>
+            </a:endParaRPr>
           </a:p>
         </p:txBody>
       </p:sp>
@@ -11044,11 +11057,15 @@
               <a:buNone/>
             </a:pPr>
             <a:r>
-              <a:rPr lang="en-US" b="1" dirty="0"/>
-              <a:t>Docker-in-Docker Container Image (</a:t>
-            </a:r>
-            <a:r>
-              <a:rPr lang="en-US" b="1" dirty="0">
+              <a:rPr lang="en-US" sz="2000" b="1" dirty="0" err="1"/>
+              <a:t>Beispiel</a:t>
+            </a:r>
+            <a:r>
+              <a:rPr lang="en-US" sz="2000" b="1" dirty="0"/>
+              <a:t>: Docker-in-Docker Container Image (</a:t>
+            </a:r>
+            <a:r>
+              <a:rPr lang="en-US" sz="2000" b="1" dirty="0">
                 <a:solidFill>
                   <a:srgbClr val="0249FC"/>
                 </a:solidFill>
@@ -11056,7 +11073,7 @@
               <a:t>Container Registry</a:t>
             </a:r>
             <a:r>
-              <a:rPr lang="en-US" b="1" dirty="0"/>
+              <a:rPr lang="en-US" sz="2000" b="1" dirty="0"/>
               <a:t>)</a:t>
             </a:r>
           </a:p>
@@ -11065,18 +11082,18 @@
               <a:buNone/>
             </a:pPr>
             <a:r>
-              <a:rPr lang="en-US" sz="2000" dirty="0">
+              <a:rPr lang="en-US" sz="1800" dirty="0">
                 <a:latin typeface="Consolas" panose="020B0609020204030204" pitchFamily="49" charset="0"/>
               </a:rPr>
               <a:t>.</a:t>
             </a:r>
             <a:r>
-              <a:rPr lang="en-US" sz="2000" dirty="0" err="1">
+              <a:rPr lang="en-US" sz="1800" dirty="0" err="1">
                 <a:latin typeface="Consolas" panose="020B0609020204030204" pitchFamily="49" charset="0"/>
               </a:rPr>
               <a:t>gitlab-ci.yml</a:t>
             </a:r>
-            <a:endParaRPr lang="en-US" sz="2000" dirty="0">
+            <a:endParaRPr lang="en-US" sz="1800" dirty="0">
               <a:latin typeface="Consolas" panose="020B0609020204030204" pitchFamily="49" charset="0"/>
             </a:endParaRPr>
           </a:p>
@@ -11101,7 +11118,7 @@
               <a:defRPr/>
             </a:pPr>
             <a:r>
-              <a:rPr kumimoji="0" lang="en-US" sz="1600" b="0" i="0" u="none" strike="noStrike" kern="0" cap="none" spc="0" normalizeH="0" baseline="0" noProof="0" dirty="0">
+              <a:rPr kumimoji="0" lang="en-US" sz="1400" b="0" i="0" u="none" strike="noStrike" kern="0" cap="none" spc="0" normalizeH="0" baseline="0" noProof="0" dirty="0">
                 <a:ln>
                   <a:noFill/>
                 </a:ln>
@@ -11139,7 +11156,7 @@
               <a:defRPr/>
             </a:pPr>
             <a:r>
-              <a:rPr kumimoji="0" lang="en-US" sz="1600" b="0" i="0" u="none" strike="noStrike" kern="0" cap="none" spc="0" normalizeH="0" baseline="0" noProof="0" dirty="0">
+              <a:rPr kumimoji="0" lang="en-US" sz="1400" b="0" i="0" u="none" strike="noStrike" kern="0" cap="none" spc="0" normalizeH="0" baseline="0" noProof="0" dirty="0">
                 <a:ln>
                   <a:noFill/>
                 </a:ln>
@@ -11156,7 +11173,7 @@
               <a:t>  image</a:t>
             </a:r>
             <a:r>
-              <a:rPr kumimoji="0" lang="en-US" sz="1600" b="0" i="0" u="none" strike="noStrike" kern="0" cap="none" spc="0" normalizeH="0" baseline="0" noProof="0" dirty="0">
+              <a:rPr kumimoji="0" lang="en-US" sz="1400" b="0" i="0" u="none" strike="noStrike" kern="0" cap="none" spc="0" normalizeH="0" baseline="0" noProof="0" dirty="0">
                 <a:ln>
                   <a:noFill/>
                 </a:ln>
@@ -11173,7 +11190,7 @@
               <a:t>: </a:t>
             </a:r>
             <a:r>
-              <a:rPr kumimoji="0" lang="en-US" sz="1600" b="0" i="0" u="none" strike="noStrike" kern="0" cap="none" spc="0" normalizeH="0" baseline="0" noProof="0" dirty="0">
+              <a:rPr kumimoji="0" lang="en-US" sz="1400" b="0" i="0" u="none" strike="noStrike" kern="0" cap="none" spc="0" normalizeH="0" baseline="0" noProof="0" dirty="0">
                 <a:ln>
                   <a:noFill/>
                 </a:ln>
@@ -11190,7 +11207,7 @@
               <a:t>$CI_REGISTRY</a:t>
             </a:r>
             <a:r>
-              <a:rPr kumimoji="0" lang="en-US" sz="1600" b="0" i="0" u="none" strike="noStrike" kern="0" cap="none" spc="0" normalizeH="0" baseline="0" noProof="0" dirty="0">
+              <a:rPr kumimoji="0" lang="en-US" sz="1400" b="0" i="0" u="none" strike="noStrike" kern="0" cap="none" spc="0" normalizeH="0" baseline="0" noProof="0" dirty="0">
                 <a:ln>
                   <a:noFill/>
                 </a:ln>
@@ -11228,7 +11245,7 @@
               <a:defRPr/>
             </a:pPr>
             <a:r>
-              <a:rPr kumimoji="0" lang="en-US" sz="1600" b="0" i="0" u="none" strike="noStrike" kern="0" cap="none" spc="0" normalizeH="0" baseline="0" noProof="0" dirty="0">
+              <a:rPr kumimoji="0" lang="en-US" sz="1400" b="0" i="0" u="none" strike="noStrike" kern="0" cap="none" spc="0" normalizeH="0" baseline="0" noProof="0" dirty="0">
                 <a:ln>
                   <a:noFill/>
                 </a:ln>
@@ -11245,7 +11262,7 @@
               <a:t>  </a:t>
             </a:r>
             <a:r>
-              <a:rPr kumimoji="0" lang="en-US" sz="1600" b="0" i="0" u="none" strike="noStrike" kern="0" cap="none" spc="0" normalizeH="0" baseline="0" noProof="0" dirty="0">
+              <a:rPr kumimoji="0" lang="en-US" sz="1400" b="0" i="0" u="none" strike="noStrike" kern="0" cap="none" spc="0" normalizeH="0" baseline="0" noProof="0" dirty="0">
                 <a:ln>
                   <a:noFill/>
                 </a:ln>
@@ -11262,7 +11279,7 @@
               <a:t>services</a:t>
             </a:r>
             <a:r>
-              <a:rPr kumimoji="0" lang="en-US" sz="1600" b="0" i="0" u="none" strike="noStrike" kern="0" cap="none" spc="0" normalizeH="0" baseline="0" noProof="0" dirty="0">
+              <a:rPr kumimoji="0" lang="en-US" sz="1400" b="0" i="0" u="none" strike="noStrike" kern="0" cap="none" spc="0" normalizeH="0" baseline="0" noProof="0" dirty="0">
                 <a:ln>
                   <a:noFill/>
                 </a:ln>
@@ -11300,7 +11317,7 @@
               <a:defRPr/>
             </a:pPr>
             <a:r>
-              <a:rPr kumimoji="0" lang="en-US" sz="1600" b="0" i="0" u="none" strike="noStrike" kern="0" cap="none" spc="0" normalizeH="0" baseline="0" noProof="0" dirty="0">
+              <a:rPr kumimoji="0" lang="en-US" sz="1400" b="0" i="0" u="none" strike="noStrike" kern="0" cap="none" spc="0" normalizeH="0" baseline="0" noProof="0" dirty="0">
                 <a:ln>
                   <a:noFill/>
                 </a:ln>
@@ -11317,7 +11334,7 @@
               <a:t>    - name: </a:t>
             </a:r>
             <a:r>
-              <a:rPr kumimoji="0" lang="en-US" sz="1600" b="0" i="0" u="none" strike="noStrike" kern="0" cap="none" spc="0" normalizeH="0" baseline="0" noProof="0" dirty="0">
+              <a:rPr kumimoji="0" lang="en-US" sz="1400" b="0" i="0" u="none" strike="noStrike" kern="0" cap="none" spc="0" normalizeH="0" baseline="0" noProof="0" dirty="0">
                 <a:ln>
                   <a:noFill/>
                 </a:ln>
@@ -11334,7 +11351,7 @@
               <a:t>$CI_REGISTRY</a:t>
             </a:r>
             <a:r>
-              <a:rPr kumimoji="0" lang="en-US" sz="1600" b="0" i="0" u="none" strike="noStrike" kern="0" cap="none" spc="0" normalizeH="0" baseline="0" noProof="0" dirty="0">
+              <a:rPr kumimoji="0" lang="en-US" sz="1400" b="0" i="0" u="none" strike="noStrike" kern="0" cap="none" spc="0" normalizeH="0" baseline="0" noProof="0" dirty="0">
                 <a:ln>
                   <a:noFill/>
                 </a:ln>
@@ -11372,7 +11389,7 @@
               <a:defRPr/>
             </a:pPr>
             <a:r>
-              <a:rPr kumimoji="0" lang="en-US" sz="1600" b="0" i="0" u="none" strike="noStrike" kern="0" cap="none" spc="0" normalizeH="0" baseline="0" noProof="0" dirty="0">
+              <a:rPr kumimoji="0" lang="en-US" sz="1400" b="0" i="0" u="none" strike="noStrike" kern="0" cap="none" spc="0" normalizeH="0" baseline="0" noProof="0" dirty="0">
                 <a:ln>
                   <a:noFill/>
                 </a:ln>
@@ -11389,7 +11406,7 @@
               <a:t>      </a:t>
             </a:r>
             <a:r>
-              <a:rPr kumimoji="0" lang="en-US" sz="1600" b="0" i="0" u="none" strike="noStrike" kern="0" cap="none" spc="0" normalizeH="0" baseline="0" noProof="0" dirty="0">
+              <a:rPr kumimoji="0" lang="en-US" sz="1400" b="0" i="0" u="none" strike="noStrike" kern="0" cap="none" spc="0" normalizeH="0" baseline="0" noProof="0" dirty="0">
                 <a:ln>
                   <a:noFill/>
                 </a:ln>
@@ -11406,7 +11423,7 @@
               <a:t>alias</a:t>
             </a:r>
             <a:r>
-              <a:rPr kumimoji="0" lang="en-US" sz="1600" b="0" i="0" u="none" strike="noStrike" kern="0" cap="none" spc="0" normalizeH="0" baseline="0" noProof="0" dirty="0">
+              <a:rPr kumimoji="0" lang="en-US" sz="1400" b="0" i="0" u="none" strike="noStrike" kern="0" cap="none" spc="0" normalizeH="0" baseline="0" noProof="0" dirty="0">
                 <a:ln>
                   <a:noFill/>
                 </a:ln>
@@ -11444,7 +11461,7 @@
               <a:defRPr/>
             </a:pPr>
             <a:r>
-              <a:rPr kumimoji="0" lang="en-US" sz="1600" b="0" i="0" u="none" strike="noStrike" kern="0" cap="none" spc="0" normalizeH="0" baseline="0" noProof="0" dirty="0">
+              <a:rPr kumimoji="0" lang="en-US" sz="1400" b="0" i="0" u="none" strike="noStrike" kern="0" cap="none" spc="0" normalizeH="0" baseline="0" noProof="0" dirty="0">
                 <a:ln>
                   <a:noFill/>
                 </a:ln>
@@ -11482,7 +11499,7 @@
               <a:defRPr/>
             </a:pPr>
             <a:r>
-              <a:rPr kumimoji="0" lang="en-US" sz="1600" b="0" i="0" u="none" strike="noStrike" kern="0" cap="none" spc="0" normalizeH="0" baseline="0" noProof="0" dirty="0">
+              <a:rPr kumimoji="0" lang="en-US" sz="1400" b="0" i="0" u="none" strike="noStrike" kern="0" cap="none" spc="0" normalizeH="0" baseline="0" noProof="0" dirty="0">
                 <a:ln>
                   <a:noFill/>
                 </a:ln>
@@ -11520,7 +11537,7 @@
               <a:defRPr/>
             </a:pPr>
             <a:r>
-              <a:rPr kumimoji="0" lang="en-US" sz="1600" b="0" i="0" u="none" strike="noStrike" kern="0" cap="none" spc="0" normalizeH="0" baseline="0" noProof="0" dirty="0">
+              <a:rPr kumimoji="0" lang="en-US" sz="1400" b="0" i="0" u="none" strike="noStrike" kern="0" cap="none" spc="0" normalizeH="0" baseline="0" noProof="0" dirty="0">
                 <a:ln>
                   <a:noFill/>
                 </a:ln>
@@ -11558,7 +11575,7 @@
               <a:defRPr/>
             </a:pPr>
             <a:r>
-              <a:rPr kumimoji="0" lang="en-US" sz="1600" b="0" i="0" u="none" strike="noStrike" kern="0" cap="none" spc="0" normalizeH="0" baseline="0" noProof="0" dirty="0">
+              <a:rPr kumimoji="0" lang="en-US" sz="1400" b="0" i="0" u="none" strike="noStrike" kern="0" cap="none" spc="0" normalizeH="0" baseline="0" noProof="0" dirty="0">
                 <a:ln>
                   <a:noFill/>
                 </a:ln>
@@ -11579,7 +11596,7 @@
             <a:pPr marL="0" indent="0">
               <a:buNone/>
             </a:pPr>
-            <a:endParaRPr lang="en-US" sz="1600" dirty="0">
+            <a:endParaRPr lang="en-US" sz="1400" dirty="0">
               <a:latin typeface="Consolas" panose="020B0609020204030204" pitchFamily="49" charset="0"/>
             </a:endParaRPr>
           </a:p>
@@ -11589,19 +11606,19 @@
               <a:buChar char="•"/>
             </a:pPr>
             <a:r>
-              <a:rPr lang="en-US" sz="2000" dirty="0" err="1">
+              <a:rPr lang="en-US" sz="1800" dirty="0" err="1">
                 <a:latin typeface="+mj-lt"/>
               </a:rPr>
               <a:t>Ohne</a:t>
             </a:r>
             <a:r>
-              <a:rPr lang="en-US" sz="2000" dirty="0">
+              <a:rPr lang="en-US" sz="1800" dirty="0">
                 <a:latin typeface="+mj-lt"/>
               </a:rPr>
               <a:t> </a:t>
             </a:r>
             <a:r>
-              <a:rPr lang="en-US" sz="2000" dirty="0">
+              <a:rPr lang="en-US" sz="1800" dirty="0">
                 <a:solidFill>
                   <a:srgbClr val="FF0000"/>
                 </a:solidFill>
@@ -11610,85 +11627,85 @@
               <a:t>service alias </a:t>
             </a:r>
             <a:r>
-              <a:rPr lang="en-US" sz="2000" dirty="0" err="1">
+              <a:rPr lang="en-US" sz="1800" dirty="0" err="1">
                 <a:latin typeface="+mj-lt"/>
               </a:rPr>
               <a:t>kann</a:t>
             </a:r>
             <a:r>
-              <a:rPr lang="en-US" sz="2000" dirty="0">
+              <a:rPr lang="en-US" sz="1800" dirty="0">
                 <a:latin typeface="+mj-lt"/>
               </a:rPr>
               <a:t> das Container Image den </a:t>
             </a:r>
             <a:r>
-              <a:rPr lang="en-US" sz="2000" dirty="0" err="1">
+              <a:rPr lang="en-US" sz="1800" dirty="0" err="1">
                 <a:latin typeface="Consolas" panose="020B0609020204030204" pitchFamily="49" charset="0"/>
               </a:rPr>
               <a:t>dind</a:t>
             </a:r>
             <a:r>
-              <a:rPr lang="en-US" sz="2000" dirty="0">
+              <a:rPr lang="en-US" sz="1800" dirty="0">
                 <a:latin typeface="+mj-lt"/>
               </a:rPr>
               <a:t> service </a:t>
             </a:r>
             <a:r>
-              <a:rPr lang="en-US" sz="2000" dirty="0" err="1">
+              <a:rPr lang="en-US" sz="1800" dirty="0" err="1">
                 <a:latin typeface="+mj-lt"/>
               </a:rPr>
               <a:t>nicht</a:t>
             </a:r>
             <a:r>
-              <a:rPr lang="en-US" sz="2000" dirty="0">
+              <a:rPr lang="en-US" sz="1800" dirty="0">
                 <a:latin typeface="+mj-lt"/>
               </a:rPr>
               <a:t> </a:t>
             </a:r>
             <a:r>
-              <a:rPr lang="en-US" sz="2000" dirty="0" err="1">
+              <a:rPr lang="en-US" sz="1800" dirty="0" err="1">
                 <a:latin typeface="+mj-lt"/>
               </a:rPr>
               <a:t>finden</a:t>
             </a:r>
             <a:r>
-              <a:rPr lang="en-US" sz="2000" dirty="0">
+              <a:rPr lang="en-US" sz="1800" dirty="0">
                 <a:latin typeface="+mj-lt"/>
               </a:rPr>
               <a:t> und </a:t>
             </a:r>
             <a:r>
-              <a:rPr lang="en-US" sz="2000" dirty="0" err="1">
+              <a:rPr lang="en-US" sz="1800" dirty="0" err="1">
                 <a:latin typeface="+mj-lt"/>
               </a:rPr>
               <a:t>folgende</a:t>
             </a:r>
             <a:r>
-              <a:rPr lang="en-US" sz="2000" dirty="0">
+              <a:rPr lang="en-US" sz="1800" dirty="0">
                 <a:latin typeface="+mj-lt"/>
               </a:rPr>
               <a:t> </a:t>
             </a:r>
             <a:r>
-              <a:rPr lang="en-US" sz="2000" dirty="0" err="1">
+              <a:rPr lang="en-US" sz="1800" dirty="0" err="1">
                 <a:latin typeface="+mj-lt"/>
               </a:rPr>
               <a:t>Fehlermeldung</a:t>
             </a:r>
             <a:r>
-              <a:rPr lang="en-US" sz="2000" dirty="0">
+              <a:rPr lang="en-US" sz="1800" dirty="0">
                 <a:latin typeface="+mj-lt"/>
               </a:rPr>
               <a:t> </a:t>
             </a:r>
             <a:r>
-              <a:rPr lang="en-US" sz="2000" dirty="0" err="1">
+              <a:rPr lang="en-US" sz="1800" dirty="0" err="1">
                 <a:latin typeface="+mj-lt"/>
               </a:rPr>
               <a:t>erscheint</a:t>
             </a:r>
             <a:r>
-              <a:rPr lang="en-US" sz="2000" dirty="0">
+              <a:rPr lang="en-US" sz="1800" dirty="0">
                 <a:latin typeface="+mj-lt"/>
               </a:rPr>
               <a:t>:</a:t>
@@ -11700,19 +11717,19 @@
               <a:buChar char="•"/>
             </a:pPr>
             <a:r>
-              <a:rPr lang="en-US" sz="1600" dirty="0">
+              <a:rPr lang="en-US" sz="1400" dirty="0">
                 <a:latin typeface="Consolas" panose="020B0609020204030204" pitchFamily="49" charset="0"/>
               </a:rPr>
               <a:t>error during connect: Get http://docker:2376/v1.39/info: dial </a:t>
             </a:r>
             <a:r>
-              <a:rPr lang="en-US" sz="1600" dirty="0" err="1">
+              <a:rPr lang="en-US" sz="1400" dirty="0" err="1">
                 <a:latin typeface="Consolas" panose="020B0609020204030204" pitchFamily="49" charset="0"/>
               </a:rPr>
               <a:t>tcp</a:t>
             </a:r>
             <a:r>
-              <a:rPr lang="en-US" sz="1600" dirty="0">
+              <a:rPr lang="en-US" sz="1400" dirty="0">
                 <a:latin typeface="Consolas" panose="020B0609020204030204" pitchFamily="49" charset="0"/>
               </a:rPr>
               <a:t>: lookup docker on 192.168.0.1:53: no such host</a:t>
@@ -11723,7 +11740,7 @@
               <a:buFont typeface="Arial" panose="020B0604020202020204" pitchFamily="34" charset="0"/>
               <a:buChar char="•"/>
             </a:pPr>
-            <a:endParaRPr lang="en-US" sz="1600" dirty="0">
+            <a:endParaRPr lang="en-US" sz="1400" dirty="0">
               <a:latin typeface="Consolas" panose="020B0609020204030204" pitchFamily="49" charset="0"/>
             </a:endParaRPr>
           </a:p>
@@ -11732,7 +11749,7 @@
               <a:buFont typeface="Arial" panose="020B0604020202020204" pitchFamily="34" charset="0"/>
               <a:buChar char="•"/>
             </a:pPr>
-            <a:endParaRPr lang="en-US" sz="1600" dirty="0">
+            <a:endParaRPr lang="en-US" sz="1400" dirty="0">
               <a:latin typeface="Consolas" panose="020B0609020204030204" pitchFamily="49" charset="0"/>
             </a:endParaRPr>
           </a:p>
@@ -11830,11 +11847,15 @@
               <a:buNone/>
             </a:pPr>
             <a:r>
-              <a:rPr lang="en-US" b="1" dirty="0"/>
-              <a:t>Docker-in-Docker Container Image (</a:t>
-            </a:r>
-            <a:r>
-              <a:rPr lang="en-US" b="1" dirty="0">
+              <a:rPr lang="en-US" sz="2000" b="1" dirty="0" err="1"/>
+              <a:t>Beispiel</a:t>
+            </a:r>
+            <a:r>
+              <a:rPr lang="en-US" sz="2000" b="1" dirty="0"/>
+              <a:t>: Docker-in-Docker Container Image (</a:t>
+            </a:r>
+            <a:r>
+              <a:rPr lang="en-US" sz="2000" b="1" dirty="0">
                 <a:solidFill>
                   <a:srgbClr val="0249FC"/>
                 </a:solidFill>
@@ -11842,7 +11863,7 @@
               <a:t>Dependency Proxy</a:t>
             </a:r>
             <a:r>
-              <a:rPr lang="en-US" b="1" dirty="0"/>
+              <a:rPr lang="en-US" sz="2000" b="1" dirty="0"/>
               <a:t>)</a:t>
             </a:r>
           </a:p>
@@ -11851,26 +11872,26 @@
               <a:buNone/>
             </a:pPr>
             <a:r>
-              <a:rPr lang="en-US" dirty="0" err="1"/>
+              <a:rPr lang="en-US" sz="2000" dirty="0" err="1"/>
               <a:t>Eigene</a:t>
             </a:r>
             <a:r>
-              <a:rPr lang="en-US" dirty="0"/>
+              <a:rPr lang="en-US" sz="2000" dirty="0"/>
               <a:t> Container Images </a:t>
             </a:r>
             <a:r>
-              <a:rPr lang="en-US" dirty="0" err="1"/>
+              <a:rPr lang="en-US" sz="2000" dirty="0" err="1"/>
               <a:t>mit</a:t>
             </a:r>
             <a:r>
-              <a:rPr lang="en-US" dirty="0"/>
+              <a:rPr lang="en-US" sz="2000" dirty="0"/>
               <a:t> Docker-in-Docker </a:t>
             </a:r>
             <a:r>
-              <a:rPr lang="en-US" dirty="0" err="1"/>
+              <a:rPr lang="en-US" sz="2000" dirty="0" err="1"/>
               <a:t>nutzen</a:t>
             </a:r>
-            <a:endParaRPr lang="en-US" dirty="0"/>
+            <a:endParaRPr lang="en-US" sz="2000" dirty="0"/>
           </a:p>
           <a:p>
             <a:pPr marL="457200" indent="-457200">
@@ -11878,14 +11899,14 @@
               <a:buAutoNum type="arabicPeriod"/>
             </a:pPr>
             <a:r>
-              <a:rPr lang="en-US" dirty="0"/>
+              <a:rPr lang="en-US" sz="2000" dirty="0"/>
               <a:t>Docker-in-Docker </a:t>
             </a:r>
             <a:r>
-              <a:rPr lang="en-US" dirty="0" err="1"/>
+              <a:rPr lang="en-US" sz="2000" dirty="0" err="1"/>
               <a:t>einrichten</a:t>
             </a:r>
-            <a:endParaRPr lang="en-US" dirty="0"/>
+            <a:endParaRPr lang="en-US" sz="2000" dirty="0"/>
           </a:p>
           <a:p>
             <a:pPr marL="457200" indent="-457200">
@@ -11893,7 +11914,7 @@
               <a:buAutoNum type="arabicPeriod"/>
             </a:pPr>
             <a:r>
-              <a:rPr lang="en-US" dirty="0">
+              <a:rPr lang="en-US" sz="2000" dirty="0">
                 <a:solidFill>
                   <a:srgbClr val="FF0000"/>
                 </a:solidFill>
@@ -11902,11 +11923,11 @@
               <a:t>image</a:t>
             </a:r>
             <a:r>
-              <a:rPr lang="en-US" dirty="0"/>
+              <a:rPr lang="en-US" sz="2000" dirty="0"/>
               <a:t> und </a:t>
             </a:r>
             <a:r>
-              <a:rPr lang="en-US" dirty="0">
+              <a:rPr lang="en-US" sz="2000" dirty="0">
                 <a:solidFill>
                   <a:srgbClr val="FF0000"/>
                 </a:solidFill>
@@ -11915,22 +11936,22 @@
               <a:t>service</a:t>
             </a:r>
             <a:r>
-              <a:rPr lang="en-US" dirty="0"/>
+              <a:rPr lang="en-US" sz="2000" dirty="0"/>
               <a:t> auf die Registry </a:t>
             </a:r>
             <a:r>
-              <a:rPr lang="en-US" dirty="0" err="1"/>
+              <a:rPr lang="en-US" sz="2000" dirty="0" err="1"/>
               <a:t>zeigen</a:t>
             </a:r>
             <a:r>
-              <a:rPr lang="en-US" dirty="0"/>
+              <a:rPr lang="en-US" sz="2000" dirty="0"/>
               <a:t> </a:t>
             </a:r>
             <a:r>
-              <a:rPr lang="en-US" dirty="0" err="1"/>
+              <a:rPr lang="en-US" sz="2000" dirty="0" err="1"/>
               <a:t>lassen</a:t>
             </a:r>
-            <a:endParaRPr lang="en-US" dirty="0"/>
+            <a:endParaRPr lang="en-US" sz="2000" dirty="0"/>
           </a:p>
           <a:p>
             <a:pPr marL="457200" indent="-457200">
@@ -11938,7 +11959,7 @@
               <a:buAutoNum type="arabicPeriod"/>
             </a:pPr>
             <a:r>
-              <a:rPr lang="en-US" dirty="0">
+              <a:rPr lang="en-US" sz="2000" dirty="0">
                 <a:solidFill>
                   <a:srgbClr val="FF0000"/>
                 </a:solidFill>
@@ -11947,41 +11968,50 @@
               <a:t>alias</a:t>
             </a:r>
             <a:r>
-              <a:rPr lang="en-US" dirty="0"/>
+              <a:rPr lang="en-US" sz="2000" dirty="0"/>
               <a:t> </a:t>
             </a:r>
             <a:r>
-              <a:rPr lang="en-US" dirty="0" err="1"/>
+              <a:rPr lang="en-US" sz="2000" dirty="0" err="1"/>
               <a:t>hinzufügen</a:t>
             </a:r>
             <a:r>
-              <a:rPr lang="en-US" dirty="0"/>
+              <a:rPr lang="en-US" sz="2000" dirty="0"/>
               <a:t> für den </a:t>
             </a:r>
             <a:r>
-              <a:rPr lang="en-US" dirty="0">
+              <a:rPr lang="en-US" sz="2000" dirty="0">
                 <a:latin typeface="Consolas" panose="020B0609020204030204" pitchFamily="49" charset="0"/>
               </a:rPr>
               <a:t>service</a:t>
             </a:r>
+          </a:p>
+          <a:p>
+            <a:pPr marL="457200" indent="-457200">
+              <a:buFont typeface="+mj-lt"/>
+              <a:buAutoNum type="arabicPeriod"/>
+            </a:pPr>
+            <a:endParaRPr lang="en-US" sz="2000" dirty="0">
+              <a:latin typeface="Consolas" panose="020B0609020204030204" pitchFamily="49" charset="0"/>
+            </a:endParaRPr>
           </a:p>
           <a:p>
             <a:pPr marL="0" indent="0">
               <a:buNone/>
             </a:pPr>
             <a:r>
-              <a:rPr lang="en-US" sz="2000" dirty="0">
+              <a:rPr lang="en-US" sz="1800" dirty="0">
                 <a:latin typeface="Consolas" panose="020B0609020204030204" pitchFamily="49" charset="0"/>
               </a:rPr>
               <a:t>.</a:t>
             </a:r>
             <a:r>
-              <a:rPr lang="en-US" sz="2000" dirty="0" err="1">
+              <a:rPr lang="en-US" sz="1800" dirty="0" err="1">
                 <a:latin typeface="Consolas" panose="020B0609020204030204" pitchFamily="49" charset="0"/>
               </a:rPr>
               <a:t>gitlab-ci.yml</a:t>
             </a:r>
-            <a:endParaRPr lang="en-US" sz="2000" dirty="0">
+            <a:endParaRPr lang="en-US" sz="1800" dirty="0">
               <a:latin typeface="Consolas" panose="020B0609020204030204" pitchFamily="49" charset="0"/>
             </a:endParaRPr>
           </a:p>
@@ -12006,7 +12036,7 @@
               <a:defRPr/>
             </a:pPr>
             <a:r>
-              <a:rPr kumimoji="0" lang="en-US" sz="1600" b="0" i="0" u="none" strike="noStrike" kern="0" cap="none" spc="0" normalizeH="0" baseline="0" noProof="0" dirty="0">
+              <a:rPr kumimoji="0" lang="en-US" sz="1400" b="0" i="0" u="none" strike="noStrike" kern="0" cap="none" spc="0" normalizeH="0" baseline="0" noProof="0" dirty="0">
                 <a:ln>
                   <a:noFill/>
                 </a:ln>
@@ -12044,7 +12074,7 @@
               <a:defRPr/>
             </a:pPr>
             <a:r>
-              <a:rPr kumimoji="0" lang="en-US" sz="1600" b="0" i="0" u="none" strike="noStrike" kern="0" cap="none" spc="0" normalizeH="0" baseline="0" noProof="0" dirty="0">
+              <a:rPr kumimoji="0" lang="en-US" sz="1400" b="0" i="0" u="none" strike="noStrike" kern="0" cap="none" spc="0" normalizeH="0" baseline="0" noProof="0" dirty="0">
                 <a:ln>
                   <a:noFill/>
                 </a:ln>
@@ -12061,7 +12091,7 @@
               <a:t>  </a:t>
             </a:r>
             <a:r>
-              <a:rPr kumimoji="0" lang="en-US" sz="1600" b="0" i="0" u="none" strike="noStrike" kern="0" cap="none" spc="0" normalizeH="0" baseline="0" noProof="0" dirty="0">
+              <a:rPr kumimoji="0" lang="en-US" sz="1400" b="0" i="0" u="none" strike="noStrike" kern="0" cap="none" spc="0" normalizeH="0" baseline="0" noProof="0" dirty="0">
                 <a:ln>
                   <a:noFill/>
                 </a:ln>
@@ -12078,7 +12108,7 @@
               <a:t>image</a:t>
             </a:r>
             <a:r>
-              <a:rPr kumimoji="0" lang="en-US" sz="1600" b="0" i="0" u="none" strike="noStrike" kern="0" cap="none" spc="0" normalizeH="0" baseline="0" noProof="0" dirty="0">
+              <a:rPr kumimoji="0" lang="en-US" sz="1400" b="0" i="0" u="none" strike="noStrike" kern="0" cap="none" spc="0" normalizeH="0" baseline="0" noProof="0" dirty="0">
                 <a:ln>
                   <a:noFill/>
                 </a:ln>
@@ -12095,7 +12125,7 @@
               <a:t>: </a:t>
             </a:r>
             <a:r>
-              <a:rPr kumimoji="0" lang="en-US" sz="1600" b="0" i="0" u="none" strike="noStrike" kern="0" cap="none" spc="0" normalizeH="0" baseline="0" noProof="0" dirty="0">
+              <a:rPr kumimoji="0" lang="en-US" sz="1400" b="0" i="0" u="none" strike="noStrike" kern="0" cap="none" spc="0" normalizeH="0" baseline="0" noProof="0" dirty="0">
                 <a:ln>
                   <a:noFill/>
                 </a:ln>
@@ -12112,7 +12142,7 @@
               <a:t>${CI_DEPENDENCY_PROXY_GROUP_IMAGE_PREFIX}</a:t>
             </a:r>
             <a:r>
-              <a:rPr kumimoji="0" lang="en-US" sz="1600" b="0" i="0" u="none" strike="noStrike" kern="0" cap="none" spc="0" normalizeH="0" baseline="0" noProof="0" dirty="0">
+              <a:rPr kumimoji="0" lang="en-US" sz="1400" b="0" i="0" u="none" strike="noStrike" kern="0" cap="none" spc="0" normalizeH="0" baseline="0" noProof="0" dirty="0">
                 <a:ln>
                   <a:noFill/>
                 </a:ln>
@@ -12150,7 +12180,7 @@
               <a:defRPr/>
             </a:pPr>
             <a:r>
-              <a:rPr kumimoji="0" lang="en-US" sz="1600" b="0" i="0" u="none" strike="noStrike" kern="0" cap="none" spc="0" normalizeH="0" baseline="0" noProof="0" dirty="0">
+              <a:rPr kumimoji="0" lang="en-US" sz="1400" b="0" i="0" u="none" strike="noStrike" kern="0" cap="none" spc="0" normalizeH="0" baseline="0" noProof="0" dirty="0">
                 <a:ln>
                   <a:noFill/>
                 </a:ln>
@@ -12167,7 +12197,7 @@
               <a:t>  </a:t>
             </a:r>
             <a:r>
-              <a:rPr kumimoji="0" lang="en-US" sz="1600" b="0" i="0" u="none" strike="noStrike" kern="0" cap="none" spc="0" normalizeH="0" baseline="0" noProof="0" dirty="0">
+              <a:rPr kumimoji="0" lang="en-US" sz="1400" b="0" i="0" u="none" strike="noStrike" kern="0" cap="none" spc="0" normalizeH="0" baseline="0" noProof="0" dirty="0">
                 <a:ln>
                   <a:noFill/>
                 </a:ln>
@@ -12184,7 +12214,7 @@
               <a:t>services</a:t>
             </a:r>
             <a:r>
-              <a:rPr kumimoji="0" lang="en-US" sz="1600" b="0" i="0" u="none" strike="noStrike" kern="0" cap="none" spc="0" normalizeH="0" baseline="0" noProof="0" dirty="0">
+              <a:rPr kumimoji="0" lang="en-US" sz="1400" b="0" i="0" u="none" strike="noStrike" kern="0" cap="none" spc="0" normalizeH="0" baseline="0" noProof="0" dirty="0">
                 <a:ln>
                   <a:noFill/>
                 </a:ln>
@@ -12222,7 +12252,7 @@
               <a:defRPr/>
             </a:pPr>
             <a:r>
-              <a:rPr kumimoji="0" lang="en-US" sz="1600" b="0" i="0" u="none" strike="noStrike" kern="0" cap="none" spc="0" normalizeH="0" baseline="0" noProof="0" dirty="0">
+              <a:rPr kumimoji="0" lang="en-US" sz="1400" b="0" i="0" u="none" strike="noStrike" kern="0" cap="none" spc="0" normalizeH="0" baseline="0" noProof="0" dirty="0">
                 <a:ln>
                   <a:noFill/>
                 </a:ln>
@@ -12239,7 +12269,7 @@
               <a:t>    - name: </a:t>
             </a:r>
             <a:r>
-              <a:rPr kumimoji="0" lang="en-US" sz="1600" b="0" i="0" u="none" strike="noStrike" kern="0" cap="none" spc="0" normalizeH="0" baseline="0" noProof="0" dirty="0">
+              <a:rPr kumimoji="0" lang="en-US" sz="1400" b="0" i="0" u="none" strike="noStrike" kern="0" cap="none" spc="0" normalizeH="0" baseline="0" noProof="0" dirty="0">
                 <a:ln>
                   <a:noFill/>
                 </a:ln>
@@ -12256,7 +12286,7 @@
               <a:t>${CI_DEPENDENCY_PROXY_GROUP_IMAGE_PREFIX}</a:t>
             </a:r>
             <a:r>
-              <a:rPr kumimoji="0" lang="en-US" sz="1600" b="0" i="0" u="none" strike="noStrike" kern="0" cap="none" spc="0" normalizeH="0" baseline="0" noProof="0" dirty="0">
+              <a:rPr kumimoji="0" lang="en-US" sz="1400" b="0" i="0" u="none" strike="noStrike" kern="0" cap="none" spc="0" normalizeH="0" baseline="0" noProof="0" dirty="0">
                 <a:ln>
                   <a:noFill/>
                 </a:ln>
@@ -12294,7 +12324,7 @@
               <a:defRPr/>
             </a:pPr>
             <a:r>
-              <a:rPr kumimoji="0" lang="en-US" sz="1600" b="0" i="0" u="none" strike="noStrike" kern="0" cap="none" spc="0" normalizeH="0" baseline="0" noProof="0" dirty="0">
+              <a:rPr kumimoji="0" lang="en-US" sz="1400" b="0" i="0" u="none" strike="noStrike" kern="0" cap="none" spc="0" normalizeH="0" baseline="0" noProof="0" dirty="0">
                 <a:ln>
                   <a:noFill/>
                 </a:ln>
@@ -12311,7 +12341,7 @@
               <a:t>      </a:t>
             </a:r>
             <a:r>
-              <a:rPr kumimoji="0" lang="en-US" sz="1600" b="0" i="0" u="none" strike="noStrike" kern="0" cap="none" spc="0" normalizeH="0" baseline="0" noProof="0" dirty="0">
+              <a:rPr kumimoji="0" lang="en-US" sz="1400" b="0" i="0" u="none" strike="noStrike" kern="0" cap="none" spc="0" normalizeH="0" baseline="0" noProof="0" dirty="0">
                 <a:ln>
                   <a:noFill/>
                 </a:ln>
@@ -12328,7 +12358,7 @@
               <a:t>alias</a:t>
             </a:r>
             <a:r>
-              <a:rPr kumimoji="0" lang="en-US" sz="1600" b="0" i="0" u="none" strike="noStrike" kern="0" cap="none" spc="0" normalizeH="0" baseline="0" noProof="0" dirty="0">
+              <a:rPr kumimoji="0" lang="en-US" sz="1400" b="0" i="0" u="none" strike="noStrike" kern="0" cap="none" spc="0" normalizeH="0" baseline="0" noProof="0" dirty="0">
                 <a:ln>
                   <a:noFill/>
                 </a:ln>
@@ -12366,7 +12396,7 @@
               <a:defRPr/>
             </a:pPr>
             <a:r>
-              <a:rPr kumimoji="0" lang="en-US" sz="1600" b="0" i="0" u="none" strike="noStrike" kern="0" cap="none" spc="0" normalizeH="0" baseline="0" noProof="0" dirty="0">
+              <a:rPr kumimoji="0" lang="en-US" sz="1400" b="0" i="0" u="none" strike="noStrike" kern="0" cap="none" spc="0" normalizeH="0" baseline="0" noProof="0" dirty="0">
                 <a:ln>
                   <a:noFill/>
                 </a:ln>
@@ -12404,7 +12434,7 @@
               <a:defRPr/>
             </a:pPr>
             <a:r>
-              <a:rPr kumimoji="0" lang="en-US" sz="1600" b="0" i="0" u="none" strike="noStrike" kern="0" cap="none" spc="0" normalizeH="0" baseline="0" noProof="0" dirty="0">
+              <a:rPr kumimoji="0" lang="en-US" sz="1400" b="0" i="0" u="none" strike="noStrike" kern="0" cap="none" spc="0" normalizeH="0" baseline="0" noProof="0" dirty="0">
                 <a:ln>
                   <a:noFill/>
                 </a:ln>
@@ -12442,7 +12472,7 @@
               <a:defRPr/>
             </a:pPr>
             <a:r>
-              <a:rPr kumimoji="0" lang="en-US" sz="1600" b="0" i="0" u="none" strike="noStrike" kern="0" cap="none" spc="0" normalizeH="0" baseline="0" noProof="0" dirty="0">
+              <a:rPr kumimoji="0" lang="en-US" sz="1400" b="0" i="0" u="none" strike="noStrike" kern="0" cap="none" spc="0" normalizeH="0" baseline="0" noProof="0" dirty="0">
                 <a:ln>
                   <a:noFill/>
                 </a:ln>
@@ -12480,7 +12510,7 @@
               <a:defRPr/>
             </a:pPr>
             <a:r>
-              <a:rPr kumimoji="0" lang="en-US" sz="1600" b="0" i="0" u="none" strike="noStrike" kern="0" cap="none" spc="0" normalizeH="0" baseline="0" noProof="0" dirty="0">
+              <a:rPr kumimoji="0" lang="en-US" sz="1400" b="0" i="0" u="none" strike="noStrike" kern="0" cap="none" spc="0" normalizeH="0" baseline="0" noProof="0" dirty="0">
                 <a:ln>
                   <a:noFill/>
                 </a:ln>
@@ -12496,7 +12526,7 @@
               </a:rPr>
               <a:t>    - docker run my-docker-image /script/to/run/tests</a:t>
             </a:r>
-            <a:endParaRPr kumimoji="0" lang="en-US" sz="1200" b="0" i="0" u="none" strike="noStrike" kern="0" cap="none" spc="0" normalizeH="0" baseline="0" noProof="0" dirty="0">
+            <a:endParaRPr kumimoji="0" lang="en-US" sz="1100" b="0" i="0" u="none" strike="noStrike" kern="0" cap="none" spc="0" normalizeH="0" baseline="0" noProof="0" dirty="0">
               <a:ln>
                 <a:noFill/>
               </a:ln>
@@ -14113,7 +14143,7 @@
 </file>
 
 <file path=ppt/slides/slide32.xml><?xml version="1.0" encoding="utf-8"?>
-<p:sld xmlns:a="http://schemas.openxmlformats.org/drawingml/2006/main" xmlns:r="http://schemas.openxmlformats.org/officeDocument/2006/relationships" xmlns:p="http://schemas.openxmlformats.org/presentationml/2006/main" show="0">
+<p:sld xmlns:a="http://schemas.openxmlformats.org/drawingml/2006/main" xmlns:r="http://schemas.openxmlformats.org/officeDocument/2006/relationships" xmlns:p="http://schemas.openxmlformats.org/presentationml/2006/main">
   <p:cSld>
     <p:spTree>
       <p:nvGrpSpPr>
@@ -14192,7 +14222,7 @@
             </a:pPr>
             <a:r>
               <a:rPr lang="de-DE" b="1" dirty="0"/>
-              <a:t>Aufgabe: Simple Docker-in-Docker </a:t>
+              <a:t>Aufgabe 1: Simple Docker-in-Docker </a:t>
             </a:r>
             <a:r>
               <a:rPr lang="de-DE" b="1" dirty="0" err="1"/>
@@ -14474,7 +14504,7 @@
 </file>
 
 <file path=ppt/slides/slide33.xml><?xml version="1.0" encoding="utf-8"?>
-<p:sld xmlns:a="http://schemas.openxmlformats.org/drawingml/2006/main" xmlns:r="http://schemas.openxmlformats.org/officeDocument/2006/relationships" xmlns:p="http://schemas.openxmlformats.org/presentationml/2006/main" show="0">
+<p:sld xmlns:a="http://schemas.openxmlformats.org/drawingml/2006/main" xmlns:r="http://schemas.openxmlformats.org/officeDocument/2006/relationships" xmlns:p="http://schemas.openxmlformats.org/presentationml/2006/main">
   <p:cSld>
     <p:spTree>
       <p:nvGrpSpPr>
@@ -14553,7 +14583,7 @@
             </a:pPr>
             <a:r>
               <a:rPr lang="de-DE" b="1" dirty="0"/>
-              <a:t>Aufgabe: Docker-in-Docker mit Variablen erweitern</a:t>
+              <a:t>Aufgabe 2: Docker-in-Docker mit Variablen erweitern</a:t>
             </a:r>
           </a:p>
           <a:p>
@@ -14753,7 +14783,7 @@
 </file>
 
 <file path=ppt/slides/slide34.xml><?xml version="1.0" encoding="utf-8"?>
-<p:sld xmlns:a="http://schemas.openxmlformats.org/drawingml/2006/main" xmlns:r="http://schemas.openxmlformats.org/officeDocument/2006/relationships" xmlns:p="http://schemas.openxmlformats.org/presentationml/2006/main" show="0">
+<p:sld xmlns:a="http://schemas.openxmlformats.org/drawingml/2006/main" xmlns:r="http://schemas.openxmlformats.org/officeDocument/2006/relationships" xmlns:p="http://schemas.openxmlformats.org/presentationml/2006/main">
   <p:cSld>
     <p:spTree>
       <p:nvGrpSpPr>
@@ -14832,35 +14862,349 @@
             </a:pPr>
             <a:r>
               <a:rPr lang="de-DE" b="1" dirty="0"/>
-              <a:t>Container Registry Beispiele</a:t>
-            </a:r>
-          </a:p>
-          <a:p>
-            <a:pPr>
-              <a:buFont typeface="Arial" panose="020B0604020202020204" pitchFamily="34" charset="0"/>
-              <a:buChar char="•"/>
-            </a:pPr>
-            <a:r>
-              <a:rPr lang="de-DE" dirty="0"/>
-              <a:t>Simples Docker-in-Docker</a:t>
-            </a:r>
-          </a:p>
-          <a:p>
-            <a:pPr>
-              <a:buFont typeface="Arial" panose="020B0604020202020204" pitchFamily="34" charset="0"/>
-              <a:buChar char="•"/>
-            </a:pPr>
-            <a:r>
-              <a:rPr lang="de-DE" dirty="0"/>
-              <a:t>Docker-in-Docker mit Variablen</a:t>
-            </a:r>
+              <a:t>Lösung 1: Simples Docker-in-Docker</a:t>
+            </a:r>
+          </a:p>
+          <a:p>
+            <a:pPr marL="0" indent="0">
+              <a:buNone/>
+            </a:pPr>
+            <a:r>
+              <a:rPr lang="de-DE" sz="2000" dirty="0">
+                <a:latin typeface="Consolas" panose="020B0609020204030204" pitchFamily="49" charset="0"/>
+              </a:rPr>
+              <a:t>.</a:t>
+            </a:r>
+            <a:r>
+              <a:rPr lang="de-DE" sz="2000" dirty="0" err="1">
+                <a:latin typeface="Consolas" panose="020B0609020204030204" pitchFamily="49" charset="0"/>
+              </a:rPr>
+              <a:t>gitlab-ci.yml</a:t>
+            </a:r>
+            <a:r>
+              <a:rPr lang="de-DE" sz="2000" dirty="0">
+                <a:latin typeface="Consolas" panose="020B0609020204030204" pitchFamily="49" charset="0"/>
+              </a:rPr>
+              <a:t>:</a:t>
+            </a:r>
+          </a:p>
+          <a:p>
+            <a:pPr marL="0" indent="0">
+              <a:buNone/>
+            </a:pPr>
+            <a:r>
+              <a:rPr lang="de-DE" sz="1400" dirty="0" err="1">
+                <a:latin typeface="Consolas" panose="020B0609020204030204" pitchFamily="49" charset="0"/>
+              </a:rPr>
+              <a:t>build</a:t>
+            </a:r>
+            <a:r>
+              <a:rPr lang="de-DE" sz="1400" dirty="0">
+                <a:latin typeface="Consolas" panose="020B0609020204030204" pitchFamily="49" charset="0"/>
+              </a:rPr>
+              <a:t>:</a:t>
+            </a:r>
+          </a:p>
+          <a:p>
+            <a:pPr marL="0" indent="0">
+              <a:buNone/>
+            </a:pPr>
+            <a:r>
+              <a:rPr lang="de-DE" sz="1400" dirty="0">
+                <a:latin typeface="Consolas" panose="020B0609020204030204" pitchFamily="49" charset="0"/>
+              </a:rPr>
+              <a:t>  </a:t>
+            </a:r>
+            <a:r>
+              <a:rPr lang="de-DE" sz="1400" dirty="0" err="1">
+                <a:latin typeface="Consolas" panose="020B0609020204030204" pitchFamily="49" charset="0"/>
+              </a:rPr>
+              <a:t>image</a:t>
+            </a:r>
+            <a:r>
+              <a:rPr lang="de-DE" sz="1400" dirty="0">
+                <a:latin typeface="Consolas" panose="020B0609020204030204" pitchFamily="49" charset="0"/>
+              </a:rPr>
+              <a:t>: docker:20.10.16</a:t>
+            </a:r>
+          </a:p>
+          <a:p>
+            <a:pPr marL="0" indent="0">
+              <a:buNone/>
+            </a:pPr>
+            <a:r>
+              <a:rPr lang="de-DE" sz="1400" dirty="0">
+                <a:latin typeface="Consolas" panose="020B0609020204030204" pitchFamily="49" charset="0"/>
+              </a:rPr>
+              <a:t>  </a:t>
+            </a:r>
+            <a:r>
+              <a:rPr lang="de-DE" sz="1400" dirty="0" err="1">
+                <a:latin typeface="Consolas" panose="020B0609020204030204" pitchFamily="49" charset="0"/>
+              </a:rPr>
+              <a:t>stage</a:t>
+            </a:r>
+            <a:r>
+              <a:rPr lang="de-DE" sz="1400" dirty="0">
+                <a:latin typeface="Consolas" panose="020B0609020204030204" pitchFamily="49" charset="0"/>
+              </a:rPr>
+              <a:t>: </a:t>
+            </a:r>
+            <a:r>
+              <a:rPr lang="de-DE" sz="1400" dirty="0" err="1">
+                <a:latin typeface="Consolas" panose="020B0609020204030204" pitchFamily="49" charset="0"/>
+              </a:rPr>
+              <a:t>build</a:t>
+            </a:r>
+            <a:endParaRPr lang="de-DE" sz="1400" dirty="0">
+              <a:latin typeface="Consolas" panose="020B0609020204030204" pitchFamily="49" charset="0"/>
+            </a:endParaRPr>
+          </a:p>
+          <a:p>
+            <a:pPr marL="0" indent="0">
+              <a:buNone/>
+            </a:pPr>
+            <a:r>
+              <a:rPr lang="de-DE" sz="1400" dirty="0">
+                <a:latin typeface="Consolas" panose="020B0609020204030204" pitchFamily="49" charset="0"/>
+              </a:rPr>
+              <a:t>  </a:t>
+            </a:r>
+            <a:r>
+              <a:rPr lang="de-DE" sz="1400" dirty="0" err="1">
+                <a:latin typeface="Consolas" panose="020B0609020204030204" pitchFamily="49" charset="0"/>
+              </a:rPr>
+              <a:t>services</a:t>
+            </a:r>
+            <a:r>
+              <a:rPr lang="de-DE" sz="1400" dirty="0">
+                <a:latin typeface="Consolas" panose="020B0609020204030204" pitchFamily="49" charset="0"/>
+              </a:rPr>
+              <a:t>:</a:t>
+            </a:r>
+          </a:p>
+          <a:p>
+            <a:pPr marL="0" indent="0">
+              <a:buNone/>
+            </a:pPr>
+            <a:r>
+              <a:rPr lang="de-DE" sz="1400" dirty="0">
+                <a:latin typeface="Consolas" panose="020B0609020204030204" pitchFamily="49" charset="0"/>
+              </a:rPr>
+              <a:t>    - docker:20.10.16-dind</a:t>
+            </a:r>
+          </a:p>
+          <a:p>
+            <a:pPr marL="0" indent="0">
+              <a:buNone/>
+            </a:pPr>
+            <a:r>
+              <a:rPr lang="de-DE" sz="1400" dirty="0">
+                <a:latin typeface="Consolas" panose="020B0609020204030204" pitchFamily="49" charset="0"/>
+              </a:rPr>
+              <a:t>      alias: </a:t>
+            </a:r>
+            <a:r>
+              <a:rPr lang="de-DE" sz="1400" dirty="0" err="1">
+                <a:latin typeface="Consolas" panose="020B0609020204030204" pitchFamily="49" charset="0"/>
+              </a:rPr>
+              <a:t>docker</a:t>
+            </a:r>
+            <a:endParaRPr lang="de-DE" sz="1400" dirty="0">
+              <a:latin typeface="Consolas" panose="020B0609020204030204" pitchFamily="49" charset="0"/>
+            </a:endParaRPr>
+          </a:p>
+          <a:p>
+            <a:pPr marL="0" indent="0">
+              <a:buNone/>
+            </a:pPr>
+            <a:r>
+              <a:rPr lang="de-DE" sz="1400" dirty="0">
+                <a:latin typeface="Consolas" panose="020B0609020204030204" pitchFamily="49" charset="0"/>
+              </a:rPr>
+              <a:t>  </a:t>
+            </a:r>
+            <a:r>
+              <a:rPr lang="de-DE" sz="1400" dirty="0" err="1">
+                <a:latin typeface="Consolas" panose="020B0609020204030204" pitchFamily="49" charset="0"/>
+              </a:rPr>
+              <a:t>script</a:t>
+            </a:r>
+            <a:r>
+              <a:rPr lang="de-DE" sz="1400" dirty="0">
+                <a:latin typeface="Consolas" panose="020B0609020204030204" pitchFamily="49" charset="0"/>
+              </a:rPr>
+              <a:t>:</a:t>
+            </a:r>
+          </a:p>
+          <a:p>
+            <a:pPr marL="0" indent="0">
+              <a:buNone/>
+            </a:pPr>
+            <a:r>
+              <a:rPr lang="de-DE" sz="1400" dirty="0">
+                <a:latin typeface="Consolas" panose="020B0609020204030204" pitchFamily="49" charset="0"/>
+              </a:rPr>
+              <a:t>    - </a:t>
+            </a:r>
+            <a:r>
+              <a:rPr lang="de-DE" sz="1400" dirty="0" err="1">
+                <a:latin typeface="Consolas" panose="020B0609020204030204" pitchFamily="49" charset="0"/>
+              </a:rPr>
+              <a:t>docker</a:t>
+            </a:r>
+            <a:r>
+              <a:rPr lang="de-DE" sz="1400" dirty="0">
+                <a:latin typeface="Consolas" panose="020B0609020204030204" pitchFamily="49" charset="0"/>
+              </a:rPr>
+              <a:t> </a:t>
+            </a:r>
+            <a:r>
+              <a:rPr lang="de-DE" sz="1400" dirty="0" err="1">
+                <a:latin typeface="Consolas" panose="020B0609020204030204" pitchFamily="49" charset="0"/>
+              </a:rPr>
+              <a:t>login</a:t>
+            </a:r>
+            <a:r>
+              <a:rPr lang="de-DE" sz="1400" dirty="0">
+                <a:latin typeface="Consolas" panose="020B0609020204030204" pitchFamily="49" charset="0"/>
+              </a:rPr>
+              <a:t> -u $CI_REGISTRY_USER -p $CI_REGISTRY_PASSWORD $CI_REGISTRY</a:t>
+            </a:r>
+          </a:p>
+          <a:p>
+            <a:pPr marL="0" indent="0">
+              <a:buNone/>
+            </a:pPr>
+            <a:r>
+              <a:rPr lang="de-DE" sz="1400" dirty="0">
+                <a:latin typeface="Consolas" panose="020B0609020204030204" pitchFamily="49" charset="0"/>
+              </a:rPr>
+              <a:t>    - </a:t>
+            </a:r>
+            <a:r>
+              <a:rPr lang="de-DE" sz="1400" dirty="0" err="1">
+                <a:latin typeface="Consolas" panose="020B0609020204030204" pitchFamily="49" charset="0"/>
+              </a:rPr>
+              <a:t>docker</a:t>
+            </a:r>
+            <a:r>
+              <a:rPr lang="de-DE" sz="1400" dirty="0">
+                <a:latin typeface="Consolas" panose="020B0609020204030204" pitchFamily="49" charset="0"/>
+              </a:rPr>
+              <a:t> </a:t>
+            </a:r>
+            <a:r>
+              <a:rPr lang="de-DE" sz="1400" dirty="0" err="1">
+                <a:latin typeface="Consolas" panose="020B0609020204030204" pitchFamily="49" charset="0"/>
+              </a:rPr>
+              <a:t>build</a:t>
+            </a:r>
+            <a:r>
+              <a:rPr lang="de-DE" sz="1400" dirty="0">
+                <a:latin typeface="Consolas" panose="020B0609020204030204" pitchFamily="49" charset="0"/>
+              </a:rPr>
+              <a:t> -t $CI_REGISTRY/</a:t>
+            </a:r>
+            <a:r>
+              <a:rPr lang="de-DE" sz="1400" dirty="0" err="1">
+                <a:latin typeface="Consolas" panose="020B0609020204030204" pitchFamily="49" charset="0"/>
+              </a:rPr>
+              <a:t>group</a:t>
+            </a:r>
+            <a:r>
+              <a:rPr lang="de-DE" sz="1400" dirty="0">
+                <a:latin typeface="Consolas" panose="020B0609020204030204" pitchFamily="49" charset="0"/>
+              </a:rPr>
+              <a:t>/</a:t>
+            </a:r>
+            <a:r>
+              <a:rPr lang="de-DE" sz="1400" dirty="0" err="1">
+                <a:latin typeface="Consolas" panose="020B0609020204030204" pitchFamily="49" charset="0"/>
+              </a:rPr>
+              <a:t>project</a:t>
+            </a:r>
+            <a:r>
+              <a:rPr lang="de-DE" sz="1400" dirty="0">
+                <a:latin typeface="Consolas" panose="020B0609020204030204" pitchFamily="49" charset="0"/>
+              </a:rPr>
+              <a:t>/</a:t>
+            </a:r>
+            <a:r>
+              <a:rPr lang="de-DE" sz="1400" dirty="0" err="1">
+                <a:latin typeface="Consolas" panose="020B0609020204030204" pitchFamily="49" charset="0"/>
+              </a:rPr>
+              <a:t>image:latest</a:t>
+            </a:r>
+            <a:r>
+              <a:rPr lang="de-DE" sz="1400" dirty="0">
+                <a:latin typeface="Consolas" panose="020B0609020204030204" pitchFamily="49" charset="0"/>
+              </a:rPr>
+              <a:t> .</a:t>
+            </a:r>
+          </a:p>
+          <a:p>
+            <a:pPr marL="0" indent="0">
+              <a:buNone/>
+            </a:pPr>
+            <a:r>
+              <a:rPr lang="de-DE" sz="1400" dirty="0">
+                <a:latin typeface="Consolas" panose="020B0609020204030204" pitchFamily="49" charset="0"/>
+              </a:rPr>
+              <a:t>    - </a:t>
+            </a:r>
+            <a:r>
+              <a:rPr lang="de-DE" sz="1400" dirty="0" err="1">
+                <a:latin typeface="Consolas" panose="020B0609020204030204" pitchFamily="49" charset="0"/>
+              </a:rPr>
+              <a:t>docker</a:t>
+            </a:r>
+            <a:r>
+              <a:rPr lang="de-DE" sz="1400" dirty="0">
+                <a:latin typeface="Consolas" panose="020B0609020204030204" pitchFamily="49" charset="0"/>
+              </a:rPr>
+              <a:t> push $CI_REGISTRY/</a:t>
+            </a:r>
+            <a:r>
+              <a:rPr lang="de-DE" sz="1400" dirty="0" err="1">
+                <a:latin typeface="Consolas" panose="020B0609020204030204" pitchFamily="49" charset="0"/>
+              </a:rPr>
+              <a:t>group</a:t>
+            </a:r>
+            <a:r>
+              <a:rPr lang="de-DE" sz="1400" dirty="0">
+                <a:latin typeface="Consolas" panose="020B0609020204030204" pitchFamily="49" charset="0"/>
+              </a:rPr>
+              <a:t>/</a:t>
+            </a:r>
+            <a:r>
+              <a:rPr lang="de-DE" sz="1400" dirty="0" err="1">
+                <a:latin typeface="Consolas" panose="020B0609020204030204" pitchFamily="49" charset="0"/>
+              </a:rPr>
+              <a:t>project</a:t>
+            </a:r>
+            <a:r>
+              <a:rPr lang="de-DE" sz="1400" dirty="0">
+                <a:latin typeface="Consolas" panose="020B0609020204030204" pitchFamily="49" charset="0"/>
+              </a:rPr>
+              <a:t>/</a:t>
+            </a:r>
+            <a:r>
+              <a:rPr lang="de-DE" sz="1400" dirty="0" err="1">
+                <a:latin typeface="Consolas" panose="020B0609020204030204" pitchFamily="49" charset="0"/>
+              </a:rPr>
+              <a:t>image:latest</a:t>
+            </a:r>
+            <a:endParaRPr lang="de-DE" sz="1400" dirty="0">
+              <a:latin typeface="Consolas" panose="020B0609020204030204" pitchFamily="49" charset="0"/>
+            </a:endParaRPr>
           </a:p>
         </p:txBody>
       </p:sp>
     </p:spTree>
     <p:extLst>
       <p:ext uri="{BB962C8B-B14F-4D97-AF65-F5344CB8AC3E}">
-        <p14:creationId xmlns:p14="http://schemas.microsoft.com/office/powerpoint/2010/main" val="1965332827"/>
+        <p14:creationId xmlns:p14="http://schemas.microsoft.com/office/powerpoint/2010/main" val="3629727755"/>
       </p:ext>
     </p:extLst>
   </p:cSld>
@@ -14871,7 +15215,7 @@
 </file>
 
 <file path=ppt/slides/slide35.xml><?xml version="1.0" encoding="utf-8"?>
-<p:sld xmlns:a="http://schemas.openxmlformats.org/drawingml/2006/main" xmlns:r="http://schemas.openxmlformats.org/officeDocument/2006/relationships" xmlns:p="http://schemas.openxmlformats.org/presentationml/2006/main" show="0">
+<p:sld xmlns:a="http://schemas.openxmlformats.org/drawingml/2006/main" xmlns:r="http://schemas.openxmlformats.org/officeDocument/2006/relationships" xmlns:p="http://schemas.openxmlformats.org/presentationml/2006/main">
   <p:cSld>
     <p:spTree>
       <p:nvGrpSpPr>
@@ -14950,439 +15294,7 @@
             </a:pPr>
             <a:r>
               <a:rPr lang="de-DE" b="1" dirty="0"/>
-              <a:t>Simples Docker-in-Docker</a:t>
-            </a:r>
-          </a:p>
-          <a:p>
-            <a:pPr marL="0" indent="0">
-              <a:buNone/>
-            </a:pPr>
-            <a:r>
-              <a:rPr lang="de-DE" sz="2000" dirty="0">
-                <a:latin typeface="Consolas" panose="020B0609020204030204" pitchFamily="49" charset="0"/>
-              </a:rPr>
-              <a:t>.</a:t>
-            </a:r>
-            <a:r>
-              <a:rPr lang="de-DE" sz="2000" dirty="0" err="1">
-                <a:latin typeface="Consolas" panose="020B0609020204030204" pitchFamily="49" charset="0"/>
-              </a:rPr>
-              <a:t>gitlab-ci.yml</a:t>
-            </a:r>
-            <a:r>
-              <a:rPr lang="de-DE" sz="2000" dirty="0">
-                <a:latin typeface="Consolas" panose="020B0609020204030204" pitchFamily="49" charset="0"/>
-              </a:rPr>
-              <a:t>:</a:t>
-            </a:r>
-          </a:p>
-          <a:p>
-            <a:pPr marL="0" indent="0">
-              <a:buNone/>
-            </a:pPr>
-            <a:r>
-              <a:rPr lang="de-DE" sz="1400" dirty="0" err="1">
-                <a:latin typeface="Consolas" panose="020B0609020204030204" pitchFamily="49" charset="0"/>
-              </a:rPr>
-              <a:t>build</a:t>
-            </a:r>
-            <a:r>
-              <a:rPr lang="de-DE" sz="1400" dirty="0">
-                <a:latin typeface="Consolas" panose="020B0609020204030204" pitchFamily="49" charset="0"/>
-              </a:rPr>
-              <a:t>:</a:t>
-            </a:r>
-          </a:p>
-          <a:p>
-            <a:pPr marL="0" indent="0">
-              <a:buNone/>
-            </a:pPr>
-            <a:r>
-              <a:rPr lang="de-DE" sz="1400" dirty="0">
-                <a:latin typeface="Consolas" panose="020B0609020204030204" pitchFamily="49" charset="0"/>
-              </a:rPr>
-              <a:t>  </a:t>
-            </a:r>
-            <a:r>
-              <a:rPr lang="de-DE" sz="1400" dirty="0" err="1">
-                <a:latin typeface="Consolas" panose="020B0609020204030204" pitchFamily="49" charset="0"/>
-              </a:rPr>
-              <a:t>image</a:t>
-            </a:r>
-            <a:r>
-              <a:rPr lang="de-DE" sz="1400" dirty="0">
-                <a:latin typeface="Consolas" panose="020B0609020204030204" pitchFamily="49" charset="0"/>
-              </a:rPr>
-              <a:t>: docker:20.10.16</a:t>
-            </a:r>
-          </a:p>
-          <a:p>
-            <a:pPr marL="0" indent="0">
-              <a:buNone/>
-            </a:pPr>
-            <a:r>
-              <a:rPr lang="de-DE" sz="1400" dirty="0">
-                <a:latin typeface="Consolas" panose="020B0609020204030204" pitchFamily="49" charset="0"/>
-              </a:rPr>
-              <a:t>  </a:t>
-            </a:r>
-            <a:r>
-              <a:rPr lang="de-DE" sz="1400" dirty="0" err="1">
-                <a:latin typeface="Consolas" panose="020B0609020204030204" pitchFamily="49" charset="0"/>
-              </a:rPr>
-              <a:t>stage</a:t>
-            </a:r>
-            <a:r>
-              <a:rPr lang="de-DE" sz="1400" dirty="0">
-                <a:latin typeface="Consolas" panose="020B0609020204030204" pitchFamily="49" charset="0"/>
-              </a:rPr>
-              <a:t>: </a:t>
-            </a:r>
-            <a:r>
-              <a:rPr lang="de-DE" sz="1400" dirty="0" err="1">
-                <a:latin typeface="Consolas" panose="020B0609020204030204" pitchFamily="49" charset="0"/>
-              </a:rPr>
-              <a:t>build</a:t>
-            </a:r>
-            <a:endParaRPr lang="de-DE" sz="1400" dirty="0">
-              <a:latin typeface="Consolas" panose="020B0609020204030204" pitchFamily="49" charset="0"/>
-            </a:endParaRPr>
-          </a:p>
-          <a:p>
-            <a:pPr marL="0" indent="0">
-              <a:buNone/>
-            </a:pPr>
-            <a:r>
-              <a:rPr lang="de-DE" sz="1400" dirty="0">
-                <a:latin typeface="Consolas" panose="020B0609020204030204" pitchFamily="49" charset="0"/>
-              </a:rPr>
-              <a:t>  </a:t>
-            </a:r>
-            <a:r>
-              <a:rPr lang="de-DE" sz="1400" dirty="0" err="1">
-                <a:latin typeface="Consolas" panose="020B0609020204030204" pitchFamily="49" charset="0"/>
-              </a:rPr>
-              <a:t>services</a:t>
-            </a:r>
-            <a:r>
-              <a:rPr lang="de-DE" sz="1400" dirty="0">
-                <a:latin typeface="Consolas" panose="020B0609020204030204" pitchFamily="49" charset="0"/>
-              </a:rPr>
-              <a:t>:</a:t>
-            </a:r>
-          </a:p>
-          <a:p>
-            <a:pPr marL="0" indent="0">
-              <a:buNone/>
-            </a:pPr>
-            <a:r>
-              <a:rPr lang="de-DE" sz="1400" dirty="0">
-                <a:latin typeface="Consolas" panose="020B0609020204030204" pitchFamily="49" charset="0"/>
-              </a:rPr>
-              <a:t>    - docker:20.10.16-dind</a:t>
-            </a:r>
-          </a:p>
-          <a:p>
-            <a:pPr marL="0" indent="0">
-              <a:buNone/>
-            </a:pPr>
-            <a:r>
-              <a:rPr lang="de-DE" sz="1400" dirty="0">
-                <a:latin typeface="Consolas" panose="020B0609020204030204" pitchFamily="49" charset="0"/>
-              </a:rPr>
-              <a:t>      alias: </a:t>
-            </a:r>
-            <a:r>
-              <a:rPr lang="de-DE" sz="1400" dirty="0" err="1">
-                <a:latin typeface="Consolas" panose="020B0609020204030204" pitchFamily="49" charset="0"/>
-              </a:rPr>
-              <a:t>docker</a:t>
-            </a:r>
-            <a:endParaRPr lang="de-DE" sz="1400" dirty="0">
-              <a:latin typeface="Consolas" panose="020B0609020204030204" pitchFamily="49" charset="0"/>
-            </a:endParaRPr>
-          </a:p>
-          <a:p>
-            <a:pPr marL="0" indent="0">
-              <a:buNone/>
-            </a:pPr>
-            <a:r>
-              <a:rPr lang="de-DE" sz="1400" dirty="0">
-                <a:latin typeface="Consolas" panose="020B0609020204030204" pitchFamily="49" charset="0"/>
-              </a:rPr>
-              <a:t>  </a:t>
-            </a:r>
-            <a:r>
-              <a:rPr lang="de-DE" sz="1400" dirty="0" err="1">
-                <a:latin typeface="Consolas" panose="020B0609020204030204" pitchFamily="49" charset="0"/>
-              </a:rPr>
-              <a:t>script</a:t>
-            </a:r>
-            <a:r>
-              <a:rPr lang="de-DE" sz="1400" dirty="0">
-                <a:latin typeface="Consolas" panose="020B0609020204030204" pitchFamily="49" charset="0"/>
-              </a:rPr>
-              <a:t>:</a:t>
-            </a:r>
-          </a:p>
-          <a:p>
-            <a:pPr marL="0" indent="0">
-              <a:buNone/>
-            </a:pPr>
-            <a:r>
-              <a:rPr lang="de-DE" sz="1400" dirty="0">
-                <a:latin typeface="Consolas" panose="020B0609020204030204" pitchFamily="49" charset="0"/>
-              </a:rPr>
-              <a:t>    - </a:t>
-            </a:r>
-            <a:r>
-              <a:rPr lang="de-DE" sz="1400" dirty="0" err="1">
-                <a:latin typeface="Consolas" panose="020B0609020204030204" pitchFamily="49" charset="0"/>
-              </a:rPr>
-              <a:t>docker</a:t>
-            </a:r>
-            <a:r>
-              <a:rPr lang="de-DE" sz="1400" dirty="0">
-                <a:latin typeface="Consolas" panose="020B0609020204030204" pitchFamily="49" charset="0"/>
-              </a:rPr>
-              <a:t> </a:t>
-            </a:r>
-            <a:r>
-              <a:rPr lang="de-DE" sz="1400" dirty="0" err="1">
-                <a:latin typeface="Consolas" panose="020B0609020204030204" pitchFamily="49" charset="0"/>
-              </a:rPr>
-              <a:t>login</a:t>
-            </a:r>
-            <a:r>
-              <a:rPr lang="de-DE" sz="1400" dirty="0">
-                <a:latin typeface="Consolas" panose="020B0609020204030204" pitchFamily="49" charset="0"/>
-              </a:rPr>
-              <a:t> -u $CI_REGISTRY_USER -p $CI_REGISTRY_PASSWORD $CI_REGISTRY</a:t>
-            </a:r>
-          </a:p>
-          <a:p>
-            <a:pPr marL="0" indent="0">
-              <a:buNone/>
-            </a:pPr>
-            <a:r>
-              <a:rPr lang="de-DE" sz="1400" dirty="0">
-                <a:latin typeface="Consolas" panose="020B0609020204030204" pitchFamily="49" charset="0"/>
-              </a:rPr>
-              <a:t>    - </a:t>
-            </a:r>
-            <a:r>
-              <a:rPr lang="de-DE" sz="1400" dirty="0" err="1">
-                <a:latin typeface="Consolas" panose="020B0609020204030204" pitchFamily="49" charset="0"/>
-              </a:rPr>
-              <a:t>docker</a:t>
-            </a:r>
-            <a:r>
-              <a:rPr lang="de-DE" sz="1400" dirty="0">
-                <a:latin typeface="Consolas" panose="020B0609020204030204" pitchFamily="49" charset="0"/>
-              </a:rPr>
-              <a:t> </a:t>
-            </a:r>
-            <a:r>
-              <a:rPr lang="de-DE" sz="1400" dirty="0" err="1">
-                <a:latin typeface="Consolas" panose="020B0609020204030204" pitchFamily="49" charset="0"/>
-              </a:rPr>
-              <a:t>build</a:t>
-            </a:r>
-            <a:r>
-              <a:rPr lang="de-DE" sz="1400" dirty="0">
-                <a:latin typeface="Consolas" panose="020B0609020204030204" pitchFamily="49" charset="0"/>
-              </a:rPr>
-              <a:t> -t $CI_REGISTRY/</a:t>
-            </a:r>
-            <a:r>
-              <a:rPr lang="de-DE" sz="1400" dirty="0" err="1">
-                <a:latin typeface="Consolas" panose="020B0609020204030204" pitchFamily="49" charset="0"/>
-              </a:rPr>
-              <a:t>group</a:t>
-            </a:r>
-            <a:r>
-              <a:rPr lang="de-DE" sz="1400" dirty="0">
-                <a:latin typeface="Consolas" panose="020B0609020204030204" pitchFamily="49" charset="0"/>
-              </a:rPr>
-              <a:t>/</a:t>
-            </a:r>
-            <a:r>
-              <a:rPr lang="de-DE" sz="1400" dirty="0" err="1">
-                <a:latin typeface="Consolas" panose="020B0609020204030204" pitchFamily="49" charset="0"/>
-              </a:rPr>
-              <a:t>project</a:t>
-            </a:r>
-            <a:r>
-              <a:rPr lang="de-DE" sz="1400" dirty="0">
-                <a:latin typeface="Consolas" panose="020B0609020204030204" pitchFamily="49" charset="0"/>
-              </a:rPr>
-              <a:t>/</a:t>
-            </a:r>
-            <a:r>
-              <a:rPr lang="de-DE" sz="1400" dirty="0" err="1">
-                <a:latin typeface="Consolas" panose="020B0609020204030204" pitchFamily="49" charset="0"/>
-              </a:rPr>
-              <a:t>image:latest</a:t>
-            </a:r>
-            <a:r>
-              <a:rPr lang="de-DE" sz="1400" dirty="0">
-                <a:latin typeface="Consolas" panose="020B0609020204030204" pitchFamily="49" charset="0"/>
-              </a:rPr>
-              <a:t> .</a:t>
-            </a:r>
-          </a:p>
-          <a:p>
-            <a:pPr marL="0" indent="0">
-              <a:buNone/>
-            </a:pPr>
-            <a:r>
-              <a:rPr lang="de-DE" sz="1400" dirty="0">
-                <a:latin typeface="Consolas" panose="020B0609020204030204" pitchFamily="49" charset="0"/>
-              </a:rPr>
-              <a:t>    - </a:t>
-            </a:r>
-            <a:r>
-              <a:rPr lang="de-DE" sz="1400" dirty="0" err="1">
-                <a:latin typeface="Consolas" panose="020B0609020204030204" pitchFamily="49" charset="0"/>
-              </a:rPr>
-              <a:t>docker</a:t>
-            </a:r>
-            <a:r>
-              <a:rPr lang="de-DE" sz="1400" dirty="0">
-                <a:latin typeface="Consolas" panose="020B0609020204030204" pitchFamily="49" charset="0"/>
-              </a:rPr>
-              <a:t> push $CI_REGISTRY/</a:t>
-            </a:r>
-            <a:r>
-              <a:rPr lang="de-DE" sz="1400" dirty="0" err="1">
-                <a:latin typeface="Consolas" panose="020B0609020204030204" pitchFamily="49" charset="0"/>
-              </a:rPr>
-              <a:t>group</a:t>
-            </a:r>
-            <a:r>
-              <a:rPr lang="de-DE" sz="1400" dirty="0">
-                <a:latin typeface="Consolas" panose="020B0609020204030204" pitchFamily="49" charset="0"/>
-              </a:rPr>
-              <a:t>/</a:t>
-            </a:r>
-            <a:r>
-              <a:rPr lang="de-DE" sz="1400" dirty="0" err="1">
-                <a:latin typeface="Consolas" panose="020B0609020204030204" pitchFamily="49" charset="0"/>
-              </a:rPr>
-              <a:t>project</a:t>
-            </a:r>
-            <a:r>
-              <a:rPr lang="de-DE" sz="1400" dirty="0">
-                <a:latin typeface="Consolas" panose="020B0609020204030204" pitchFamily="49" charset="0"/>
-              </a:rPr>
-              <a:t>/</a:t>
-            </a:r>
-            <a:r>
-              <a:rPr lang="de-DE" sz="1400" dirty="0" err="1">
-                <a:latin typeface="Consolas" panose="020B0609020204030204" pitchFamily="49" charset="0"/>
-              </a:rPr>
-              <a:t>image:latest</a:t>
-            </a:r>
-            <a:endParaRPr lang="de-DE" sz="1400" dirty="0">
-              <a:latin typeface="Consolas" panose="020B0609020204030204" pitchFamily="49" charset="0"/>
-            </a:endParaRPr>
-          </a:p>
-        </p:txBody>
-      </p:sp>
-    </p:spTree>
-    <p:extLst>
-      <p:ext uri="{BB962C8B-B14F-4D97-AF65-F5344CB8AC3E}">
-        <p14:creationId xmlns:p14="http://schemas.microsoft.com/office/powerpoint/2010/main" val="3629727755"/>
-      </p:ext>
-    </p:extLst>
-  </p:cSld>
-  <p:clrMapOvr>
-    <a:masterClrMapping/>
-  </p:clrMapOvr>
-</p:sld>
-</file>
-
-<file path=ppt/slides/slide36.xml><?xml version="1.0" encoding="utf-8"?>
-<p:sld xmlns:a="http://schemas.openxmlformats.org/drawingml/2006/main" xmlns:r="http://schemas.openxmlformats.org/officeDocument/2006/relationships" xmlns:p="http://schemas.openxmlformats.org/presentationml/2006/main" show="0">
-  <p:cSld>
-    <p:spTree>
-      <p:nvGrpSpPr>
-        <p:cNvPr id="1" name=""/>
-        <p:cNvGrpSpPr/>
-        <p:nvPr/>
-      </p:nvGrpSpPr>
-      <p:grpSpPr>
-        <a:xfrm>
-          <a:off x="0" y="0"/>
-          <a:ext cx="0" cy="0"/>
-          <a:chOff x="0" y="0"/>
-          <a:chExt cx="0" cy="0"/>
-        </a:xfrm>
-      </p:grpSpPr>
-      <p:sp>
-        <p:nvSpPr>
-          <p:cNvPr id="2" name="Titel 1">
-            <a:extLst>
-              <a:ext uri="{FF2B5EF4-FFF2-40B4-BE49-F238E27FC236}">
-                <a16:creationId xmlns:a16="http://schemas.microsoft.com/office/drawing/2014/main" id="{49A48EBC-55D9-6D64-715F-AF6DEBF117C3}"/>
-              </a:ext>
-            </a:extLst>
-          </p:cNvPr>
-          <p:cNvSpPr>
-            <a:spLocks noGrp="1"/>
-          </p:cNvSpPr>
-          <p:nvPr>
-            <p:ph type="title"/>
-          </p:nvPr>
-        </p:nvSpPr>
-        <p:spPr/>
-        <p:txBody>
-          <a:bodyPr/>
-          <a:lstStyle/>
-          <a:p>
-            <a:r>
-              <a:rPr lang="de-DE" cap="none" dirty="0"/>
-              <a:t>Release- und </a:t>
-            </a:r>
-            <a:r>
-              <a:rPr lang="de-DE" cap="none" dirty="0" err="1"/>
-              <a:t>Tagged</a:t>
-            </a:r>
-            <a:r>
-              <a:rPr lang="de-DE" cap="none" dirty="0"/>
-              <a:t>-Images</a:t>
-            </a:r>
-            <a:endParaRPr lang="de-DE" dirty="0"/>
-          </a:p>
-        </p:txBody>
-      </p:sp>
-      <p:sp>
-        <p:nvSpPr>
-          <p:cNvPr id="3" name="Inhaltsplatzhalter 2">
-            <a:extLst>
-              <a:ext uri="{FF2B5EF4-FFF2-40B4-BE49-F238E27FC236}">
-                <a16:creationId xmlns:a16="http://schemas.microsoft.com/office/drawing/2014/main" id="{7B404127-ED2B-6905-BDD1-3C60D11A2A7C}"/>
-              </a:ext>
-            </a:extLst>
-          </p:cNvPr>
-          <p:cNvSpPr>
-            <a:spLocks noGrp="1"/>
-          </p:cNvSpPr>
-          <p:nvPr>
-            <p:ph idx="1"/>
-          </p:nvPr>
-        </p:nvSpPr>
-        <p:spPr/>
-        <p:txBody>
-          <a:bodyPr/>
-          <a:lstStyle/>
-          <a:p>
-            <a:pPr marL="0" indent="0">
-              <a:buNone/>
-            </a:pPr>
-            <a:r>
-              <a:rPr lang="de-DE" b="1" dirty="0"/>
-              <a:t>Docker-in-Docker mit Variablen</a:t>
+              <a:t>Lösung 2: Docker-in-Docker mit Variablen</a:t>
             </a:r>
           </a:p>
           <a:p>
@@ -15913,7 +15825,7 @@
             </a:pPr>
             <a:r>
               <a:rPr lang="de-DE" b="1" dirty="0"/>
-              <a:t>Agenda</a:t>
+              <a:t>Inhalt</a:t>
             </a:r>
           </a:p>
           <a:p>

</xml_diff>

<commit_message>
Dependency Proxy nach vorne geschoben
</commit_message>
<xml_diff>
--- a/slides/Tag-3_4-Release-und-Tagged-Images.pptx
+++ b/slides/Tag-3_4-Release-und-Tagged-Images.pptx
@@ -40,9 +40,9 @@
     <p:sldId id="618" r:id="rId28"/>
     <p:sldId id="620" r:id="rId29"/>
     <p:sldId id="621" r:id="rId30"/>
-    <p:sldId id="622" r:id="rId31"/>
-    <p:sldId id="623" r:id="rId32"/>
-    <p:sldId id="617" r:id="rId33"/>
+    <p:sldId id="617" r:id="rId31"/>
+    <p:sldId id="622" r:id="rId32"/>
+    <p:sldId id="623" r:id="rId33"/>
     <p:sldId id="632" r:id="rId34"/>
     <p:sldId id="633" r:id="rId35"/>
     <p:sldId id="625" r:id="rId36"/>
@@ -1701,7 +1701,7 @@
             <a:fld id="{18182567-388C-4D33-8B7B-A651F195F118}" type="slidenum">
               <a:rPr lang="de-DE" altLang="de-DE" smtClean="0"/>
               <a:pPr/>
-              <a:t>31</a:t>
+              <a:t>29</a:t>
             </a:fld>
             <a:endParaRPr lang="de-DE" altLang="de-DE"/>
           </a:p>
@@ -11936,7 +11936,7 @@
           <p:cNvPr id="2" name="Titel 1">
             <a:extLst>
               <a:ext uri="{FF2B5EF4-FFF2-40B4-BE49-F238E27FC236}">
-                <a16:creationId xmlns:a16="http://schemas.microsoft.com/office/drawing/2014/main" id="{021C1D90-AB38-D152-26B9-E4AB49CCFEE9}"/>
+                <a16:creationId xmlns:a16="http://schemas.microsoft.com/office/drawing/2014/main" id="{DB1F447C-2F61-B060-8EFE-D98620927A6E}"/>
               </a:ext>
             </a:extLst>
           </p:cNvPr>
@@ -11973,7 +11973,7 @@
           <p:cNvPr id="3" name="Inhaltsplatzhalter 2">
             <a:extLst>
               <a:ext uri="{FF2B5EF4-FFF2-40B4-BE49-F238E27FC236}">
-                <a16:creationId xmlns:a16="http://schemas.microsoft.com/office/drawing/2014/main" id="{01B30DD9-6590-DB7B-37D7-65618A4BAC0E}"/>
+                <a16:creationId xmlns:a16="http://schemas.microsoft.com/office/drawing/2014/main" id="{68EC2247-CA50-F34D-5B3B-2171A8AD687B}"/>
               </a:ext>
             </a:extLst>
           </p:cNvPr>
@@ -11993,706 +11993,276 @@
               <a:buNone/>
             </a:pPr>
             <a:r>
-              <a:rPr lang="en-US" sz="2000" b="1" dirty="0" err="1"/>
-              <a:t>Beispiel</a:t>
-            </a:r>
-            <a:r>
-              <a:rPr lang="en-US" sz="2000" b="1" dirty="0"/>
-              <a:t>: Docker-in-Docker Container Image (</a:t>
-            </a:r>
-            <a:r>
-              <a:rPr lang="en-US" sz="2000" b="1" dirty="0">
-                <a:solidFill>
-                  <a:srgbClr val="0249FC"/>
-                </a:solidFill>
-              </a:rPr>
-              <a:t>Dependency Proxy</a:t>
-            </a:r>
-            <a:r>
-              <a:rPr lang="en-US" sz="2000" b="1" dirty="0"/>
-              <a:t>)</a:t>
-            </a:r>
-          </a:p>
-          <a:p>
-            <a:pPr marL="0" indent="0">
-              <a:buNone/>
-            </a:pPr>
-            <a:r>
-              <a:rPr lang="en-US" sz="2000" dirty="0" err="1"/>
-              <a:t>Eigene</a:t>
-            </a:r>
-            <a:r>
-              <a:rPr lang="en-US" sz="2000" dirty="0"/>
-              <a:t> Container Images </a:t>
-            </a:r>
-            <a:r>
-              <a:rPr lang="en-US" sz="2000" dirty="0" err="1"/>
-              <a:t>mit</a:t>
-            </a:r>
-            <a:r>
-              <a:rPr lang="en-US" sz="2000" dirty="0"/>
-              <a:t> Docker-in-Docker </a:t>
-            </a:r>
-            <a:r>
-              <a:rPr lang="en-US" sz="2000" dirty="0" err="1"/>
-              <a:t>nutzen</a:t>
-            </a:r>
-            <a:endParaRPr lang="en-US" sz="2000" dirty="0"/>
-          </a:p>
-          <a:p>
-            <a:pPr marL="457200" indent="-457200">
-              <a:buFont typeface="+mj-lt"/>
-              <a:buAutoNum type="arabicPeriod"/>
-            </a:pPr>
-            <a:r>
-              <a:rPr lang="en-US" sz="2000" dirty="0"/>
-              <a:t>Docker-in-Docker </a:t>
-            </a:r>
-            <a:r>
-              <a:rPr lang="en-US" sz="2000" dirty="0" err="1"/>
-              <a:t>einrichten</a:t>
-            </a:r>
-            <a:endParaRPr lang="en-US" sz="2000" dirty="0"/>
-          </a:p>
-          <a:p>
-            <a:pPr marL="457200" indent="-457200">
-              <a:buFont typeface="+mj-lt"/>
-              <a:buAutoNum type="arabicPeriod"/>
-            </a:pPr>
-            <a:r>
-              <a:rPr lang="en-US" sz="2000" dirty="0">
-                <a:solidFill>
-                  <a:srgbClr val="FF0000"/>
-                </a:solidFill>
-                <a:latin typeface="Consolas" panose="020B0609020204030204" pitchFamily="49" charset="0"/>
-              </a:rPr>
-              <a:t>image</a:t>
-            </a:r>
-            <a:r>
-              <a:rPr lang="en-US" sz="2000" dirty="0"/>
-              <a:t> und </a:t>
-            </a:r>
-            <a:r>
-              <a:rPr lang="en-US" sz="2000" dirty="0">
-                <a:solidFill>
-                  <a:srgbClr val="FF0000"/>
-                </a:solidFill>
-                <a:latin typeface="Consolas" panose="020B0609020204030204" pitchFamily="49" charset="0"/>
-              </a:rPr>
-              <a:t>service</a:t>
-            </a:r>
-            <a:r>
-              <a:rPr lang="en-US" sz="2000" dirty="0"/>
-              <a:t> auf die Registry </a:t>
-            </a:r>
-            <a:r>
-              <a:rPr lang="en-US" sz="2000" dirty="0" err="1"/>
-              <a:t>zeigen</a:t>
-            </a:r>
-            <a:r>
-              <a:rPr lang="en-US" sz="2000" dirty="0"/>
+              <a:rPr lang="de-DE" b="1" dirty="0" err="1"/>
+              <a:t>Dependency</a:t>
+            </a:r>
+            <a:r>
+              <a:rPr lang="de-DE" b="1" dirty="0"/>
+              <a:t> Proxy</a:t>
+            </a:r>
+          </a:p>
+          <a:p>
+            <a:pPr>
+              <a:buFont typeface="Arial" panose="020B0604020202020204" pitchFamily="34" charset="0"/>
+              <a:buChar char="•"/>
+            </a:pPr>
+            <a:r>
+              <a:rPr lang="de-DE" sz="2000" dirty="0"/>
+              <a:t>Lokaler Proxy</a:t>
+            </a:r>
+          </a:p>
+          <a:p>
+            <a:pPr lvl="1">
+              <a:buFont typeface="Arial" panose="020B0604020202020204" pitchFamily="34" charset="0"/>
+              <a:buChar char="•"/>
+            </a:pPr>
+            <a:r>
+              <a:rPr lang="de-DE" sz="1800" dirty="0"/>
+              <a:t>Genutzt für häufig genutzte Upstream-Images</a:t>
+            </a:r>
+          </a:p>
+          <a:p>
+            <a:pPr lvl="1">
+              <a:buFont typeface="Arial" panose="020B0604020202020204" pitchFamily="34" charset="0"/>
+              <a:buChar char="•"/>
+            </a:pPr>
+            <a:r>
+              <a:rPr lang="de-DE" sz="1800" dirty="0"/>
+              <a:t>Agiert als pull </a:t>
+            </a:r>
+            <a:r>
+              <a:rPr lang="de-DE" sz="1800" dirty="0" err="1"/>
+              <a:t>through</a:t>
+            </a:r>
+            <a:r>
+              <a:rPr lang="de-DE" sz="1800" dirty="0"/>
               <a:t> </a:t>
             </a:r>
             <a:r>
-              <a:rPr lang="en-US" sz="2000" dirty="0" err="1"/>
-              <a:t>lassen</a:t>
-            </a:r>
-            <a:endParaRPr lang="en-US" sz="2000" dirty="0"/>
-          </a:p>
-          <a:p>
-            <a:pPr marL="457200" indent="-457200">
-              <a:buFont typeface="+mj-lt"/>
-              <a:buAutoNum type="arabicPeriod"/>
-            </a:pPr>
-            <a:r>
-              <a:rPr lang="en-US" sz="2000" dirty="0">
-                <a:solidFill>
-                  <a:srgbClr val="FF0000"/>
-                </a:solidFill>
-                <a:latin typeface="Consolas" panose="020B0609020204030204" pitchFamily="49" charset="0"/>
-              </a:rPr>
-              <a:t>alias</a:t>
-            </a:r>
-            <a:r>
-              <a:rPr lang="en-US" sz="2000" dirty="0"/>
+              <a:rPr lang="de-DE" sz="1800" dirty="0" err="1"/>
+              <a:t>cache</a:t>
+            </a:r>
+            <a:r>
+              <a:rPr lang="de-DE" sz="1800" dirty="0"/>
+              <a:t> für </a:t>
+            </a:r>
+            <a:r>
+              <a:rPr lang="de-DE" sz="1800" dirty="0" err="1"/>
+              <a:t>DockerHub</a:t>
+            </a:r>
+            <a:endParaRPr lang="de-DE" sz="1800" dirty="0"/>
+          </a:p>
+          <a:p>
+            <a:pPr lvl="1">
+              <a:buFont typeface="Arial" panose="020B0604020202020204" pitchFamily="34" charset="0"/>
+              <a:buChar char="•"/>
+            </a:pPr>
+            <a:r>
+              <a:rPr lang="de-DE" sz="1800" dirty="0"/>
+              <a:t>Aus Sicht des Docker Clients: Einfach eine weitere Registry</a:t>
+            </a:r>
+          </a:p>
+          <a:p>
+            <a:pPr>
+              <a:buFont typeface="Arial" panose="020B0604020202020204" pitchFamily="34" charset="0"/>
+              <a:buChar char="•"/>
+            </a:pPr>
+            <a:r>
+              <a:rPr lang="de-DE" sz="2000" dirty="0"/>
+              <a:t>Docker Hub rate </a:t>
+            </a:r>
+            <a:r>
+              <a:rPr lang="de-DE" sz="2000" dirty="0" err="1"/>
+              <a:t>limiting</a:t>
+            </a:r>
+            <a:endParaRPr lang="de-DE" sz="2000" dirty="0"/>
+          </a:p>
+          <a:p>
+            <a:pPr lvl="1">
+              <a:buFont typeface="Arial" panose="020B0604020202020204" pitchFamily="34" charset="0"/>
+              <a:buChar char="•"/>
+            </a:pPr>
+            <a:r>
+              <a:rPr lang="de-DE" sz="1800" dirty="0">
+                <a:hlinkClick r:id="rId3"/>
+              </a:rPr>
+              <a:t>https://docs.docker.com/docker-hub/download-rate-limit/</a:t>
+            </a:r>
+            <a:r>
+              <a:rPr lang="de-DE" sz="1800" dirty="0"/>
               <a:t> </a:t>
             </a:r>
-            <a:r>
-              <a:rPr lang="en-US" sz="2000" dirty="0" err="1"/>
-              <a:t>hinzufügen</a:t>
-            </a:r>
-            <a:r>
-              <a:rPr lang="en-US" sz="2000" dirty="0"/>
-              <a:t> für den </a:t>
-            </a:r>
-            <a:r>
-              <a:rPr lang="en-US" sz="2000" dirty="0">
-                <a:latin typeface="Consolas" panose="020B0609020204030204" pitchFamily="49" charset="0"/>
-              </a:rPr>
-              <a:t>service</a:t>
-            </a:r>
-          </a:p>
-          <a:p>
-            <a:pPr marL="457200" indent="-457200">
-              <a:buFont typeface="+mj-lt"/>
-              <a:buAutoNum type="arabicPeriod"/>
-            </a:pPr>
-            <a:endParaRPr lang="en-US" sz="2000" dirty="0">
-              <a:latin typeface="Consolas" panose="020B0609020204030204" pitchFamily="49" charset="0"/>
+          </a:p>
+          <a:p>
+            <a:pPr lvl="1">
+              <a:buFont typeface="Arial" panose="020B0604020202020204" pitchFamily="34" charset="0"/>
+              <a:buChar char="•"/>
+            </a:pPr>
+            <a:r>
+              <a:rPr lang="de-DE" sz="1800" dirty="0"/>
+              <a:t>Begrenzt die Image </a:t>
+            </a:r>
+            <a:r>
+              <a:rPr lang="de-DE" sz="1800" dirty="0" err="1"/>
+              <a:t>pulls</a:t>
+            </a:r>
+            <a:r>
+              <a:rPr lang="de-DE" sz="1800" dirty="0"/>
+              <a:t> von Docker Hub </a:t>
+            </a:r>
+          </a:p>
+          <a:p>
+            <a:pPr lvl="1">
+              <a:buFont typeface="Arial" panose="020B0604020202020204" pitchFamily="34" charset="0"/>
+              <a:buChar char="•"/>
+            </a:pPr>
+            <a:r>
+              <a:rPr lang="de-DE" sz="1800" dirty="0"/>
+              <a:t>Meist läuft bei jedem </a:t>
+            </a:r>
+            <a:r>
+              <a:rPr lang="de-DE" sz="1800" dirty="0" err="1"/>
+              <a:t>commit</a:t>
+            </a:r>
+            <a:r>
+              <a:rPr lang="de-DE" sz="1800" dirty="0"/>
+              <a:t> eine Pipeline</a:t>
+            </a:r>
+          </a:p>
+          <a:p>
+            <a:pPr lvl="2">
+              <a:buFont typeface="Arial" panose="020B0604020202020204" pitchFamily="34" charset="0"/>
+              <a:buChar char="•"/>
+            </a:pPr>
+            <a:r>
+              <a:rPr lang="de-DE" sz="1600" dirty="0"/>
+              <a:t>Selbst bei gleichem Image </a:t>
+            </a:r>
+            <a:r>
+              <a:rPr lang="de-DE" sz="1600" dirty="0">
+                <a:sym typeface="Wingdings" panose="05000000000000000000" pitchFamily="2" charset="2"/>
+              </a:rPr>
+              <a:t> Docker Pull Count erhöht durch „manifest </a:t>
+            </a:r>
+            <a:r>
+              <a:rPr lang="de-DE" sz="1600" dirty="0" err="1">
+                <a:sym typeface="Wingdings" panose="05000000000000000000" pitchFamily="2" charset="2"/>
+              </a:rPr>
+              <a:t>requets</a:t>
+            </a:r>
+            <a:r>
+              <a:rPr lang="de-DE" sz="1600" dirty="0">
+                <a:sym typeface="Wingdings" panose="05000000000000000000" pitchFamily="2" charset="2"/>
+              </a:rPr>
+              <a:t>“</a:t>
+            </a:r>
+            <a:endParaRPr lang="de-DE" sz="2000" dirty="0">
+              <a:sym typeface="Wingdings" panose="05000000000000000000" pitchFamily="2" charset="2"/>
             </a:endParaRPr>
           </a:p>
           <a:p>
-            <a:pPr marL="0" indent="0">
-              <a:buNone/>
-            </a:pPr>
-            <a:r>
-              <a:rPr lang="en-US" sz="1800" dirty="0">
-                <a:latin typeface="Consolas" panose="020B0609020204030204" pitchFamily="49" charset="0"/>
-              </a:rPr>
-              <a:t>.</a:t>
-            </a:r>
-            <a:r>
-              <a:rPr lang="en-US" sz="1800" dirty="0" err="1">
-                <a:latin typeface="Consolas" panose="020B0609020204030204" pitchFamily="49" charset="0"/>
-              </a:rPr>
-              <a:t>gitlab-ci.yml</a:t>
-            </a:r>
-            <a:endParaRPr lang="en-US" sz="1800" dirty="0">
-              <a:latin typeface="Consolas" panose="020B0609020204030204" pitchFamily="49" charset="0"/>
-            </a:endParaRPr>
-          </a:p>
-          <a:p>
-            <a:pPr marL="0" marR="0" lvl="0" indent="0" algn="l" defTabSz="914400" rtl="0" eaLnBrk="1" fontAlgn="base" latinLnBrk="0" hangingPunct="1">
-              <a:lnSpc>
-                <a:spcPct val="100000"/>
-              </a:lnSpc>
-              <a:spcBef>
-                <a:spcPct val="20000"/>
-              </a:spcBef>
-              <a:spcAft>
-                <a:spcPct val="0"/>
-              </a:spcAft>
-              <a:buClr>
-                <a:srgbClr val="008C5A"/>
-              </a:buClr>
-              <a:buSzTx/>
-              <a:buFont typeface="Monotype Sorts" pitchFamily="2" charset="2"/>
-              <a:buNone/>
-              <a:tabLst/>
-              <a:defRPr/>
-            </a:pPr>
-            <a:r>
-              <a:rPr kumimoji="0" lang="en-US" sz="1400" b="0" i="0" u="none" strike="noStrike" kern="0" cap="none" spc="0" normalizeH="0" baseline="0" noProof="0" dirty="0">
-                <a:ln>
-                  <a:noFill/>
-                </a:ln>
-                <a:solidFill>
-                  <a:srgbClr val="000000"/>
-                </a:solidFill>
-                <a:effectLst/>
-                <a:uLnTx/>
-                <a:uFillTx/>
-                <a:latin typeface="Consolas" panose="020B0609020204030204" pitchFamily="49" charset="0"/>
-                <a:ea typeface="+mn-ea"/>
-                <a:cs typeface="+mn-cs"/>
-              </a:rPr>
-              <a:t>build:</a:t>
-            </a:r>
-          </a:p>
-          <a:p>
-            <a:pPr marL="0" marR="0" lvl="0" indent="0" algn="l" defTabSz="914400" rtl="0" eaLnBrk="1" fontAlgn="base" latinLnBrk="0" hangingPunct="1">
-              <a:lnSpc>
-                <a:spcPct val="100000"/>
-              </a:lnSpc>
-              <a:spcBef>
-                <a:spcPct val="20000"/>
-              </a:spcBef>
-              <a:spcAft>
-                <a:spcPct val="0"/>
-              </a:spcAft>
-              <a:buClr>
-                <a:srgbClr val="008C5A"/>
-              </a:buClr>
-              <a:buSzTx/>
-              <a:buFont typeface="Monotype Sorts" pitchFamily="2" charset="2"/>
-              <a:buNone/>
-              <a:tabLst/>
-              <a:defRPr/>
-            </a:pPr>
-            <a:r>
-              <a:rPr kumimoji="0" lang="en-US" sz="1400" b="0" i="0" u="none" strike="noStrike" kern="0" cap="none" spc="0" normalizeH="0" baseline="0" noProof="0" dirty="0">
-                <a:ln>
-                  <a:noFill/>
-                </a:ln>
-                <a:solidFill>
-                  <a:srgbClr val="000000"/>
-                </a:solidFill>
-                <a:effectLst/>
-                <a:uLnTx/>
-                <a:uFillTx/>
-                <a:latin typeface="Consolas" panose="020B0609020204030204" pitchFamily="49" charset="0"/>
-                <a:ea typeface="+mn-ea"/>
-                <a:cs typeface="+mn-cs"/>
-              </a:rPr>
-              <a:t>  </a:t>
-            </a:r>
-            <a:r>
-              <a:rPr kumimoji="0" lang="en-US" sz="1400" b="0" i="0" u="none" strike="noStrike" kern="0" cap="none" spc="0" normalizeH="0" baseline="0" noProof="0" dirty="0">
-                <a:ln>
-                  <a:noFill/>
-                </a:ln>
-                <a:solidFill>
-                  <a:srgbClr val="FF0000"/>
-                </a:solidFill>
-                <a:effectLst/>
-                <a:uLnTx/>
-                <a:uFillTx/>
-                <a:latin typeface="Consolas" panose="020B0609020204030204" pitchFamily="49" charset="0"/>
-                <a:ea typeface="+mn-ea"/>
-                <a:cs typeface="+mn-cs"/>
-              </a:rPr>
-              <a:t>image</a:t>
-            </a:r>
-            <a:r>
-              <a:rPr kumimoji="0" lang="en-US" sz="1400" b="0" i="0" u="none" strike="noStrike" kern="0" cap="none" spc="0" normalizeH="0" baseline="0" noProof="0" dirty="0">
-                <a:ln>
-                  <a:noFill/>
-                </a:ln>
-                <a:solidFill>
-                  <a:srgbClr val="000000"/>
-                </a:solidFill>
-                <a:effectLst/>
-                <a:uLnTx/>
-                <a:uFillTx/>
-                <a:latin typeface="Consolas" panose="020B0609020204030204" pitchFamily="49" charset="0"/>
-                <a:ea typeface="+mn-ea"/>
-                <a:cs typeface="+mn-cs"/>
-              </a:rPr>
-              <a:t>: </a:t>
-            </a:r>
-            <a:r>
-              <a:rPr kumimoji="0" lang="en-US" sz="1400" b="0" i="0" u="none" strike="noStrike" kern="0" cap="none" spc="0" normalizeH="0" baseline="0" noProof="0" dirty="0">
-                <a:ln>
-                  <a:noFill/>
-                </a:ln>
-                <a:solidFill>
-                  <a:srgbClr val="0249FC"/>
-                </a:solidFill>
-                <a:effectLst/>
-                <a:uLnTx/>
-                <a:uFillTx/>
-                <a:latin typeface="Consolas" panose="020B0609020204030204" pitchFamily="49" charset="0"/>
-                <a:ea typeface="+mn-ea"/>
-                <a:cs typeface="+mn-cs"/>
-              </a:rPr>
-              <a:t>${CI_DEPENDENCY_PROXY_GROUP_IMAGE_PREFIX}</a:t>
-            </a:r>
-            <a:r>
-              <a:rPr kumimoji="0" lang="en-US" sz="1400" b="0" i="0" u="none" strike="noStrike" kern="0" cap="none" spc="0" normalizeH="0" baseline="0" noProof="0" dirty="0">
-                <a:ln>
-                  <a:noFill/>
-                </a:ln>
-                <a:solidFill>
-                  <a:srgbClr val="000000"/>
-                </a:solidFill>
-                <a:effectLst/>
-                <a:uLnTx/>
-                <a:uFillTx/>
-                <a:latin typeface="Consolas" panose="020B0609020204030204" pitchFamily="49" charset="0"/>
-                <a:ea typeface="+mn-ea"/>
-                <a:cs typeface="+mn-cs"/>
-              </a:rPr>
-              <a:t>/docker:20.10.16</a:t>
-            </a:r>
-          </a:p>
-          <a:p>
-            <a:pPr marL="0" marR="0" lvl="0" indent="0" algn="l" defTabSz="914400" rtl="0" eaLnBrk="1" fontAlgn="base" latinLnBrk="0" hangingPunct="1">
-              <a:lnSpc>
-                <a:spcPct val="100000"/>
-              </a:lnSpc>
-              <a:spcBef>
-                <a:spcPct val="20000"/>
-              </a:spcBef>
-              <a:spcAft>
-                <a:spcPct val="0"/>
-              </a:spcAft>
-              <a:buClr>
-                <a:srgbClr val="008C5A"/>
-              </a:buClr>
-              <a:buSzTx/>
-              <a:buFont typeface="Monotype Sorts" pitchFamily="2" charset="2"/>
-              <a:buNone/>
-              <a:tabLst/>
-              <a:defRPr/>
-            </a:pPr>
-            <a:r>
-              <a:rPr kumimoji="0" lang="en-US" sz="1400" b="0" i="0" u="none" strike="noStrike" kern="0" cap="none" spc="0" normalizeH="0" baseline="0" noProof="0" dirty="0">
-                <a:ln>
-                  <a:noFill/>
-                </a:ln>
-                <a:solidFill>
-                  <a:srgbClr val="000000"/>
-                </a:solidFill>
-                <a:effectLst/>
-                <a:uLnTx/>
-                <a:uFillTx/>
-                <a:latin typeface="Consolas" panose="020B0609020204030204" pitchFamily="49" charset="0"/>
-                <a:ea typeface="+mn-ea"/>
-                <a:cs typeface="+mn-cs"/>
-              </a:rPr>
-              <a:t>  </a:t>
-            </a:r>
-            <a:r>
-              <a:rPr kumimoji="0" lang="en-US" sz="1400" b="0" i="0" u="none" strike="noStrike" kern="0" cap="none" spc="0" normalizeH="0" baseline="0" noProof="0" dirty="0">
-                <a:ln>
-                  <a:noFill/>
-                </a:ln>
-                <a:solidFill>
-                  <a:srgbClr val="FF0000"/>
-                </a:solidFill>
-                <a:effectLst/>
-                <a:uLnTx/>
-                <a:uFillTx/>
-                <a:latin typeface="Consolas" panose="020B0609020204030204" pitchFamily="49" charset="0"/>
-                <a:ea typeface="+mn-ea"/>
-                <a:cs typeface="+mn-cs"/>
-              </a:rPr>
-              <a:t>services</a:t>
-            </a:r>
-            <a:r>
-              <a:rPr kumimoji="0" lang="en-US" sz="1400" b="0" i="0" u="none" strike="noStrike" kern="0" cap="none" spc="0" normalizeH="0" baseline="0" noProof="0" dirty="0">
-                <a:ln>
-                  <a:noFill/>
-                </a:ln>
-                <a:solidFill>
-                  <a:srgbClr val="000000"/>
-                </a:solidFill>
-                <a:effectLst/>
-                <a:uLnTx/>
-                <a:uFillTx/>
-                <a:latin typeface="Consolas" panose="020B0609020204030204" pitchFamily="49" charset="0"/>
-                <a:ea typeface="+mn-ea"/>
-                <a:cs typeface="+mn-cs"/>
-              </a:rPr>
-              <a:t>:</a:t>
-            </a:r>
-          </a:p>
-          <a:p>
-            <a:pPr marL="0" marR="0" lvl="0" indent="0" algn="l" defTabSz="914400" rtl="0" eaLnBrk="1" fontAlgn="base" latinLnBrk="0" hangingPunct="1">
-              <a:lnSpc>
-                <a:spcPct val="100000"/>
-              </a:lnSpc>
-              <a:spcBef>
-                <a:spcPct val="20000"/>
-              </a:spcBef>
-              <a:spcAft>
-                <a:spcPct val="0"/>
-              </a:spcAft>
-              <a:buClr>
-                <a:srgbClr val="008C5A"/>
-              </a:buClr>
-              <a:buSzTx/>
-              <a:buFont typeface="Monotype Sorts" pitchFamily="2" charset="2"/>
-              <a:buNone/>
-              <a:tabLst/>
-              <a:defRPr/>
-            </a:pPr>
-            <a:r>
-              <a:rPr kumimoji="0" lang="en-US" sz="1400" b="0" i="0" u="none" strike="noStrike" kern="0" cap="none" spc="0" normalizeH="0" baseline="0" noProof="0" dirty="0">
-                <a:ln>
-                  <a:noFill/>
-                </a:ln>
-                <a:solidFill>
-                  <a:srgbClr val="000000"/>
-                </a:solidFill>
-                <a:effectLst/>
-                <a:uLnTx/>
-                <a:uFillTx/>
-                <a:latin typeface="Consolas" panose="020B0609020204030204" pitchFamily="49" charset="0"/>
-                <a:ea typeface="+mn-ea"/>
-                <a:cs typeface="+mn-cs"/>
-              </a:rPr>
-              <a:t>    - name: </a:t>
-            </a:r>
-            <a:r>
-              <a:rPr kumimoji="0" lang="en-US" sz="1400" b="0" i="0" u="none" strike="noStrike" kern="0" cap="none" spc="0" normalizeH="0" baseline="0" noProof="0" dirty="0">
-                <a:ln>
-                  <a:noFill/>
-                </a:ln>
-                <a:solidFill>
-                  <a:srgbClr val="0249FC"/>
-                </a:solidFill>
-                <a:effectLst/>
-                <a:uLnTx/>
-                <a:uFillTx/>
-                <a:latin typeface="Consolas" panose="020B0609020204030204" pitchFamily="49" charset="0"/>
-                <a:ea typeface="+mn-ea"/>
-                <a:cs typeface="+mn-cs"/>
-              </a:rPr>
-              <a:t>${CI_DEPENDENCY_PROXY_GROUP_IMAGE_PREFIX}</a:t>
-            </a:r>
-            <a:r>
-              <a:rPr kumimoji="0" lang="en-US" sz="1400" b="0" i="0" u="none" strike="noStrike" kern="0" cap="none" spc="0" normalizeH="0" baseline="0" noProof="0" dirty="0">
-                <a:ln>
-                  <a:noFill/>
-                </a:ln>
-                <a:solidFill>
-                  <a:srgbClr val="000000"/>
-                </a:solidFill>
-                <a:effectLst/>
-                <a:uLnTx/>
-                <a:uFillTx/>
-                <a:latin typeface="Consolas" panose="020B0609020204030204" pitchFamily="49" charset="0"/>
-                <a:ea typeface="+mn-ea"/>
-                <a:cs typeface="+mn-cs"/>
-              </a:rPr>
-              <a:t>/docker:18.09.7-dind</a:t>
-            </a:r>
-          </a:p>
-          <a:p>
-            <a:pPr marL="0" marR="0" lvl="0" indent="0" algn="l" defTabSz="914400" rtl="0" eaLnBrk="1" fontAlgn="base" latinLnBrk="0" hangingPunct="1">
-              <a:lnSpc>
-                <a:spcPct val="100000"/>
-              </a:lnSpc>
-              <a:spcBef>
-                <a:spcPct val="20000"/>
-              </a:spcBef>
-              <a:spcAft>
-                <a:spcPct val="0"/>
-              </a:spcAft>
-              <a:buClr>
-                <a:srgbClr val="008C5A"/>
-              </a:buClr>
-              <a:buSzTx/>
-              <a:buFont typeface="Monotype Sorts" pitchFamily="2" charset="2"/>
-              <a:buNone/>
-              <a:tabLst/>
-              <a:defRPr/>
-            </a:pPr>
-            <a:r>
-              <a:rPr kumimoji="0" lang="en-US" sz="1400" b="0" i="0" u="none" strike="noStrike" kern="0" cap="none" spc="0" normalizeH="0" baseline="0" noProof="0" dirty="0">
-                <a:ln>
-                  <a:noFill/>
-                </a:ln>
-                <a:solidFill>
-                  <a:srgbClr val="000000"/>
-                </a:solidFill>
-                <a:effectLst/>
-                <a:uLnTx/>
-                <a:uFillTx/>
-                <a:latin typeface="Consolas" panose="020B0609020204030204" pitchFamily="49" charset="0"/>
-                <a:ea typeface="+mn-ea"/>
-                <a:cs typeface="+mn-cs"/>
-              </a:rPr>
-              <a:t>      </a:t>
-            </a:r>
-            <a:r>
-              <a:rPr kumimoji="0" lang="en-US" sz="1400" b="0" i="0" u="none" strike="noStrike" kern="0" cap="none" spc="0" normalizeH="0" baseline="0" noProof="0" dirty="0">
-                <a:ln>
-                  <a:noFill/>
-                </a:ln>
-                <a:solidFill>
-                  <a:srgbClr val="FF0000"/>
-                </a:solidFill>
-                <a:effectLst/>
-                <a:uLnTx/>
-                <a:uFillTx/>
-                <a:latin typeface="Consolas" panose="020B0609020204030204" pitchFamily="49" charset="0"/>
-                <a:ea typeface="+mn-ea"/>
-                <a:cs typeface="+mn-cs"/>
-              </a:rPr>
-              <a:t>alias</a:t>
-            </a:r>
-            <a:r>
-              <a:rPr kumimoji="0" lang="en-US" sz="1400" b="0" i="0" u="none" strike="noStrike" kern="0" cap="none" spc="0" normalizeH="0" baseline="0" noProof="0" dirty="0">
-                <a:ln>
-                  <a:noFill/>
-                </a:ln>
-                <a:solidFill>
-                  <a:srgbClr val="000000"/>
-                </a:solidFill>
-                <a:effectLst/>
-                <a:uLnTx/>
-                <a:uFillTx/>
-                <a:latin typeface="Consolas" panose="020B0609020204030204" pitchFamily="49" charset="0"/>
-                <a:ea typeface="+mn-ea"/>
-                <a:cs typeface="+mn-cs"/>
-              </a:rPr>
-              <a:t>: docker</a:t>
-            </a:r>
-          </a:p>
-          <a:p>
-            <a:pPr marL="0" marR="0" lvl="0" indent="0" algn="l" defTabSz="914400" rtl="0" eaLnBrk="1" fontAlgn="base" latinLnBrk="0" hangingPunct="1">
-              <a:lnSpc>
-                <a:spcPct val="100000"/>
-              </a:lnSpc>
-              <a:spcBef>
-                <a:spcPct val="20000"/>
-              </a:spcBef>
-              <a:spcAft>
-                <a:spcPct val="0"/>
-              </a:spcAft>
-              <a:buClr>
-                <a:srgbClr val="008C5A"/>
-              </a:buClr>
-              <a:buSzTx/>
-              <a:buFont typeface="Monotype Sorts" pitchFamily="2" charset="2"/>
-              <a:buNone/>
-              <a:tabLst/>
-              <a:defRPr/>
-            </a:pPr>
-            <a:r>
-              <a:rPr kumimoji="0" lang="en-US" sz="1400" b="0" i="0" u="none" strike="noStrike" kern="0" cap="none" spc="0" normalizeH="0" baseline="0" noProof="0" dirty="0">
-                <a:ln>
-                  <a:noFill/>
-                </a:ln>
-                <a:solidFill>
-                  <a:srgbClr val="000000"/>
-                </a:solidFill>
-                <a:effectLst/>
-                <a:uLnTx/>
-                <a:uFillTx/>
-                <a:latin typeface="Consolas" panose="020B0609020204030204" pitchFamily="49" charset="0"/>
-                <a:ea typeface="+mn-ea"/>
-                <a:cs typeface="+mn-cs"/>
-              </a:rPr>
-              <a:t>  stage: build</a:t>
-            </a:r>
-          </a:p>
-          <a:p>
-            <a:pPr marL="0" marR="0" lvl="0" indent="0" algn="l" defTabSz="914400" rtl="0" eaLnBrk="1" fontAlgn="base" latinLnBrk="0" hangingPunct="1">
-              <a:lnSpc>
-                <a:spcPct val="100000"/>
-              </a:lnSpc>
-              <a:spcBef>
-                <a:spcPct val="20000"/>
-              </a:spcBef>
-              <a:spcAft>
-                <a:spcPct val="0"/>
-              </a:spcAft>
-              <a:buClr>
-                <a:srgbClr val="008C5A"/>
-              </a:buClr>
-              <a:buSzTx/>
-              <a:buFont typeface="Monotype Sorts" pitchFamily="2" charset="2"/>
-              <a:buNone/>
-              <a:tabLst/>
-              <a:defRPr/>
-            </a:pPr>
-            <a:r>
-              <a:rPr kumimoji="0" lang="en-US" sz="1400" b="0" i="0" u="none" strike="noStrike" kern="0" cap="none" spc="0" normalizeH="0" baseline="0" noProof="0" dirty="0">
-                <a:ln>
-                  <a:noFill/>
-                </a:ln>
-                <a:solidFill>
-                  <a:srgbClr val="000000"/>
-                </a:solidFill>
-                <a:effectLst/>
-                <a:uLnTx/>
-                <a:uFillTx/>
-                <a:latin typeface="Consolas" panose="020B0609020204030204" pitchFamily="49" charset="0"/>
-                <a:ea typeface="+mn-ea"/>
-                <a:cs typeface="+mn-cs"/>
-              </a:rPr>
-              <a:t>  script:</a:t>
-            </a:r>
-          </a:p>
-          <a:p>
-            <a:pPr marL="0" marR="0" lvl="0" indent="0" algn="l" defTabSz="914400" rtl="0" eaLnBrk="1" fontAlgn="base" latinLnBrk="0" hangingPunct="1">
-              <a:lnSpc>
-                <a:spcPct val="100000"/>
-              </a:lnSpc>
-              <a:spcBef>
-                <a:spcPct val="20000"/>
-              </a:spcBef>
-              <a:spcAft>
-                <a:spcPct val="0"/>
-              </a:spcAft>
-              <a:buClr>
-                <a:srgbClr val="008C5A"/>
-              </a:buClr>
-              <a:buSzTx/>
-              <a:buFont typeface="Monotype Sorts" pitchFamily="2" charset="2"/>
-              <a:buNone/>
-              <a:tabLst/>
-              <a:defRPr/>
-            </a:pPr>
-            <a:r>
-              <a:rPr kumimoji="0" lang="en-US" sz="1400" b="0" i="0" u="none" strike="noStrike" kern="0" cap="none" spc="0" normalizeH="0" baseline="0" noProof="0" dirty="0">
-                <a:ln>
-                  <a:noFill/>
-                </a:ln>
-                <a:solidFill>
-                  <a:srgbClr val="000000"/>
-                </a:solidFill>
-                <a:effectLst/>
-                <a:uLnTx/>
-                <a:uFillTx/>
-                <a:latin typeface="Consolas" panose="020B0609020204030204" pitchFamily="49" charset="0"/>
-                <a:ea typeface="+mn-ea"/>
-                <a:cs typeface="+mn-cs"/>
-              </a:rPr>
-              <a:t>    - docker build -t my-docker-image .</a:t>
-            </a:r>
-          </a:p>
-          <a:p>
-            <a:pPr marL="0" marR="0" lvl="0" indent="0" algn="l" defTabSz="914400" rtl="0" eaLnBrk="1" fontAlgn="base" latinLnBrk="0" hangingPunct="1">
-              <a:lnSpc>
-                <a:spcPct val="100000"/>
-              </a:lnSpc>
-              <a:spcBef>
-                <a:spcPct val="20000"/>
-              </a:spcBef>
-              <a:spcAft>
-                <a:spcPct val="0"/>
-              </a:spcAft>
-              <a:buClr>
-                <a:srgbClr val="008C5A"/>
-              </a:buClr>
-              <a:buSzTx/>
-              <a:buFont typeface="Monotype Sorts" pitchFamily="2" charset="2"/>
-              <a:buNone/>
-              <a:tabLst/>
-              <a:defRPr/>
-            </a:pPr>
-            <a:r>
-              <a:rPr kumimoji="0" lang="en-US" sz="1400" b="0" i="0" u="none" strike="noStrike" kern="0" cap="none" spc="0" normalizeH="0" baseline="0" noProof="0" dirty="0">
-                <a:ln>
-                  <a:noFill/>
-                </a:ln>
-                <a:solidFill>
-                  <a:srgbClr val="000000"/>
-                </a:solidFill>
-                <a:effectLst/>
-                <a:uLnTx/>
-                <a:uFillTx/>
-                <a:latin typeface="Consolas" panose="020B0609020204030204" pitchFamily="49" charset="0"/>
-                <a:ea typeface="+mn-ea"/>
-                <a:cs typeface="+mn-cs"/>
-              </a:rPr>
-              <a:t>    - docker run my-docker-image /script/to/run/tests</a:t>
-            </a:r>
-            <a:endParaRPr kumimoji="0" lang="en-US" sz="1100" b="0" i="0" u="none" strike="noStrike" kern="0" cap="none" spc="0" normalizeH="0" baseline="0" noProof="0" dirty="0">
-              <a:ln>
-                <a:noFill/>
-              </a:ln>
-              <a:solidFill>
-                <a:srgbClr val="000000"/>
-              </a:solidFill>
-              <a:effectLst/>
-              <a:uLnTx/>
-              <a:uFillTx/>
-              <a:latin typeface="Consolas" panose="020B0609020204030204" pitchFamily="49" charset="0"/>
-              <a:ea typeface="+mn-ea"/>
-              <a:cs typeface="+mn-cs"/>
-            </a:endParaRPr>
+            <a:pPr lvl="1">
+              <a:buFont typeface="Arial" panose="020B0604020202020204" pitchFamily="34" charset="0"/>
+              <a:buChar char="•"/>
+            </a:pPr>
+            <a:r>
+              <a:rPr lang="de-DE" sz="1800" dirty="0">
+                <a:sym typeface="Wingdings" panose="05000000000000000000" pitchFamily="2" charset="2"/>
+              </a:rPr>
+              <a:t>Manifest („Inhaltverzeichnis des Images“)</a:t>
+            </a:r>
+          </a:p>
+          <a:p>
+            <a:pPr lvl="2">
+              <a:buFont typeface="Arial" panose="020B0604020202020204" pitchFamily="34" charset="0"/>
+              <a:buChar char="•"/>
+            </a:pPr>
+            <a:r>
+              <a:rPr lang="de-DE" sz="1600" dirty="0">
+                <a:sym typeface="Wingdings" panose="05000000000000000000" pitchFamily="2" charset="2"/>
+              </a:rPr>
+              <a:t>Informationen über </a:t>
+            </a:r>
+            <a:r>
+              <a:rPr lang="de-DE" sz="1600" dirty="0" err="1">
+                <a:sym typeface="Wingdings" panose="05000000000000000000" pitchFamily="2" charset="2"/>
+              </a:rPr>
+              <a:t>Layers</a:t>
+            </a:r>
+            <a:r>
+              <a:rPr lang="de-DE" sz="1600" dirty="0">
+                <a:sym typeface="Wingdings" panose="05000000000000000000" pitchFamily="2" charset="2"/>
+              </a:rPr>
+              <a:t> und Blobs des Images</a:t>
+            </a:r>
+            <a:endParaRPr lang="de-DE" sz="1600" dirty="0"/>
+          </a:p>
+          <a:p>
+            <a:pPr>
+              <a:buFont typeface="Arial" panose="020B0604020202020204" pitchFamily="34" charset="0"/>
+              <a:buChar char="•"/>
+            </a:pPr>
+            <a:r>
+              <a:rPr lang="de-DE" sz="2000" dirty="0" err="1"/>
+              <a:t>Dependency</a:t>
+            </a:r>
+            <a:r>
+              <a:rPr lang="de-DE" sz="2000" dirty="0"/>
+              <a:t> Proxy </a:t>
+            </a:r>
+            <a:r>
+              <a:rPr lang="de-DE" sz="2000" dirty="0" err="1"/>
+              <a:t>GitLab</a:t>
+            </a:r>
+            <a:r>
+              <a:rPr lang="de-DE" sz="2000" dirty="0"/>
+              <a:t> Dokumentation: </a:t>
+            </a:r>
+            <a:r>
+              <a:rPr lang="de-DE" sz="2000" dirty="0">
+                <a:hlinkClick r:id="rId4"/>
+              </a:rPr>
+              <a:t>https://docs.gitlab.com/ee/user/packages/dependency_proxy/</a:t>
+            </a:r>
+            <a:r>
+              <a:rPr lang="de-DE" sz="2000" dirty="0"/>
+              <a:t> </a:t>
+            </a:r>
+          </a:p>
+          <a:p>
+            <a:pPr>
+              <a:buFont typeface="Arial" panose="020B0604020202020204" pitchFamily="34" charset="0"/>
+              <a:buChar char="•"/>
+            </a:pPr>
+            <a:r>
+              <a:rPr lang="de-DE" sz="2000" u="sng" dirty="0"/>
+              <a:t>Hier:</a:t>
+            </a:r>
+            <a:r>
+              <a:rPr lang="de-DE" sz="2000" dirty="0"/>
+              <a:t> Keine weitere Verwendung!</a:t>
+            </a:r>
+          </a:p>
+          <a:p>
+            <a:pPr lvl="1">
+              <a:buFont typeface="Arial" panose="020B0604020202020204" pitchFamily="34" charset="0"/>
+              <a:buChar char="•"/>
+            </a:pPr>
+            <a:endParaRPr lang="de-DE" dirty="0"/>
+          </a:p>
+          <a:p>
+            <a:pPr lvl="1">
+              <a:buFont typeface="Arial" panose="020B0604020202020204" pitchFamily="34" charset="0"/>
+              <a:buChar char="•"/>
+            </a:pPr>
+            <a:endParaRPr lang="de-DE" dirty="0"/>
           </a:p>
         </p:txBody>
       </p:sp>
     </p:spTree>
     <p:extLst>
       <p:ext uri="{BB962C8B-B14F-4D97-AF65-F5344CB8AC3E}">
-        <p14:creationId xmlns:p14="http://schemas.microsoft.com/office/powerpoint/2010/main" val="3865403592"/>
+        <p14:creationId xmlns:p14="http://schemas.microsoft.com/office/powerpoint/2010/main" val="844561808"/>
       </p:ext>
     </p:extLst>
   </p:cSld>
@@ -13198,12 +12768,12 @@
               <a:buNone/>
             </a:pPr>
             <a:r>
-              <a:rPr lang="en-US" b="1" dirty="0"/>
-              <a:t>Docker-in-Docker Container Image </a:t>
+              <a:rPr lang="en-US" sz="2000" b="1" dirty="0" err="1"/>
+              <a:t>Beispiel</a:t>
             </a:r>
             <a:r>
               <a:rPr lang="en-US" sz="2000" b="1" dirty="0"/>
-              <a:t>(</a:t>
+              <a:t>: Docker-in-Docker Container Image (</a:t>
             </a:r>
             <a:r>
               <a:rPr lang="en-US" sz="2000" b="1" dirty="0">
@@ -13217,6 +12787,131 @@
               <a:rPr lang="en-US" sz="2000" b="1" dirty="0"/>
               <a:t>)</a:t>
             </a:r>
+          </a:p>
+          <a:p>
+            <a:pPr marL="0" indent="0">
+              <a:buNone/>
+            </a:pPr>
+            <a:r>
+              <a:rPr lang="en-US" sz="2000" dirty="0" err="1"/>
+              <a:t>Eigene</a:t>
+            </a:r>
+            <a:r>
+              <a:rPr lang="en-US" sz="2000" dirty="0"/>
+              <a:t> Container Images </a:t>
+            </a:r>
+            <a:r>
+              <a:rPr lang="en-US" sz="2000" dirty="0" err="1"/>
+              <a:t>mit</a:t>
+            </a:r>
+            <a:r>
+              <a:rPr lang="en-US" sz="2000" dirty="0"/>
+              <a:t> Docker-in-Docker </a:t>
+            </a:r>
+            <a:r>
+              <a:rPr lang="en-US" sz="2000" dirty="0" err="1"/>
+              <a:t>nutzen</a:t>
+            </a:r>
+            <a:endParaRPr lang="en-US" sz="2000" dirty="0"/>
+          </a:p>
+          <a:p>
+            <a:pPr marL="457200" indent="-457200">
+              <a:buFont typeface="+mj-lt"/>
+              <a:buAutoNum type="arabicPeriod"/>
+            </a:pPr>
+            <a:r>
+              <a:rPr lang="en-US" sz="2000" dirty="0"/>
+              <a:t>Docker-in-Docker </a:t>
+            </a:r>
+            <a:r>
+              <a:rPr lang="en-US" sz="2000" dirty="0" err="1"/>
+              <a:t>einrichten</a:t>
+            </a:r>
+            <a:endParaRPr lang="en-US" sz="2000" dirty="0"/>
+          </a:p>
+          <a:p>
+            <a:pPr marL="457200" indent="-457200">
+              <a:buFont typeface="+mj-lt"/>
+              <a:buAutoNum type="arabicPeriod"/>
+            </a:pPr>
+            <a:r>
+              <a:rPr lang="en-US" sz="2000" dirty="0">
+                <a:solidFill>
+                  <a:srgbClr val="FF0000"/>
+                </a:solidFill>
+                <a:latin typeface="Consolas" panose="020B0609020204030204" pitchFamily="49" charset="0"/>
+              </a:rPr>
+              <a:t>image</a:t>
+            </a:r>
+            <a:r>
+              <a:rPr lang="en-US" sz="2000" dirty="0"/>
+              <a:t> und </a:t>
+            </a:r>
+            <a:r>
+              <a:rPr lang="en-US" sz="2000" dirty="0">
+                <a:solidFill>
+                  <a:srgbClr val="FF0000"/>
+                </a:solidFill>
+                <a:latin typeface="Consolas" panose="020B0609020204030204" pitchFamily="49" charset="0"/>
+              </a:rPr>
+              <a:t>service</a:t>
+            </a:r>
+            <a:r>
+              <a:rPr lang="en-US" sz="2000" dirty="0"/>
+              <a:t> auf die Registry </a:t>
+            </a:r>
+            <a:r>
+              <a:rPr lang="en-US" sz="2000" dirty="0" err="1"/>
+              <a:t>zeigen</a:t>
+            </a:r>
+            <a:r>
+              <a:rPr lang="en-US" sz="2000" dirty="0"/>
+              <a:t> </a:t>
+            </a:r>
+            <a:r>
+              <a:rPr lang="en-US" sz="2000" dirty="0" err="1"/>
+              <a:t>lassen</a:t>
+            </a:r>
+            <a:endParaRPr lang="en-US" sz="2000" dirty="0"/>
+          </a:p>
+          <a:p>
+            <a:pPr marL="457200" indent="-457200">
+              <a:buFont typeface="+mj-lt"/>
+              <a:buAutoNum type="arabicPeriod"/>
+            </a:pPr>
+            <a:r>
+              <a:rPr lang="en-US" sz="2000" dirty="0">
+                <a:solidFill>
+                  <a:srgbClr val="FF0000"/>
+                </a:solidFill>
+                <a:latin typeface="Consolas" panose="020B0609020204030204" pitchFamily="49" charset="0"/>
+              </a:rPr>
+              <a:t>alias</a:t>
+            </a:r>
+            <a:r>
+              <a:rPr lang="en-US" sz="2000" dirty="0"/>
+              <a:t> </a:t>
+            </a:r>
+            <a:r>
+              <a:rPr lang="en-US" sz="2000" dirty="0" err="1"/>
+              <a:t>hinzufügen</a:t>
+            </a:r>
+            <a:r>
+              <a:rPr lang="en-US" sz="2000" dirty="0"/>
+              <a:t> für den </a:t>
+            </a:r>
+            <a:r>
+              <a:rPr lang="en-US" sz="2000" dirty="0">
+                <a:latin typeface="Consolas" panose="020B0609020204030204" pitchFamily="49" charset="0"/>
+              </a:rPr>
+              <a:t>service</a:t>
+            </a:r>
+          </a:p>
+          <a:p>
+            <a:pPr marL="457200" indent="-457200">
+              <a:buFont typeface="+mj-lt"/>
+              <a:buAutoNum type="arabicPeriod"/>
+            </a:pPr>
             <a:endParaRPr lang="en-US" sz="2000" dirty="0">
               <a:latin typeface="Consolas" panose="020B0609020204030204" pitchFamily="49" charset="0"/>
             </a:endParaRPr>
@@ -13226,18 +12921,18 @@
               <a:buNone/>
             </a:pPr>
             <a:r>
-              <a:rPr lang="en-US" sz="2000" dirty="0">
+              <a:rPr lang="en-US" sz="1800" dirty="0">
                 <a:latin typeface="Consolas" panose="020B0609020204030204" pitchFamily="49" charset="0"/>
               </a:rPr>
               <a:t>.</a:t>
             </a:r>
             <a:r>
-              <a:rPr lang="en-US" sz="2000" dirty="0" err="1">
+              <a:rPr lang="en-US" sz="1800" dirty="0" err="1">
                 <a:latin typeface="Consolas" panose="020B0609020204030204" pitchFamily="49" charset="0"/>
               </a:rPr>
               <a:t>gitlab-ci.yml</a:t>
             </a:r>
-            <a:endParaRPr lang="en-US" sz="2000" dirty="0">
+            <a:endParaRPr lang="en-US" sz="1800" dirty="0">
               <a:latin typeface="Consolas" panose="020B0609020204030204" pitchFamily="49" charset="0"/>
             </a:endParaRPr>
           </a:p>
@@ -13262,7 +12957,7 @@
               <a:defRPr/>
             </a:pPr>
             <a:r>
-              <a:rPr kumimoji="0" lang="en-US" sz="1600" b="0" i="0" u="none" strike="noStrike" kern="0" cap="none" spc="0" normalizeH="0" baseline="0" noProof="0" dirty="0">
+              <a:rPr kumimoji="0" lang="en-US" sz="1400" b="0" i="0" u="none" strike="noStrike" kern="0" cap="none" spc="0" normalizeH="0" baseline="0" noProof="0" dirty="0">
                 <a:ln>
                   <a:noFill/>
                 </a:ln>
@@ -13300,7 +12995,7 @@
               <a:defRPr/>
             </a:pPr>
             <a:r>
-              <a:rPr kumimoji="0" lang="en-US" sz="1600" b="0" i="0" u="none" strike="noStrike" kern="0" cap="none" spc="0" normalizeH="0" baseline="0" noProof="0" dirty="0">
+              <a:rPr kumimoji="0" lang="en-US" sz="1400" b="0" i="0" u="none" strike="noStrike" kern="0" cap="none" spc="0" normalizeH="0" baseline="0" noProof="0" dirty="0">
                 <a:ln>
                   <a:noFill/>
                 </a:ln>
@@ -13317,7 +13012,7 @@
               <a:t>  </a:t>
             </a:r>
             <a:r>
-              <a:rPr kumimoji="0" lang="en-US" sz="1600" b="0" i="0" u="none" strike="noStrike" kern="0" cap="none" spc="0" normalizeH="0" baseline="0" noProof="0" dirty="0">
+              <a:rPr kumimoji="0" lang="en-US" sz="1400" b="0" i="0" u="none" strike="noStrike" kern="0" cap="none" spc="0" normalizeH="0" baseline="0" noProof="0" dirty="0">
                 <a:ln>
                   <a:noFill/>
                 </a:ln>
@@ -13334,7 +13029,7 @@
               <a:t>image</a:t>
             </a:r>
             <a:r>
-              <a:rPr kumimoji="0" lang="en-US" sz="1600" b="0" i="0" u="none" strike="noStrike" kern="0" cap="none" spc="0" normalizeH="0" baseline="0" noProof="0" dirty="0">
+              <a:rPr kumimoji="0" lang="en-US" sz="1400" b="0" i="0" u="none" strike="noStrike" kern="0" cap="none" spc="0" normalizeH="0" baseline="0" noProof="0" dirty="0">
                 <a:ln>
                   <a:noFill/>
                 </a:ln>
@@ -13351,7 +13046,7 @@
               <a:t>: </a:t>
             </a:r>
             <a:r>
-              <a:rPr kumimoji="0" lang="en-US" sz="1600" b="0" i="0" u="none" strike="noStrike" kern="0" cap="none" spc="0" normalizeH="0" baseline="0" noProof="0" dirty="0">
+              <a:rPr kumimoji="0" lang="en-US" sz="1400" b="0" i="0" u="none" strike="noStrike" kern="0" cap="none" spc="0" normalizeH="0" baseline="0" noProof="0" dirty="0">
                 <a:ln>
                   <a:noFill/>
                 </a:ln>
@@ -13368,7 +13063,7 @@
               <a:t>${CI_DEPENDENCY_PROXY_GROUP_IMAGE_PREFIX}</a:t>
             </a:r>
             <a:r>
-              <a:rPr kumimoji="0" lang="en-US" sz="1600" b="0" i="0" u="none" strike="noStrike" kern="0" cap="none" spc="0" normalizeH="0" baseline="0" noProof="0" dirty="0">
+              <a:rPr kumimoji="0" lang="en-US" sz="1400" b="0" i="0" u="none" strike="noStrike" kern="0" cap="none" spc="0" normalizeH="0" baseline="0" noProof="0" dirty="0">
                 <a:ln>
                   <a:noFill/>
                 </a:ln>
@@ -13406,7 +13101,7 @@
               <a:defRPr/>
             </a:pPr>
             <a:r>
-              <a:rPr kumimoji="0" lang="en-US" sz="1600" b="0" i="0" u="none" strike="noStrike" kern="0" cap="none" spc="0" normalizeH="0" baseline="0" noProof="0" dirty="0">
+              <a:rPr kumimoji="0" lang="en-US" sz="1400" b="0" i="0" u="none" strike="noStrike" kern="0" cap="none" spc="0" normalizeH="0" baseline="0" noProof="0" dirty="0">
                 <a:ln>
                   <a:noFill/>
                 </a:ln>
@@ -13423,7 +13118,7 @@
               <a:t>  </a:t>
             </a:r>
             <a:r>
-              <a:rPr kumimoji="0" lang="en-US" sz="1600" b="0" i="0" u="none" strike="noStrike" kern="0" cap="none" spc="0" normalizeH="0" baseline="0" noProof="0" dirty="0">
+              <a:rPr kumimoji="0" lang="en-US" sz="1400" b="0" i="0" u="none" strike="noStrike" kern="0" cap="none" spc="0" normalizeH="0" baseline="0" noProof="0" dirty="0">
                 <a:ln>
                   <a:noFill/>
                 </a:ln>
@@ -13440,7 +13135,7 @@
               <a:t>services</a:t>
             </a:r>
             <a:r>
-              <a:rPr kumimoji="0" lang="en-US" sz="1600" b="0" i="0" u="none" strike="noStrike" kern="0" cap="none" spc="0" normalizeH="0" baseline="0" noProof="0" dirty="0">
+              <a:rPr kumimoji="0" lang="en-US" sz="1400" b="0" i="0" u="none" strike="noStrike" kern="0" cap="none" spc="0" normalizeH="0" baseline="0" noProof="0" dirty="0">
                 <a:ln>
                   <a:noFill/>
                 </a:ln>
@@ -13478,7 +13173,7 @@
               <a:defRPr/>
             </a:pPr>
             <a:r>
-              <a:rPr kumimoji="0" lang="en-US" sz="1600" b="0" i="0" u="none" strike="noStrike" kern="0" cap="none" spc="0" normalizeH="0" baseline="0" noProof="0" dirty="0">
+              <a:rPr kumimoji="0" lang="en-US" sz="1400" b="0" i="0" u="none" strike="noStrike" kern="0" cap="none" spc="0" normalizeH="0" baseline="0" noProof="0" dirty="0">
                 <a:ln>
                   <a:noFill/>
                 </a:ln>
@@ -13495,7 +13190,7 @@
               <a:t>    - name: </a:t>
             </a:r>
             <a:r>
-              <a:rPr kumimoji="0" lang="en-US" sz="1600" b="0" i="0" u="none" strike="noStrike" kern="0" cap="none" spc="0" normalizeH="0" baseline="0" noProof="0" dirty="0">
+              <a:rPr kumimoji="0" lang="en-US" sz="1400" b="0" i="0" u="none" strike="noStrike" kern="0" cap="none" spc="0" normalizeH="0" baseline="0" noProof="0" dirty="0">
                 <a:ln>
                   <a:noFill/>
                 </a:ln>
@@ -13512,7 +13207,7 @@
               <a:t>${CI_DEPENDENCY_PROXY_GROUP_IMAGE_PREFIX}</a:t>
             </a:r>
             <a:r>
-              <a:rPr kumimoji="0" lang="en-US" sz="1600" b="0" i="0" u="none" strike="noStrike" kern="0" cap="none" spc="0" normalizeH="0" baseline="0" noProof="0" dirty="0">
+              <a:rPr kumimoji="0" lang="en-US" sz="1400" b="0" i="0" u="none" strike="noStrike" kern="0" cap="none" spc="0" normalizeH="0" baseline="0" noProof="0" dirty="0">
                 <a:ln>
                   <a:noFill/>
                 </a:ln>
@@ -13550,7 +13245,7 @@
               <a:defRPr/>
             </a:pPr>
             <a:r>
-              <a:rPr kumimoji="0" lang="en-US" sz="1600" b="0" i="0" u="none" strike="noStrike" kern="0" cap="none" spc="0" normalizeH="0" baseline="0" noProof="0" dirty="0">
+              <a:rPr kumimoji="0" lang="en-US" sz="1400" b="0" i="0" u="none" strike="noStrike" kern="0" cap="none" spc="0" normalizeH="0" baseline="0" noProof="0" dirty="0">
                 <a:ln>
                   <a:noFill/>
                 </a:ln>
@@ -13567,7 +13262,7 @@
               <a:t>      </a:t>
             </a:r>
             <a:r>
-              <a:rPr kumimoji="0" lang="en-US" sz="1600" b="0" i="0" u="none" strike="noStrike" kern="0" cap="none" spc="0" normalizeH="0" baseline="0" noProof="0" dirty="0">
+              <a:rPr kumimoji="0" lang="en-US" sz="1400" b="0" i="0" u="none" strike="noStrike" kern="0" cap="none" spc="0" normalizeH="0" baseline="0" noProof="0" dirty="0">
                 <a:ln>
                   <a:noFill/>
                 </a:ln>
@@ -13584,7 +13279,7 @@
               <a:t>alias</a:t>
             </a:r>
             <a:r>
-              <a:rPr kumimoji="0" lang="en-US" sz="1600" b="0" i="0" u="none" strike="noStrike" kern="0" cap="none" spc="0" normalizeH="0" baseline="0" noProof="0" dirty="0">
+              <a:rPr kumimoji="0" lang="en-US" sz="1400" b="0" i="0" u="none" strike="noStrike" kern="0" cap="none" spc="0" normalizeH="0" baseline="0" noProof="0" dirty="0">
                 <a:ln>
                   <a:noFill/>
                 </a:ln>
@@ -13622,7 +13317,7 @@
               <a:defRPr/>
             </a:pPr>
             <a:r>
-              <a:rPr kumimoji="0" lang="en-US" sz="1600" b="0" i="0" u="none" strike="noStrike" kern="0" cap="none" spc="0" normalizeH="0" baseline="0" noProof="0" dirty="0">
+              <a:rPr kumimoji="0" lang="en-US" sz="1400" b="0" i="0" u="none" strike="noStrike" kern="0" cap="none" spc="0" normalizeH="0" baseline="0" noProof="0" dirty="0">
                 <a:ln>
                   <a:noFill/>
                 </a:ln>
@@ -13660,7 +13355,7 @@
               <a:defRPr/>
             </a:pPr>
             <a:r>
-              <a:rPr kumimoji="0" lang="en-US" sz="1600" b="0" i="0" u="none" strike="noStrike" kern="0" cap="none" spc="0" normalizeH="0" baseline="0" noProof="0" dirty="0">
+              <a:rPr kumimoji="0" lang="en-US" sz="1400" b="0" i="0" u="none" strike="noStrike" kern="0" cap="none" spc="0" normalizeH="0" baseline="0" noProof="0" dirty="0">
                 <a:ln>
                   <a:noFill/>
                 </a:ln>
@@ -13698,7 +13393,7 @@
               <a:defRPr/>
             </a:pPr>
             <a:r>
-              <a:rPr kumimoji="0" lang="en-US" sz="1600" b="0" i="0" u="none" strike="noStrike" kern="0" cap="none" spc="0" normalizeH="0" baseline="0" noProof="0" dirty="0">
+              <a:rPr kumimoji="0" lang="en-US" sz="1400" b="0" i="0" u="none" strike="noStrike" kern="0" cap="none" spc="0" normalizeH="0" baseline="0" noProof="0" dirty="0">
                 <a:ln>
                   <a:noFill/>
                 </a:ln>
@@ -13736,7 +13431,7 @@
               <a:defRPr/>
             </a:pPr>
             <a:r>
-              <a:rPr kumimoji="0" lang="en-US" sz="1600" b="0" i="0" u="none" strike="noStrike" kern="0" cap="none" spc="0" normalizeH="0" baseline="0" noProof="0" dirty="0">
+              <a:rPr kumimoji="0" lang="en-US" sz="1400" b="0" i="0" u="none" strike="noStrike" kern="0" cap="none" spc="0" normalizeH="0" baseline="0" noProof="0" dirty="0">
                 <a:ln>
                   <a:noFill/>
                 </a:ln>
@@ -13752,7 +13447,7 @@
               </a:rPr>
               <a:t>    - docker run my-docker-image /script/to/run/tests</a:t>
             </a:r>
-            <a:endParaRPr kumimoji="0" lang="en-US" sz="1200" b="0" i="0" u="none" strike="noStrike" kern="0" cap="none" spc="0" normalizeH="0" baseline="0" noProof="0" dirty="0">
+            <a:endParaRPr kumimoji="0" lang="en-US" sz="1100" b="0" i="0" u="none" strike="noStrike" kern="0" cap="none" spc="0" normalizeH="0" baseline="0" noProof="0" dirty="0">
               <a:ln>
                 <a:noFill/>
               </a:ln>
@@ -13767,182 +13462,12 @@
               <a:cs typeface="+mn-cs"/>
             </a:endParaRPr>
           </a:p>
-          <a:p>
-            <a:pPr marL="0" indent="0">
-              <a:buNone/>
-            </a:pPr>
-            <a:endParaRPr lang="en-US" sz="1600" dirty="0">
-              <a:latin typeface="Consolas" panose="020B0609020204030204" pitchFamily="49" charset="0"/>
-            </a:endParaRPr>
-          </a:p>
-          <a:p>
-            <a:pPr>
-              <a:buFont typeface="Arial" panose="020B0604020202020204" pitchFamily="34" charset="0"/>
-              <a:buChar char="•"/>
-            </a:pPr>
-            <a:r>
-              <a:rPr lang="en-US" sz="2000" dirty="0" err="1">
-                <a:latin typeface="+mj-lt"/>
-              </a:rPr>
-              <a:t>Ohne</a:t>
-            </a:r>
-            <a:r>
-              <a:rPr lang="en-US" sz="2000" dirty="0">
-                <a:latin typeface="+mj-lt"/>
-              </a:rPr>
-              <a:t> </a:t>
-            </a:r>
-            <a:r>
-              <a:rPr lang="en-US" sz="2000" dirty="0">
-                <a:solidFill>
-                  <a:srgbClr val="FF0000"/>
-                </a:solidFill>
-                <a:latin typeface="+mj-lt"/>
-              </a:rPr>
-              <a:t>service alias </a:t>
-            </a:r>
-            <a:r>
-              <a:rPr lang="en-US" sz="2000" dirty="0" err="1">
-                <a:latin typeface="+mj-lt"/>
-              </a:rPr>
-              <a:t>kann</a:t>
-            </a:r>
-            <a:r>
-              <a:rPr lang="en-US" sz="2000" dirty="0">
-                <a:latin typeface="+mj-lt"/>
-              </a:rPr>
-              <a:t> das Container Image den </a:t>
-            </a:r>
-            <a:r>
-              <a:rPr lang="en-US" sz="2000" dirty="0" err="1">
-                <a:latin typeface="Consolas" panose="020B0609020204030204" pitchFamily="49" charset="0"/>
-              </a:rPr>
-              <a:t>dind</a:t>
-            </a:r>
-            <a:r>
-              <a:rPr lang="en-US" sz="2000" dirty="0">
-                <a:latin typeface="+mj-lt"/>
-              </a:rPr>
-              <a:t> service </a:t>
-            </a:r>
-            <a:r>
-              <a:rPr lang="en-US" sz="2000" dirty="0" err="1">
-                <a:latin typeface="+mj-lt"/>
-              </a:rPr>
-              <a:t>nicht</a:t>
-            </a:r>
-            <a:r>
-              <a:rPr lang="en-US" sz="2000" dirty="0">
-                <a:latin typeface="+mj-lt"/>
-              </a:rPr>
-              <a:t> </a:t>
-            </a:r>
-            <a:r>
-              <a:rPr lang="en-US" sz="2000" dirty="0" err="1">
-                <a:latin typeface="+mj-lt"/>
-              </a:rPr>
-              <a:t>finden</a:t>
-            </a:r>
-            <a:r>
-              <a:rPr lang="en-US" sz="2000" dirty="0">
-                <a:latin typeface="+mj-lt"/>
-              </a:rPr>
-              <a:t> und </a:t>
-            </a:r>
-            <a:r>
-              <a:rPr lang="en-US" sz="2000" dirty="0" err="1">
-                <a:latin typeface="+mj-lt"/>
-              </a:rPr>
-              <a:t>folgende</a:t>
-            </a:r>
-            <a:r>
-              <a:rPr lang="en-US" sz="2000" dirty="0">
-                <a:latin typeface="+mj-lt"/>
-              </a:rPr>
-              <a:t> </a:t>
-            </a:r>
-            <a:r>
-              <a:rPr lang="en-US" sz="2000" dirty="0" err="1">
-                <a:latin typeface="+mj-lt"/>
-              </a:rPr>
-              <a:t>Fehlermeldung</a:t>
-            </a:r>
-            <a:r>
-              <a:rPr lang="en-US" sz="2000" dirty="0">
-                <a:latin typeface="+mj-lt"/>
-              </a:rPr>
-              <a:t> </a:t>
-            </a:r>
-            <a:r>
-              <a:rPr lang="en-US" sz="2000" dirty="0" err="1">
-                <a:latin typeface="+mj-lt"/>
-              </a:rPr>
-              <a:t>erscheint</a:t>
-            </a:r>
-            <a:r>
-              <a:rPr lang="en-US" sz="2000" dirty="0">
-                <a:latin typeface="+mj-lt"/>
-              </a:rPr>
-              <a:t>:</a:t>
-            </a:r>
-          </a:p>
-          <a:p>
-            <a:pPr lvl="1">
-              <a:buFont typeface="Arial" panose="020B0604020202020204" pitchFamily="34" charset="0"/>
-              <a:buChar char="•"/>
-            </a:pPr>
-            <a:r>
-              <a:rPr lang="en-US" sz="1600" dirty="0">
-                <a:latin typeface="Consolas" panose="020B0609020204030204" pitchFamily="49" charset="0"/>
-              </a:rPr>
-              <a:t>error during connect: Get http://docker:2376/v1.39/info: dial </a:t>
-            </a:r>
-            <a:r>
-              <a:rPr lang="en-US" sz="1600" dirty="0" err="1">
-                <a:latin typeface="Consolas" panose="020B0609020204030204" pitchFamily="49" charset="0"/>
-              </a:rPr>
-              <a:t>tcp</a:t>
-            </a:r>
-            <a:r>
-              <a:rPr lang="en-US" sz="1600" dirty="0">
-                <a:latin typeface="Consolas" panose="020B0609020204030204" pitchFamily="49" charset="0"/>
-              </a:rPr>
-              <a:t>: lookup docker on 192.168.0.1:53: no such host</a:t>
-            </a:r>
-          </a:p>
-          <a:p>
-            <a:pPr lvl="1">
-              <a:buFont typeface="Arial" panose="020B0604020202020204" pitchFamily="34" charset="0"/>
-              <a:buChar char="•"/>
-            </a:pPr>
-            <a:endParaRPr lang="en-US" sz="1600" dirty="0">
-              <a:latin typeface="Consolas" panose="020B0609020204030204" pitchFamily="49" charset="0"/>
-            </a:endParaRPr>
-          </a:p>
-          <a:p>
-            <a:pPr lvl="1">
-              <a:buFont typeface="Arial" panose="020B0604020202020204" pitchFamily="34" charset="0"/>
-              <a:buChar char="•"/>
-            </a:pPr>
-            <a:endParaRPr lang="en-US" sz="1600" dirty="0">
-              <a:latin typeface="Consolas" panose="020B0609020204030204" pitchFamily="49" charset="0"/>
-            </a:endParaRPr>
-          </a:p>
-          <a:p>
-            <a:pPr lvl="1">
-              <a:buFont typeface="Arial" panose="020B0604020202020204" pitchFamily="34" charset="0"/>
-              <a:buChar char="•"/>
-            </a:pPr>
-            <a:endParaRPr lang="en-US" sz="1600" dirty="0">
-              <a:latin typeface="Consolas" panose="020B0609020204030204" pitchFamily="49" charset="0"/>
-            </a:endParaRPr>
-          </a:p>
         </p:txBody>
       </p:sp>
     </p:spTree>
     <p:extLst>
       <p:ext uri="{BB962C8B-B14F-4D97-AF65-F5344CB8AC3E}">
-        <p14:creationId xmlns:p14="http://schemas.microsoft.com/office/powerpoint/2010/main" val="3445805958"/>
+        <p14:creationId xmlns:p14="http://schemas.microsoft.com/office/powerpoint/2010/main" val="3865403592"/>
       </p:ext>
     </p:extLst>
   </p:cSld>
@@ -13974,7 +13499,7 @@
           <p:cNvPr id="2" name="Titel 1">
             <a:extLst>
               <a:ext uri="{FF2B5EF4-FFF2-40B4-BE49-F238E27FC236}">
-                <a16:creationId xmlns:a16="http://schemas.microsoft.com/office/drawing/2014/main" id="{DB1F447C-2F61-B060-8EFE-D98620927A6E}"/>
+                <a16:creationId xmlns:a16="http://schemas.microsoft.com/office/drawing/2014/main" id="{021C1D90-AB38-D152-26B9-E4AB49CCFEE9}"/>
               </a:ext>
             </a:extLst>
           </p:cNvPr>
@@ -14011,7 +13536,7 @@
           <p:cNvPr id="3" name="Inhaltsplatzhalter 2">
             <a:extLst>
               <a:ext uri="{FF2B5EF4-FFF2-40B4-BE49-F238E27FC236}">
-                <a16:creationId xmlns:a16="http://schemas.microsoft.com/office/drawing/2014/main" id="{68EC2247-CA50-F34D-5B3B-2171A8AD687B}"/>
+                <a16:creationId xmlns:a16="http://schemas.microsoft.com/office/drawing/2014/main" id="{01B30DD9-6590-DB7B-37D7-65618A4BAC0E}"/>
               </a:ext>
             </a:extLst>
           </p:cNvPr>
@@ -14031,13 +13556,582 @@
               <a:buNone/>
             </a:pPr>
             <a:r>
-              <a:rPr lang="de-DE" b="1" dirty="0" err="1"/>
-              <a:t>Dependency</a:t>
-            </a:r>
-            <a:r>
-              <a:rPr lang="de-DE" b="1" dirty="0"/>
-              <a:t> Proxy</a:t>
-            </a:r>
+              <a:rPr lang="en-US" b="1" dirty="0"/>
+              <a:t>Docker-in-Docker Container Image </a:t>
+            </a:r>
+            <a:r>
+              <a:rPr lang="en-US" sz="2000" b="1" dirty="0"/>
+              <a:t>(</a:t>
+            </a:r>
+            <a:r>
+              <a:rPr lang="en-US" sz="2000" b="1" dirty="0">
+                <a:solidFill>
+                  <a:srgbClr val="0249FC"/>
+                </a:solidFill>
+              </a:rPr>
+              <a:t>Dependency Proxy</a:t>
+            </a:r>
+            <a:r>
+              <a:rPr lang="en-US" sz="2000" b="1" dirty="0"/>
+              <a:t>)</a:t>
+            </a:r>
+            <a:endParaRPr lang="en-US" sz="2000" dirty="0">
+              <a:latin typeface="Consolas" panose="020B0609020204030204" pitchFamily="49" charset="0"/>
+            </a:endParaRPr>
+          </a:p>
+          <a:p>
+            <a:pPr marL="0" indent="0">
+              <a:buNone/>
+            </a:pPr>
+            <a:r>
+              <a:rPr lang="en-US" sz="2000" dirty="0">
+                <a:latin typeface="Consolas" panose="020B0609020204030204" pitchFamily="49" charset="0"/>
+              </a:rPr>
+              <a:t>.</a:t>
+            </a:r>
+            <a:r>
+              <a:rPr lang="en-US" sz="2000" dirty="0" err="1">
+                <a:latin typeface="Consolas" panose="020B0609020204030204" pitchFamily="49" charset="0"/>
+              </a:rPr>
+              <a:t>gitlab-ci.yml</a:t>
+            </a:r>
+            <a:endParaRPr lang="en-US" sz="2000" dirty="0">
+              <a:latin typeface="Consolas" panose="020B0609020204030204" pitchFamily="49" charset="0"/>
+            </a:endParaRPr>
+          </a:p>
+          <a:p>
+            <a:pPr marL="0" marR="0" lvl="0" indent="0" algn="l" defTabSz="914400" rtl="0" eaLnBrk="1" fontAlgn="base" latinLnBrk="0" hangingPunct="1">
+              <a:lnSpc>
+                <a:spcPct val="100000"/>
+              </a:lnSpc>
+              <a:spcBef>
+                <a:spcPct val="20000"/>
+              </a:spcBef>
+              <a:spcAft>
+                <a:spcPct val="0"/>
+              </a:spcAft>
+              <a:buClr>
+                <a:srgbClr val="008C5A"/>
+              </a:buClr>
+              <a:buSzTx/>
+              <a:buFont typeface="Monotype Sorts" pitchFamily="2" charset="2"/>
+              <a:buNone/>
+              <a:tabLst/>
+              <a:defRPr/>
+            </a:pPr>
+            <a:r>
+              <a:rPr kumimoji="0" lang="en-US" sz="1600" b="0" i="0" u="none" strike="noStrike" kern="0" cap="none" spc="0" normalizeH="0" baseline="0" noProof="0" dirty="0">
+                <a:ln>
+                  <a:noFill/>
+                </a:ln>
+                <a:solidFill>
+                  <a:srgbClr val="000000"/>
+                </a:solidFill>
+                <a:effectLst/>
+                <a:uLnTx/>
+                <a:uFillTx/>
+                <a:latin typeface="Consolas" panose="020B0609020204030204" pitchFamily="49" charset="0"/>
+                <a:ea typeface="+mn-ea"/>
+                <a:cs typeface="+mn-cs"/>
+              </a:rPr>
+              <a:t>build:</a:t>
+            </a:r>
+          </a:p>
+          <a:p>
+            <a:pPr marL="0" marR="0" lvl="0" indent="0" algn="l" defTabSz="914400" rtl="0" eaLnBrk="1" fontAlgn="base" latinLnBrk="0" hangingPunct="1">
+              <a:lnSpc>
+                <a:spcPct val="100000"/>
+              </a:lnSpc>
+              <a:spcBef>
+                <a:spcPct val="20000"/>
+              </a:spcBef>
+              <a:spcAft>
+                <a:spcPct val="0"/>
+              </a:spcAft>
+              <a:buClr>
+                <a:srgbClr val="008C5A"/>
+              </a:buClr>
+              <a:buSzTx/>
+              <a:buFont typeface="Monotype Sorts" pitchFamily="2" charset="2"/>
+              <a:buNone/>
+              <a:tabLst/>
+              <a:defRPr/>
+            </a:pPr>
+            <a:r>
+              <a:rPr kumimoji="0" lang="en-US" sz="1600" b="0" i="0" u="none" strike="noStrike" kern="0" cap="none" spc="0" normalizeH="0" baseline="0" noProof="0" dirty="0">
+                <a:ln>
+                  <a:noFill/>
+                </a:ln>
+                <a:solidFill>
+                  <a:srgbClr val="000000"/>
+                </a:solidFill>
+                <a:effectLst/>
+                <a:uLnTx/>
+                <a:uFillTx/>
+                <a:latin typeface="Consolas" panose="020B0609020204030204" pitchFamily="49" charset="0"/>
+                <a:ea typeface="+mn-ea"/>
+                <a:cs typeface="+mn-cs"/>
+              </a:rPr>
+              <a:t>  </a:t>
+            </a:r>
+            <a:r>
+              <a:rPr kumimoji="0" lang="en-US" sz="1600" b="0" i="0" u="none" strike="noStrike" kern="0" cap="none" spc="0" normalizeH="0" baseline="0" noProof="0" dirty="0">
+                <a:ln>
+                  <a:noFill/>
+                </a:ln>
+                <a:solidFill>
+                  <a:srgbClr val="FF0000"/>
+                </a:solidFill>
+                <a:effectLst/>
+                <a:uLnTx/>
+                <a:uFillTx/>
+                <a:latin typeface="Consolas" panose="020B0609020204030204" pitchFamily="49" charset="0"/>
+                <a:ea typeface="+mn-ea"/>
+                <a:cs typeface="+mn-cs"/>
+              </a:rPr>
+              <a:t>image</a:t>
+            </a:r>
+            <a:r>
+              <a:rPr kumimoji="0" lang="en-US" sz="1600" b="0" i="0" u="none" strike="noStrike" kern="0" cap="none" spc="0" normalizeH="0" baseline="0" noProof="0" dirty="0">
+                <a:ln>
+                  <a:noFill/>
+                </a:ln>
+                <a:solidFill>
+                  <a:srgbClr val="000000"/>
+                </a:solidFill>
+                <a:effectLst/>
+                <a:uLnTx/>
+                <a:uFillTx/>
+                <a:latin typeface="Consolas" panose="020B0609020204030204" pitchFamily="49" charset="0"/>
+                <a:ea typeface="+mn-ea"/>
+                <a:cs typeface="+mn-cs"/>
+              </a:rPr>
+              <a:t>: </a:t>
+            </a:r>
+            <a:r>
+              <a:rPr kumimoji="0" lang="en-US" sz="1600" b="0" i="0" u="none" strike="noStrike" kern="0" cap="none" spc="0" normalizeH="0" baseline="0" noProof="0" dirty="0">
+                <a:ln>
+                  <a:noFill/>
+                </a:ln>
+                <a:solidFill>
+                  <a:srgbClr val="0249FC"/>
+                </a:solidFill>
+                <a:effectLst/>
+                <a:uLnTx/>
+                <a:uFillTx/>
+                <a:latin typeface="Consolas" panose="020B0609020204030204" pitchFamily="49" charset="0"/>
+                <a:ea typeface="+mn-ea"/>
+                <a:cs typeface="+mn-cs"/>
+              </a:rPr>
+              <a:t>${CI_DEPENDENCY_PROXY_GROUP_IMAGE_PREFIX}</a:t>
+            </a:r>
+            <a:r>
+              <a:rPr kumimoji="0" lang="en-US" sz="1600" b="0" i="0" u="none" strike="noStrike" kern="0" cap="none" spc="0" normalizeH="0" baseline="0" noProof="0" dirty="0">
+                <a:ln>
+                  <a:noFill/>
+                </a:ln>
+                <a:solidFill>
+                  <a:srgbClr val="000000"/>
+                </a:solidFill>
+                <a:effectLst/>
+                <a:uLnTx/>
+                <a:uFillTx/>
+                <a:latin typeface="Consolas" panose="020B0609020204030204" pitchFamily="49" charset="0"/>
+                <a:ea typeface="+mn-ea"/>
+                <a:cs typeface="+mn-cs"/>
+              </a:rPr>
+              <a:t>/docker:20.10.16</a:t>
+            </a:r>
+          </a:p>
+          <a:p>
+            <a:pPr marL="0" marR="0" lvl="0" indent="0" algn="l" defTabSz="914400" rtl="0" eaLnBrk="1" fontAlgn="base" latinLnBrk="0" hangingPunct="1">
+              <a:lnSpc>
+                <a:spcPct val="100000"/>
+              </a:lnSpc>
+              <a:spcBef>
+                <a:spcPct val="20000"/>
+              </a:spcBef>
+              <a:spcAft>
+                <a:spcPct val="0"/>
+              </a:spcAft>
+              <a:buClr>
+                <a:srgbClr val="008C5A"/>
+              </a:buClr>
+              <a:buSzTx/>
+              <a:buFont typeface="Monotype Sorts" pitchFamily="2" charset="2"/>
+              <a:buNone/>
+              <a:tabLst/>
+              <a:defRPr/>
+            </a:pPr>
+            <a:r>
+              <a:rPr kumimoji="0" lang="en-US" sz="1600" b="0" i="0" u="none" strike="noStrike" kern="0" cap="none" spc="0" normalizeH="0" baseline="0" noProof="0" dirty="0">
+                <a:ln>
+                  <a:noFill/>
+                </a:ln>
+                <a:solidFill>
+                  <a:srgbClr val="000000"/>
+                </a:solidFill>
+                <a:effectLst/>
+                <a:uLnTx/>
+                <a:uFillTx/>
+                <a:latin typeface="Consolas" panose="020B0609020204030204" pitchFamily="49" charset="0"/>
+                <a:ea typeface="+mn-ea"/>
+                <a:cs typeface="+mn-cs"/>
+              </a:rPr>
+              <a:t>  </a:t>
+            </a:r>
+            <a:r>
+              <a:rPr kumimoji="0" lang="en-US" sz="1600" b="0" i="0" u="none" strike="noStrike" kern="0" cap="none" spc="0" normalizeH="0" baseline="0" noProof="0" dirty="0">
+                <a:ln>
+                  <a:noFill/>
+                </a:ln>
+                <a:solidFill>
+                  <a:srgbClr val="FF0000"/>
+                </a:solidFill>
+                <a:effectLst/>
+                <a:uLnTx/>
+                <a:uFillTx/>
+                <a:latin typeface="Consolas" panose="020B0609020204030204" pitchFamily="49" charset="0"/>
+                <a:ea typeface="+mn-ea"/>
+                <a:cs typeface="+mn-cs"/>
+              </a:rPr>
+              <a:t>services</a:t>
+            </a:r>
+            <a:r>
+              <a:rPr kumimoji="0" lang="en-US" sz="1600" b="0" i="0" u="none" strike="noStrike" kern="0" cap="none" spc="0" normalizeH="0" baseline="0" noProof="0" dirty="0">
+                <a:ln>
+                  <a:noFill/>
+                </a:ln>
+                <a:solidFill>
+                  <a:srgbClr val="000000"/>
+                </a:solidFill>
+                <a:effectLst/>
+                <a:uLnTx/>
+                <a:uFillTx/>
+                <a:latin typeface="Consolas" panose="020B0609020204030204" pitchFamily="49" charset="0"/>
+                <a:ea typeface="+mn-ea"/>
+                <a:cs typeface="+mn-cs"/>
+              </a:rPr>
+              <a:t>:</a:t>
+            </a:r>
+          </a:p>
+          <a:p>
+            <a:pPr marL="0" marR="0" lvl="0" indent="0" algn="l" defTabSz="914400" rtl="0" eaLnBrk="1" fontAlgn="base" latinLnBrk="0" hangingPunct="1">
+              <a:lnSpc>
+                <a:spcPct val="100000"/>
+              </a:lnSpc>
+              <a:spcBef>
+                <a:spcPct val="20000"/>
+              </a:spcBef>
+              <a:spcAft>
+                <a:spcPct val="0"/>
+              </a:spcAft>
+              <a:buClr>
+                <a:srgbClr val="008C5A"/>
+              </a:buClr>
+              <a:buSzTx/>
+              <a:buFont typeface="Monotype Sorts" pitchFamily="2" charset="2"/>
+              <a:buNone/>
+              <a:tabLst/>
+              <a:defRPr/>
+            </a:pPr>
+            <a:r>
+              <a:rPr kumimoji="0" lang="en-US" sz="1600" b="0" i="0" u="none" strike="noStrike" kern="0" cap="none" spc="0" normalizeH="0" baseline="0" noProof="0" dirty="0">
+                <a:ln>
+                  <a:noFill/>
+                </a:ln>
+                <a:solidFill>
+                  <a:srgbClr val="000000"/>
+                </a:solidFill>
+                <a:effectLst/>
+                <a:uLnTx/>
+                <a:uFillTx/>
+                <a:latin typeface="Consolas" panose="020B0609020204030204" pitchFamily="49" charset="0"/>
+                <a:ea typeface="+mn-ea"/>
+                <a:cs typeface="+mn-cs"/>
+              </a:rPr>
+              <a:t>    - name: </a:t>
+            </a:r>
+            <a:r>
+              <a:rPr kumimoji="0" lang="en-US" sz="1600" b="0" i="0" u="none" strike="noStrike" kern="0" cap="none" spc="0" normalizeH="0" baseline="0" noProof="0" dirty="0">
+                <a:ln>
+                  <a:noFill/>
+                </a:ln>
+                <a:solidFill>
+                  <a:srgbClr val="0249FC"/>
+                </a:solidFill>
+                <a:effectLst/>
+                <a:uLnTx/>
+                <a:uFillTx/>
+                <a:latin typeface="Consolas" panose="020B0609020204030204" pitchFamily="49" charset="0"/>
+                <a:ea typeface="+mn-ea"/>
+                <a:cs typeface="+mn-cs"/>
+              </a:rPr>
+              <a:t>${CI_DEPENDENCY_PROXY_GROUP_IMAGE_PREFIX}</a:t>
+            </a:r>
+            <a:r>
+              <a:rPr kumimoji="0" lang="en-US" sz="1600" b="0" i="0" u="none" strike="noStrike" kern="0" cap="none" spc="0" normalizeH="0" baseline="0" noProof="0" dirty="0">
+                <a:ln>
+                  <a:noFill/>
+                </a:ln>
+                <a:solidFill>
+                  <a:srgbClr val="000000"/>
+                </a:solidFill>
+                <a:effectLst/>
+                <a:uLnTx/>
+                <a:uFillTx/>
+                <a:latin typeface="Consolas" panose="020B0609020204030204" pitchFamily="49" charset="0"/>
+                <a:ea typeface="+mn-ea"/>
+                <a:cs typeface="+mn-cs"/>
+              </a:rPr>
+              <a:t>/docker:18.09.7-dind</a:t>
+            </a:r>
+          </a:p>
+          <a:p>
+            <a:pPr marL="0" marR="0" lvl="0" indent="0" algn="l" defTabSz="914400" rtl="0" eaLnBrk="1" fontAlgn="base" latinLnBrk="0" hangingPunct="1">
+              <a:lnSpc>
+                <a:spcPct val="100000"/>
+              </a:lnSpc>
+              <a:spcBef>
+                <a:spcPct val="20000"/>
+              </a:spcBef>
+              <a:spcAft>
+                <a:spcPct val="0"/>
+              </a:spcAft>
+              <a:buClr>
+                <a:srgbClr val="008C5A"/>
+              </a:buClr>
+              <a:buSzTx/>
+              <a:buFont typeface="Monotype Sorts" pitchFamily="2" charset="2"/>
+              <a:buNone/>
+              <a:tabLst/>
+              <a:defRPr/>
+            </a:pPr>
+            <a:r>
+              <a:rPr kumimoji="0" lang="en-US" sz="1600" b="0" i="0" u="none" strike="noStrike" kern="0" cap="none" spc="0" normalizeH="0" baseline="0" noProof="0" dirty="0">
+                <a:ln>
+                  <a:noFill/>
+                </a:ln>
+                <a:solidFill>
+                  <a:srgbClr val="000000"/>
+                </a:solidFill>
+                <a:effectLst/>
+                <a:uLnTx/>
+                <a:uFillTx/>
+                <a:latin typeface="Consolas" panose="020B0609020204030204" pitchFamily="49" charset="0"/>
+                <a:ea typeface="+mn-ea"/>
+                <a:cs typeface="+mn-cs"/>
+              </a:rPr>
+              <a:t>      </a:t>
+            </a:r>
+            <a:r>
+              <a:rPr kumimoji="0" lang="en-US" sz="1600" b="0" i="0" u="none" strike="noStrike" kern="0" cap="none" spc="0" normalizeH="0" baseline="0" noProof="0" dirty="0">
+                <a:ln>
+                  <a:noFill/>
+                </a:ln>
+                <a:solidFill>
+                  <a:srgbClr val="FF0000"/>
+                </a:solidFill>
+                <a:effectLst/>
+                <a:uLnTx/>
+                <a:uFillTx/>
+                <a:latin typeface="Consolas" panose="020B0609020204030204" pitchFamily="49" charset="0"/>
+                <a:ea typeface="+mn-ea"/>
+                <a:cs typeface="+mn-cs"/>
+              </a:rPr>
+              <a:t>alias</a:t>
+            </a:r>
+            <a:r>
+              <a:rPr kumimoji="0" lang="en-US" sz="1600" b="0" i="0" u="none" strike="noStrike" kern="0" cap="none" spc="0" normalizeH="0" baseline="0" noProof="0" dirty="0">
+                <a:ln>
+                  <a:noFill/>
+                </a:ln>
+                <a:solidFill>
+                  <a:srgbClr val="000000"/>
+                </a:solidFill>
+                <a:effectLst/>
+                <a:uLnTx/>
+                <a:uFillTx/>
+                <a:latin typeface="Consolas" panose="020B0609020204030204" pitchFamily="49" charset="0"/>
+                <a:ea typeface="+mn-ea"/>
+                <a:cs typeface="+mn-cs"/>
+              </a:rPr>
+              <a:t>: docker</a:t>
+            </a:r>
+          </a:p>
+          <a:p>
+            <a:pPr marL="0" marR="0" lvl="0" indent="0" algn="l" defTabSz="914400" rtl="0" eaLnBrk="1" fontAlgn="base" latinLnBrk="0" hangingPunct="1">
+              <a:lnSpc>
+                <a:spcPct val="100000"/>
+              </a:lnSpc>
+              <a:spcBef>
+                <a:spcPct val="20000"/>
+              </a:spcBef>
+              <a:spcAft>
+                <a:spcPct val="0"/>
+              </a:spcAft>
+              <a:buClr>
+                <a:srgbClr val="008C5A"/>
+              </a:buClr>
+              <a:buSzTx/>
+              <a:buFont typeface="Monotype Sorts" pitchFamily="2" charset="2"/>
+              <a:buNone/>
+              <a:tabLst/>
+              <a:defRPr/>
+            </a:pPr>
+            <a:r>
+              <a:rPr kumimoji="0" lang="en-US" sz="1600" b="0" i="0" u="none" strike="noStrike" kern="0" cap="none" spc="0" normalizeH="0" baseline="0" noProof="0" dirty="0">
+                <a:ln>
+                  <a:noFill/>
+                </a:ln>
+                <a:solidFill>
+                  <a:srgbClr val="000000"/>
+                </a:solidFill>
+                <a:effectLst/>
+                <a:uLnTx/>
+                <a:uFillTx/>
+                <a:latin typeface="Consolas" panose="020B0609020204030204" pitchFamily="49" charset="0"/>
+                <a:ea typeface="+mn-ea"/>
+                <a:cs typeface="+mn-cs"/>
+              </a:rPr>
+              <a:t>  stage: build</a:t>
+            </a:r>
+          </a:p>
+          <a:p>
+            <a:pPr marL="0" marR="0" lvl="0" indent="0" algn="l" defTabSz="914400" rtl="0" eaLnBrk="1" fontAlgn="base" latinLnBrk="0" hangingPunct="1">
+              <a:lnSpc>
+                <a:spcPct val="100000"/>
+              </a:lnSpc>
+              <a:spcBef>
+                <a:spcPct val="20000"/>
+              </a:spcBef>
+              <a:spcAft>
+                <a:spcPct val="0"/>
+              </a:spcAft>
+              <a:buClr>
+                <a:srgbClr val="008C5A"/>
+              </a:buClr>
+              <a:buSzTx/>
+              <a:buFont typeface="Monotype Sorts" pitchFamily="2" charset="2"/>
+              <a:buNone/>
+              <a:tabLst/>
+              <a:defRPr/>
+            </a:pPr>
+            <a:r>
+              <a:rPr kumimoji="0" lang="en-US" sz="1600" b="0" i="0" u="none" strike="noStrike" kern="0" cap="none" spc="0" normalizeH="0" baseline="0" noProof="0" dirty="0">
+                <a:ln>
+                  <a:noFill/>
+                </a:ln>
+                <a:solidFill>
+                  <a:srgbClr val="000000"/>
+                </a:solidFill>
+                <a:effectLst/>
+                <a:uLnTx/>
+                <a:uFillTx/>
+                <a:latin typeface="Consolas" panose="020B0609020204030204" pitchFamily="49" charset="0"/>
+                <a:ea typeface="+mn-ea"/>
+                <a:cs typeface="+mn-cs"/>
+              </a:rPr>
+              <a:t>  script:</a:t>
+            </a:r>
+          </a:p>
+          <a:p>
+            <a:pPr marL="0" marR="0" lvl="0" indent="0" algn="l" defTabSz="914400" rtl="0" eaLnBrk="1" fontAlgn="base" latinLnBrk="0" hangingPunct="1">
+              <a:lnSpc>
+                <a:spcPct val="100000"/>
+              </a:lnSpc>
+              <a:spcBef>
+                <a:spcPct val="20000"/>
+              </a:spcBef>
+              <a:spcAft>
+                <a:spcPct val="0"/>
+              </a:spcAft>
+              <a:buClr>
+                <a:srgbClr val="008C5A"/>
+              </a:buClr>
+              <a:buSzTx/>
+              <a:buFont typeface="Monotype Sorts" pitchFamily="2" charset="2"/>
+              <a:buNone/>
+              <a:tabLst/>
+              <a:defRPr/>
+            </a:pPr>
+            <a:r>
+              <a:rPr kumimoji="0" lang="en-US" sz="1600" b="0" i="0" u="none" strike="noStrike" kern="0" cap="none" spc="0" normalizeH="0" baseline="0" noProof="0" dirty="0">
+                <a:ln>
+                  <a:noFill/>
+                </a:ln>
+                <a:solidFill>
+                  <a:srgbClr val="000000"/>
+                </a:solidFill>
+                <a:effectLst/>
+                <a:uLnTx/>
+                <a:uFillTx/>
+                <a:latin typeface="Consolas" panose="020B0609020204030204" pitchFamily="49" charset="0"/>
+                <a:ea typeface="+mn-ea"/>
+                <a:cs typeface="+mn-cs"/>
+              </a:rPr>
+              <a:t>    - docker build -t my-docker-image .</a:t>
+            </a:r>
+          </a:p>
+          <a:p>
+            <a:pPr marL="0" marR="0" lvl="0" indent="0" algn="l" defTabSz="914400" rtl="0" eaLnBrk="1" fontAlgn="base" latinLnBrk="0" hangingPunct="1">
+              <a:lnSpc>
+                <a:spcPct val="100000"/>
+              </a:lnSpc>
+              <a:spcBef>
+                <a:spcPct val="20000"/>
+              </a:spcBef>
+              <a:spcAft>
+                <a:spcPct val="0"/>
+              </a:spcAft>
+              <a:buClr>
+                <a:srgbClr val="008C5A"/>
+              </a:buClr>
+              <a:buSzTx/>
+              <a:buFont typeface="Monotype Sorts" pitchFamily="2" charset="2"/>
+              <a:buNone/>
+              <a:tabLst/>
+              <a:defRPr/>
+            </a:pPr>
+            <a:r>
+              <a:rPr kumimoji="0" lang="en-US" sz="1600" b="0" i="0" u="none" strike="noStrike" kern="0" cap="none" spc="0" normalizeH="0" baseline="0" noProof="0" dirty="0">
+                <a:ln>
+                  <a:noFill/>
+                </a:ln>
+                <a:solidFill>
+                  <a:srgbClr val="000000"/>
+                </a:solidFill>
+                <a:effectLst/>
+                <a:uLnTx/>
+                <a:uFillTx/>
+                <a:latin typeface="Consolas" panose="020B0609020204030204" pitchFamily="49" charset="0"/>
+                <a:ea typeface="+mn-ea"/>
+                <a:cs typeface="+mn-cs"/>
+              </a:rPr>
+              <a:t>    - docker run my-docker-image /script/to/run/tests</a:t>
+            </a:r>
+            <a:endParaRPr kumimoji="0" lang="en-US" sz="1200" b="0" i="0" u="none" strike="noStrike" kern="0" cap="none" spc="0" normalizeH="0" baseline="0" noProof="0" dirty="0">
+              <a:ln>
+                <a:noFill/>
+              </a:ln>
+              <a:solidFill>
+                <a:srgbClr val="000000"/>
+              </a:solidFill>
+              <a:effectLst/>
+              <a:uLnTx/>
+              <a:uFillTx/>
+              <a:latin typeface="Consolas" panose="020B0609020204030204" pitchFamily="49" charset="0"/>
+              <a:ea typeface="+mn-ea"/>
+              <a:cs typeface="+mn-cs"/>
+            </a:endParaRPr>
+          </a:p>
+          <a:p>
+            <a:pPr marL="0" indent="0">
+              <a:buNone/>
+            </a:pPr>
+            <a:endParaRPr lang="en-US" sz="1600" dirty="0">
+              <a:latin typeface="Consolas" panose="020B0609020204030204" pitchFamily="49" charset="0"/>
+            </a:endParaRPr>
           </a:p>
           <a:p>
             <a:pPr>
@@ -14045,8 +14139,109 @@
               <a:buChar char="•"/>
             </a:pPr>
             <a:r>
-              <a:rPr lang="de-DE" sz="2000" dirty="0"/>
-              <a:t>Lokaler Proxy</a:t>
+              <a:rPr lang="en-US" sz="2000" dirty="0" err="1">
+                <a:latin typeface="+mj-lt"/>
+              </a:rPr>
+              <a:t>Ohne</a:t>
+            </a:r>
+            <a:r>
+              <a:rPr lang="en-US" sz="2000" dirty="0">
+                <a:latin typeface="+mj-lt"/>
+              </a:rPr>
+              <a:t> </a:t>
+            </a:r>
+            <a:r>
+              <a:rPr lang="en-US" sz="2000" dirty="0">
+                <a:solidFill>
+                  <a:srgbClr val="FF0000"/>
+                </a:solidFill>
+                <a:latin typeface="+mj-lt"/>
+              </a:rPr>
+              <a:t>service alias </a:t>
+            </a:r>
+            <a:r>
+              <a:rPr lang="en-US" sz="2000" dirty="0" err="1">
+                <a:latin typeface="+mj-lt"/>
+              </a:rPr>
+              <a:t>kann</a:t>
+            </a:r>
+            <a:r>
+              <a:rPr lang="en-US" sz="2000" dirty="0">
+                <a:latin typeface="+mj-lt"/>
+              </a:rPr>
+              <a:t> das Container Image den </a:t>
+            </a:r>
+            <a:r>
+              <a:rPr lang="en-US" sz="2000" dirty="0" err="1">
+                <a:latin typeface="Consolas" panose="020B0609020204030204" pitchFamily="49" charset="0"/>
+              </a:rPr>
+              <a:t>dind</a:t>
+            </a:r>
+            <a:r>
+              <a:rPr lang="en-US" sz="2000" dirty="0">
+                <a:latin typeface="+mj-lt"/>
+              </a:rPr>
+              <a:t> service </a:t>
+            </a:r>
+            <a:r>
+              <a:rPr lang="en-US" sz="2000" dirty="0" err="1">
+                <a:latin typeface="+mj-lt"/>
+              </a:rPr>
+              <a:t>nicht</a:t>
+            </a:r>
+            <a:r>
+              <a:rPr lang="en-US" sz="2000" dirty="0">
+                <a:latin typeface="+mj-lt"/>
+              </a:rPr>
+              <a:t> </a:t>
+            </a:r>
+            <a:r>
+              <a:rPr lang="en-US" sz="2000" dirty="0" err="1">
+                <a:latin typeface="+mj-lt"/>
+              </a:rPr>
+              <a:t>finden</a:t>
+            </a:r>
+            <a:r>
+              <a:rPr lang="en-US" sz="2000" dirty="0">
+                <a:latin typeface="+mj-lt"/>
+              </a:rPr>
+              <a:t> und </a:t>
+            </a:r>
+            <a:r>
+              <a:rPr lang="en-US" sz="2000" dirty="0" err="1">
+                <a:latin typeface="+mj-lt"/>
+              </a:rPr>
+              <a:t>folgende</a:t>
+            </a:r>
+            <a:r>
+              <a:rPr lang="en-US" sz="2000" dirty="0">
+                <a:latin typeface="+mj-lt"/>
+              </a:rPr>
+              <a:t> </a:t>
+            </a:r>
+            <a:r>
+              <a:rPr lang="en-US" sz="2000" dirty="0" err="1">
+                <a:latin typeface="+mj-lt"/>
+              </a:rPr>
+              <a:t>Fehlermeldung</a:t>
+            </a:r>
+            <a:r>
+              <a:rPr lang="en-US" sz="2000" dirty="0">
+                <a:latin typeface="+mj-lt"/>
+              </a:rPr>
+              <a:t> </a:t>
+            </a:r>
+            <a:r>
+              <a:rPr lang="en-US" sz="2000" dirty="0" err="1">
+                <a:latin typeface="+mj-lt"/>
+              </a:rPr>
+              <a:t>erscheint</a:t>
+            </a:r>
+            <a:r>
+              <a:rPr lang="en-US" sz="2000" dirty="0">
+                <a:latin typeface="+mj-lt"/>
+              </a:rPr>
+              <a:t>:</a:t>
             </a:r>
           </a:p>
           <a:p>
@@ -14055,8 +14250,22 @@
               <a:buChar char="•"/>
             </a:pPr>
             <a:r>
-              <a:rPr lang="de-DE" sz="1800" dirty="0"/>
-              <a:t>Genutzt für häufig genutzte Upstream-Images</a:t>
+              <a:rPr lang="en-US" sz="1600" dirty="0">
+                <a:latin typeface="Consolas" panose="020B0609020204030204" pitchFamily="49" charset="0"/>
+              </a:rPr>
+              <a:t>error during connect: Get http://docker:2376/v1.39/info: dial </a:t>
+            </a:r>
+            <a:r>
+              <a:rPr lang="en-US" sz="1600" dirty="0" err="1">
+                <a:latin typeface="Consolas" panose="020B0609020204030204" pitchFamily="49" charset="0"/>
+              </a:rPr>
+              <a:t>tcp</a:t>
+            </a:r>
+            <a:r>
+              <a:rPr lang="en-US" sz="1600" dirty="0">
+                <a:latin typeface="Consolas" panose="020B0609020204030204" pitchFamily="49" charset="0"/>
+              </a:rPr>
+              <a:t>: lookup docker on 192.168.0.1:53: no such host</a:t>
             </a:r>
           </a:p>
           <a:p>
@@ -14064,243 +14273,34 @@
               <a:buFont typeface="Arial" panose="020B0604020202020204" pitchFamily="34" charset="0"/>
               <a:buChar char="•"/>
             </a:pPr>
-            <a:r>
-              <a:rPr lang="de-DE" sz="1800" dirty="0"/>
-              <a:t>Agiert als pull </a:t>
-            </a:r>
-            <a:r>
-              <a:rPr lang="de-DE" sz="1800" dirty="0" err="1"/>
-              <a:t>through</a:t>
-            </a:r>
-            <a:r>
-              <a:rPr lang="de-DE" sz="1800" dirty="0"/>
-              <a:t> </a:t>
-            </a:r>
-            <a:r>
-              <a:rPr lang="de-DE" sz="1800" dirty="0" err="1"/>
-              <a:t>cache</a:t>
-            </a:r>
-            <a:r>
-              <a:rPr lang="de-DE" sz="1800" dirty="0"/>
-              <a:t> für </a:t>
-            </a:r>
-            <a:r>
-              <a:rPr lang="de-DE" sz="1800" dirty="0" err="1"/>
-              <a:t>DockerHub</a:t>
-            </a:r>
-            <a:endParaRPr lang="de-DE" sz="1800" dirty="0"/>
+            <a:endParaRPr lang="en-US" sz="1600" dirty="0">
+              <a:latin typeface="Consolas" panose="020B0609020204030204" pitchFamily="49" charset="0"/>
+            </a:endParaRPr>
           </a:p>
           <a:p>
             <a:pPr lvl="1">
               <a:buFont typeface="Arial" panose="020B0604020202020204" pitchFamily="34" charset="0"/>
               <a:buChar char="•"/>
             </a:pPr>
-            <a:r>
-              <a:rPr lang="de-DE" sz="1800" dirty="0"/>
-              <a:t>Aus Sicht des Docker Clients: Einfach eine weitere Registry</a:t>
-            </a:r>
-          </a:p>
-          <a:p>
-            <a:pPr>
-              <a:buFont typeface="Arial" panose="020B0604020202020204" pitchFamily="34" charset="0"/>
-              <a:buChar char="•"/>
-            </a:pPr>
-            <a:r>
-              <a:rPr lang="de-DE" sz="2000" dirty="0"/>
-              <a:t>Docker Hub rate </a:t>
-            </a:r>
-            <a:r>
-              <a:rPr lang="de-DE" sz="2000" dirty="0" err="1"/>
-              <a:t>limiting</a:t>
-            </a:r>
-            <a:endParaRPr lang="de-DE" sz="2000" dirty="0"/>
+            <a:endParaRPr lang="en-US" sz="1600" dirty="0">
+              <a:latin typeface="Consolas" panose="020B0609020204030204" pitchFamily="49" charset="0"/>
+            </a:endParaRPr>
           </a:p>
           <a:p>
             <a:pPr lvl="1">
               <a:buFont typeface="Arial" panose="020B0604020202020204" pitchFamily="34" charset="0"/>
               <a:buChar char="•"/>
             </a:pPr>
-            <a:r>
-              <a:rPr lang="de-DE" sz="1800" dirty="0">
-                <a:hlinkClick r:id="rId3"/>
-              </a:rPr>
-              <a:t>https://docs.docker.com/docker-hub/download-rate-limit/</a:t>
-            </a:r>
-            <a:r>
-              <a:rPr lang="de-DE" sz="1800" dirty="0"/>
-              <a:t> </a:t>
-            </a:r>
-          </a:p>
-          <a:p>
-            <a:pPr lvl="1">
-              <a:buFont typeface="Arial" panose="020B0604020202020204" pitchFamily="34" charset="0"/>
-              <a:buChar char="•"/>
-            </a:pPr>
-            <a:r>
-              <a:rPr lang="de-DE" sz="1800" dirty="0"/>
-              <a:t>Begrenzt die Image </a:t>
-            </a:r>
-            <a:r>
-              <a:rPr lang="de-DE" sz="1800" dirty="0" err="1"/>
-              <a:t>pulls</a:t>
-            </a:r>
-            <a:r>
-              <a:rPr lang="de-DE" sz="1800" dirty="0"/>
-              <a:t> von Docker Hub </a:t>
-            </a:r>
-          </a:p>
-          <a:p>
-            <a:pPr lvl="1">
-              <a:buFont typeface="Arial" panose="020B0604020202020204" pitchFamily="34" charset="0"/>
-              <a:buChar char="•"/>
-            </a:pPr>
-            <a:r>
-              <a:rPr lang="de-DE" sz="1800" dirty="0"/>
-              <a:t>Meist läuft bei jedem </a:t>
-            </a:r>
-            <a:r>
-              <a:rPr lang="de-DE" sz="1800" dirty="0" err="1"/>
-              <a:t>commit</a:t>
-            </a:r>
-            <a:r>
-              <a:rPr lang="de-DE" sz="1800" dirty="0"/>
-              <a:t> eine Pipeline</a:t>
-            </a:r>
-          </a:p>
-          <a:p>
-            <a:pPr lvl="2">
-              <a:buFont typeface="Arial" panose="020B0604020202020204" pitchFamily="34" charset="0"/>
-              <a:buChar char="•"/>
-            </a:pPr>
-            <a:r>
-              <a:rPr lang="de-DE" sz="1600" dirty="0"/>
-              <a:t>Selbst bei gleichem Image </a:t>
-            </a:r>
-            <a:r>
-              <a:rPr lang="de-DE" sz="1600" dirty="0">
-                <a:sym typeface="Wingdings" panose="05000000000000000000" pitchFamily="2" charset="2"/>
-              </a:rPr>
-              <a:t> Docker Pull Count erhöht durch „manifest </a:t>
-            </a:r>
-            <a:r>
-              <a:rPr lang="de-DE" sz="1600" dirty="0" err="1">
-                <a:sym typeface="Wingdings" panose="05000000000000000000" pitchFamily="2" charset="2"/>
-              </a:rPr>
-              <a:t>requets</a:t>
-            </a:r>
-            <a:r>
-              <a:rPr lang="de-DE" sz="1600" dirty="0">
-                <a:sym typeface="Wingdings" panose="05000000000000000000" pitchFamily="2" charset="2"/>
-              </a:rPr>
-              <a:t>“</a:t>
-            </a:r>
-            <a:endParaRPr lang="de-DE" sz="2000" dirty="0">
-              <a:sym typeface="Wingdings" panose="05000000000000000000" pitchFamily="2" charset="2"/>
+            <a:endParaRPr lang="en-US" sz="1600" dirty="0">
+              <a:latin typeface="Consolas" panose="020B0609020204030204" pitchFamily="49" charset="0"/>
             </a:endParaRPr>
-          </a:p>
-          <a:p>
-            <a:pPr lvl="1">
-              <a:buFont typeface="Arial" panose="020B0604020202020204" pitchFamily="34" charset="0"/>
-              <a:buChar char="•"/>
-            </a:pPr>
-            <a:r>
-              <a:rPr lang="de-DE" sz="1800" dirty="0">
-                <a:sym typeface="Wingdings" panose="05000000000000000000" pitchFamily="2" charset="2"/>
-              </a:rPr>
-              <a:t>Manifest („Inhaltverzeichnis des Images“)</a:t>
-            </a:r>
-          </a:p>
-          <a:p>
-            <a:pPr lvl="2">
-              <a:buFont typeface="Arial" panose="020B0604020202020204" pitchFamily="34" charset="0"/>
-              <a:buChar char="•"/>
-            </a:pPr>
-            <a:r>
-              <a:rPr lang="de-DE" sz="1600" dirty="0">
-                <a:sym typeface="Wingdings" panose="05000000000000000000" pitchFamily="2" charset="2"/>
-              </a:rPr>
-              <a:t>Informationen über </a:t>
-            </a:r>
-            <a:r>
-              <a:rPr lang="de-DE" sz="1600" dirty="0" err="1">
-                <a:sym typeface="Wingdings" panose="05000000000000000000" pitchFamily="2" charset="2"/>
-              </a:rPr>
-              <a:t>Layers</a:t>
-            </a:r>
-            <a:r>
-              <a:rPr lang="de-DE" sz="1600" dirty="0">
-                <a:sym typeface="Wingdings" panose="05000000000000000000" pitchFamily="2" charset="2"/>
-              </a:rPr>
-              <a:t> und Blobs des Images</a:t>
-            </a:r>
-            <a:endParaRPr lang="de-DE" sz="1600" dirty="0"/>
-          </a:p>
-          <a:p>
-            <a:pPr>
-              <a:buFont typeface="Arial" panose="020B0604020202020204" pitchFamily="34" charset="0"/>
-              <a:buChar char="•"/>
-            </a:pPr>
-            <a:r>
-              <a:rPr lang="de-DE" sz="2000" dirty="0" err="1"/>
-              <a:t>Dependency</a:t>
-            </a:r>
-            <a:r>
-              <a:rPr lang="de-DE" sz="2000" dirty="0"/>
-              <a:t> Proxy </a:t>
-            </a:r>
-            <a:r>
-              <a:rPr lang="de-DE" sz="2000" dirty="0" err="1"/>
-              <a:t>GitLab</a:t>
-            </a:r>
-            <a:r>
-              <a:rPr lang="de-DE" sz="2000" dirty="0"/>
-              <a:t> Dokumentation: </a:t>
-            </a:r>
-            <a:r>
-              <a:rPr lang="de-DE" sz="2000" dirty="0">
-                <a:hlinkClick r:id="rId4"/>
-              </a:rPr>
-              <a:t>https://docs.gitlab.com/ee/user/packages/dependency_proxy/</a:t>
-            </a:r>
-            <a:r>
-              <a:rPr lang="de-DE" sz="2000" dirty="0"/>
-              <a:t> </a:t>
-            </a:r>
-          </a:p>
-          <a:p>
-            <a:pPr>
-              <a:buFont typeface="Arial" panose="020B0604020202020204" pitchFamily="34" charset="0"/>
-              <a:buChar char="•"/>
-            </a:pPr>
-            <a:r>
-              <a:rPr lang="de-DE" sz="2000" u="sng" dirty="0"/>
-              <a:t>Hier:</a:t>
-            </a:r>
-            <a:r>
-              <a:rPr lang="de-DE" sz="2000" dirty="0"/>
-              <a:t> Keine weitere Verwendung!</a:t>
-            </a:r>
-          </a:p>
-          <a:p>
-            <a:pPr lvl="1">
-              <a:buFont typeface="Arial" panose="020B0604020202020204" pitchFamily="34" charset="0"/>
-              <a:buChar char="•"/>
-            </a:pPr>
-            <a:endParaRPr lang="de-DE" dirty="0"/>
-          </a:p>
-          <a:p>
-            <a:pPr lvl="1">
-              <a:buFont typeface="Arial" panose="020B0604020202020204" pitchFamily="34" charset="0"/>
-              <a:buChar char="•"/>
-            </a:pPr>
-            <a:endParaRPr lang="de-DE" dirty="0"/>
           </a:p>
         </p:txBody>
       </p:sp>
     </p:spTree>
     <p:extLst>
       <p:ext uri="{BB962C8B-B14F-4D97-AF65-F5344CB8AC3E}">
-        <p14:creationId xmlns:p14="http://schemas.microsoft.com/office/powerpoint/2010/main" val="844561808"/>
+        <p14:creationId xmlns:p14="http://schemas.microsoft.com/office/powerpoint/2010/main" val="3445805958"/>
       </p:ext>
     </p:extLst>
   </p:cSld>

</xml_diff>

<commit_message>
Fix wrong docker-dind version
</commit_message>
<xml_diff>
--- a/slides/Tag-3_4-Release-und-Tagged-Images.pptx
+++ b/slides/Tag-3_4-Release-und-Tagged-Images.pptx
@@ -3171,7 +3171,7 @@
               <a:pPr algn="ctr">
                 <a:defRPr/>
               </a:pPr>
-              <a:t>10.06.2024</a:t>
+              <a:t>11.06.2024</a:t>
             </a:fld>
             <a:endParaRPr lang="de-DE" sz="1000">
               <a:solidFill>
@@ -13293,7 +13293,7 @@
                 <a:ea typeface="+mn-ea"/>
                 <a:cs typeface="+mn-cs"/>
               </a:rPr>
-              <a:t>/docker:18.09.7-dind</a:t>
+              <a:t>/docker:20.10.16-dind</a:t>
             </a:r>
           </a:p>
           <a:p>
@@ -13956,8 +13956,39 @@
                 <a:ea typeface="+mn-ea"/>
                 <a:cs typeface="+mn-cs"/>
               </a:rPr>
-              <a:t>/docker:18.09.7-dind</a:t>
-            </a:r>
+              <a:t>/</a:t>
+            </a:r>
+            <a:r>
+              <a:rPr kumimoji="0" lang="en-US" sz="1600" b="0" i="0" u="none" strike="noStrike" kern="0" cap="none" spc="0" normalizeH="0" baseline="0" noProof="0">
+                <a:ln>
+                  <a:noFill/>
+                </a:ln>
+                <a:solidFill>
+                  <a:srgbClr val="000000"/>
+                </a:solidFill>
+                <a:effectLst/>
+                <a:uLnTx/>
+                <a:uFillTx/>
+                <a:latin typeface="Consolas" panose="020B0609020204030204" pitchFamily="49" charset="0"/>
+                <a:ea typeface="+mn-ea"/>
+                <a:cs typeface="+mn-cs"/>
+              </a:rPr>
+              <a:t>docker:20.10.16-dind</a:t>
+            </a:r>
+            <a:endParaRPr kumimoji="0" lang="en-US" sz="1600" b="0" i="0" u="none" strike="noStrike" kern="0" cap="none" spc="0" normalizeH="0" baseline="0" noProof="0" dirty="0">
+              <a:ln>
+                <a:noFill/>
+              </a:ln>
+              <a:solidFill>
+                <a:srgbClr val="000000"/>
+              </a:solidFill>
+              <a:effectLst/>
+              <a:uLnTx/>
+              <a:uFillTx/>
+              <a:latin typeface="Consolas" panose="020B0609020204030204" pitchFamily="49" charset="0"/>
+              <a:ea typeface="+mn-ea"/>
+              <a:cs typeface="+mn-cs"/>
+            </a:endParaRPr>
           </a:p>
           <a:p>
             <a:pPr marL="0" marR="0" lvl="0" indent="0" algn="l" defTabSz="914400" rtl="0" eaLnBrk="1" fontAlgn="base" latinLnBrk="0" hangingPunct="1">

</xml_diff>